<commit_message>
add gc and jit and some pic
</commit_message>
<xml_diff>
--- a/Java 性能优化.pptx
+++ b/Java 性能优化.pptx
@@ -18,29 +18,31 @@
     <p:sldId id="261" r:id="rId12"/>
     <p:sldId id="276" r:id="rId13"/>
     <p:sldId id="304" r:id="rId14"/>
-    <p:sldId id="295" r:id="rId15"/>
-    <p:sldId id="296" r:id="rId16"/>
-    <p:sldId id="297" r:id="rId17"/>
-    <p:sldId id="298" r:id="rId18"/>
-    <p:sldId id="299" r:id="rId19"/>
-    <p:sldId id="300" r:id="rId20"/>
-    <p:sldId id="260" r:id="rId21"/>
-    <p:sldId id="263" r:id="rId22"/>
-    <p:sldId id="303" r:id="rId23"/>
-    <p:sldId id="280" r:id="rId24"/>
-    <p:sldId id="282" r:id="rId25"/>
-    <p:sldId id="284" r:id="rId26"/>
-    <p:sldId id="283" r:id="rId27"/>
-    <p:sldId id="301" r:id="rId28"/>
-    <p:sldId id="302" r:id="rId29"/>
-    <p:sldId id="290" r:id="rId30"/>
-    <p:sldId id="272" r:id="rId31"/>
-    <p:sldId id="291" r:id="rId32"/>
-    <p:sldId id="279" r:id="rId33"/>
-    <p:sldId id="264" r:id="rId34"/>
-    <p:sldId id="278" r:id="rId35"/>
-    <p:sldId id="274" r:id="rId36"/>
-    <p:sldId id="275" r:id="rId37"/>
+    <p:sldId id="306" r:id="rId15"/>
+    <p:sldId id="295" r:id="rId16"/>
+    <p:sldId id="296" r:id="rId17"/>
+    <p:sldId id="307" r:id="rId18"/>
+    <p:sldId id="297" r:id="rId19"/>
+    <p:sldId id="298" r:id="rId20"/>
+    <p:sldId id="299" r:id="rId21"/>
+    <p:sldId id="300" r:id="rId22"/>
+    <p:sldId id="260" r:id="rId23"/>
+    <p:sldId id="263" r:id="rId24"/>
+    <p:sldId id="303" r:id="rId25"/>
+    <p:sldId id="280" r:id="rId26"/>
+    <p:sldId id="282" r:id="rId27"/>
+    <p:sldId id="284" r:id="rId28"/>
+    <p:sldId id="283" r:id="rId29"/>
+    <p:sldId id="301" r:id="rId30"/>
+    <p:sldId id="302" r:id="rId31"/>
+    <p:sldId id="290" r:id="rId32"/>
+    <p:sldId id="272" r:id="rId33"/>
+    <p:sldId id="291" r:id="rId34"/>
+    <p:sldId id="279" r:id="rId35"/>
+    <p:sldId id="264" r:id="rId36"/>
+    <p:sldId id="278" r:id="rId37"/>
+    <p:sldId id="274" r:id="rId38"/>
+    <p:sldId id="275" r:id="rId39"/>
   </p:sldIdLst>
   <p:sldSz cx="9144000" cy="6858000" type="screen4x3"/>
   <p:notesSz cx="6858000" cy="9144000"/>
@@ -323,7 +325,7 @@
           <a:p>
             <a:fld id="{091BF118-96DD-4038-B6DA-0646366618B5}" type="datetimeFigureOut">
               <a:rPr lang="zh-CN" altLang="en-US" smtClean="0"/>
-              <a:t>2016/11/11</a:t>
+              <a:t>2016/11/13</a:t>
             </a:fld>
             <a:endParaRPr lang="zh-CN" altLang="en-US"/>
           </a:p>
@@ -488,7 +490,7 @@
           <a:p>
             <a:fld id="{091BF118-96DD-4038-B6DA-0646366618B5}" type="datetimeFigureOut">
               <a:rPr lang="zh-CN" altLang="en-US" smtClean="0"/>
-              <a:t>2016/11/11</a:t>
+              <a:t>2016/11/13</a:t>
             </a:fld>
             <a:endParaRPr lang="zh-CN" altLang="en-US"/>
           </a:p>
@@ -663,7 +665,7 @@
           <a:p>
             <a:fld id="{091BF118-96DD-4038-B6DA-0646366618B5}" type="datetimeFigureOut">
               <a:rPr lang="zh-CN" altLang="en-US" smtClean="0"/>
-              <a:t>2016/11/11</a:t>
+              <a:t>2016/11/13</a:t>
             </a:fld>
             <a:endParaRPr lang="zh-CN" altLang="en-US"/>
           </a:p>
@@ -828,7 +830,7 @@
           <a:p>
             <a:fld id="{091BF118-96DD-4038-B6DA-0646366618B5}" type="datetimeFigureOut">
               <a:rPr lang="zh-CN" altLang="en-US" smtClean="0"/>
-              <a:t>2016/11/11</a:t>
+              <a:t>2016/11/13</a:t>
             </a:fld>
             <a:endParaRPr lang="zh-CN" altLang="en-US"/>
           </a:p>
@@ -1069,7 +1071,7 @@
           <a:p>
             <a:fld id="{091BF118-96DD-4038-B6DA-0646366618B5}" type="datetimeFigureOut">
               <a:rPr lang="zh-CN" altLang="en-US" smtClean="0"/>
-              <a:t>2016/11/11</a:t>
+              <a:t>2016/11/13</a:t>
             </a:fld>
             <a:endParaRPr lang="zh-CN" altLang="en-US"/>
           </a:p>
@@ -1352,7 +1354,7 @@
           <a:p>
             <a:fld id="{091BF118-96DD-4038-B6DA-0646366618B5}" type="datetimeFigureOut">
               <a:rPr lang="zh-CN" altLang="en-US" smtClean="0"/>
-              <a:t>2016/11/11</a:t>
+              <a:t>2016/11/13</a:t>
             </a:fld>
             <a:endParaRPr lang="zh-CN" altLang="en-US"/>
           </a:p>
@@ -1769,7 +1771,7 @@
           <a:p>
             <a:fld id="{091BF118-96DD-4038-B6DA-0646366618B5}" type="datetimeFigureOut">
               <a:rPr lang="zh-CN" altLang="en-US" smtClean="0"/>
-              <a:t>2016/11/11</a:t>
+              <a:t>2016/11/13</a:t>
             </a:fld>
             <a:endParaRPr lang="zh-CN" altLang="en-US"/>
           </a:p>
@@ -1882,7 +1884,7 @@
           <a:p>
             <a:fld id="{091BF118-96DD-4038-B6DA-0646366618B5}" type="datetimeFigureOut">
               <a:rPr lang="zh-CN" altLang="en-US" smtClean="0"/>
-              <a:t>2016/11/11</a:t>
+              <a:t>2016/11/13</a:t>
             </a:fld>
             <a:endParaRPr lang="zh-CN" altLang="en-US"/>
           </a:p>
@@ -1972,7 +1974,7 @@
           <a:p>
             <a:fld id="{091BF118-96DD-4038-B6DA-0646366618B5}" type="datetimeFigureOut">
               <a:rPr lang="zh-CN" altLang="en-US" smtClean="0"/>
-              <a:t>2016/11/11</a:t>
+              <a:t>2016/11/13</a:t>
             </a:fld>
             <a:endParaRPr lang="zh-CN" altLang="en-US"/>
           </a:p>
@@ -2244,7 +2246,7 @@
           <a:p>
             <a:fld id="{091BF118-96DD-4038-B6DA-0646366618B5}" type="datetimeFigureOut">
               <a:rPr lang="zh-CN" altLang="en-US" smtClean="0"/>
-              <a:t>2016/11/11</a:t>
+              <a:t>2016/11/13</a:t>
             </a:fld>
             <a:endParaRPr lang="zh-CN" altLang="en-US"/>
           </a:p>
@@ -2492,7 +2494,7 @@
           <a:p>
             <a:fld id="{091BF118-96DD-4038-B6DA-0646366618B5}" type="datetimeFigureOut">
               <a:rPr lang="zh-CN" altLang="en-US" smtClean="0"/>
-              <a:t>2016/11/11</a:t>
+              <a:t>2016/11/13</a:t>
             </a:fld>
             <a:endParaRPr lang="zh-CN" altLang="en-US"/>
           </a:p>
@@ -2703,7 +2705,7 @@
           <a:p>
             <a:fld id="{091BF118-96DD-4038-B6DA-0646366618B5}" type="datetimeFigureOut">
               <a:rPr lang="zh-CN" altLang="en-US" smtClean="0"/>
-              <a:t>2016/11/11</a:t>
+              <a:t>2016/11/13</a:t>
             </a:fld>
             <a:endParaRPr lang="zh-CN" altLang="en-US"/>
           </a:p>
@@ -3277,11 +3279,52 @@
         </p:blipFill>
         <p:spPr>
           <a:xfrm>
-            <a:off x="2529081" y="1600200"/>
+            <a:off x="683568" y="1556792"/>
             <a:ext cx="4085837" cy="4525963"/>
           </a:xfrm>
         </p:spPr>
       </p:pic>
+      <p:sp>
+        <p:nvSpPr>
+          <p:cNvPr id="3" name="TextBox 2"/>
+          <p:cNvSpPr txBox="1"/>
+          <p:nvPr/>
+        </p:nvSpPr>
+        <p:spPr>
+          <a:xfrm>
+            <a:off x="5436096" y="1700808"/>
+            <a:ext cx="3312368" cy="646331"/>
+          </a:xfrm>
+          <a:prstGeom prst="rect">
+            <a:avLst/>
+          </a:prstGeom>
+          <a:noFill/>
+        </p:spPr>
+        <p:txBody>
+          <a:bodyPr wrap="square" rtlCol="0">
+            <a:spAutoFit/>
+          </a:bodyPr>
+          <a:lstStyle/>
+          <a:p>
+            <a:r>
+              <a:rPr lang="zh-CN" altLang="en-US" dirty="0" smtClean="0"/>
+              <a:t>编程语言常用优化手段</a:t>
+            </a:r>
+            <a:endParaRPr lang="en-US" altLang="zh-CN" dirty="0" smtClean="0"/>
+          </a:p>
+          <a:p>
+            <a:r>
+              <a:rPr lang="en-US" altLang="zh-CN" dirty="0" smtClean="0"/>
+              <a:t>e.g.: java python </a:t>
+            </a:r>
+            <a:r>
+              <a:rPr lang="en-US" altLang="zh-CN" dirty="0" err="1" smtClean="0"/>
+              <a:t>js</a:t>
+            </a:r>
+            <a:endParaRPr lang="zh-CN" altLang="en-US" dirty="0"/>
+          </a:p>
+        </p:txBody>
+      </p:sp>
     </p:spTree>
   </p:cSld>
   <p:clrMapOvr>
@@ -3623,8 +3666,151 @@
         </p:nvSpPr>
         <p:spPr/>
         <p:txBody>
-          <a:bodyPr/>
-          <a:lstStyle/>
+          <a:bodyPr>
+            <a:normAutofit fontScale="92500" lnSpcReduction="10000"/>
+          </a:bodyPr>
+          <a:lstStyle/>
+          <a:p>
+            <a:r>
+              <a:rPr lang="zh-CN" altLang="en-US" dirty="0" smtClean="0"/>
+              <a:t>了解每个参数都干了什么，从</a:t>
+            </a:r>
+            <a:r>
+              <a:rPr lang="en-US" altLang="zh-CN" dirty="0" err="1" smtClean="0"/>
+              <a:t>openjdk</a:t>
+            </a:r>
+            <a:r>
+              <a:rPr lang="zh-CN" altLang="en-US" dirty="0" smtClean="0"/>
+              <a:t>源码入手</a:t>
+            </a:r>
+            <a:r>
+              <a:rPr lang="en-US" altLang="zh-CN" dirty="0"/>
+              <a:t> </a:t>
+            </a:r>
+            <a:r>
+              <a:rPr lang="en-US" altLang="zh-CN" dirty="0" smtClean="0">
+                <a:hlinkClick r:id="rId2"/>
+              </a:rPr>
+              <a:t>global.hpp</a:t>
+            </a:r>
+            <a:endParaRPr lang="en-US" altLang="zh-CN" dirty="0" smtClean="0"/>
+          </a:p>
+          <a:p>
+            <a:r>
+              <a:rPr lang="en-US" altLang="zh-CN" dirty="0" smtClean="0"/>
+              <a:t>-XX</a:t>
+            </a:r>
+            <a:r>
+              <a:rPr lang="en-US" altLang="zh-CN" dirty="0"/>
+              <a:t>:</a:t>
+            </a:r>
+            <a:r>
+              <a:rPr lang="en-US" altLang="zh-CN" dirty="0" smtClean="0"/>
+              <a:t>+</a:t>
+            </a:r>
+            <a:r>
+              <a:rPr lang="en-US" altLang="zh-CN" dirty="0" err="1" smtClean="0"/>
+              <a:t>PrintFlagsFinal</a:t>
+            </a:r>
+            <a:r>
+              <a:rPr lang="en-US" altLang="zh-CN" dirty="0" smtClean="0"/>
+              <a:t> </a:t>
+            </a:r>
+            <a:r>
+              <a:rPr lang="zh-CN" altLang="en-US" dirty="0" smtClean="0"/>
+              <a:t>了解参数最后被设置成什么值</a:t>
+            </a:r>
+            <a:endParaRPr lang="en-US" altLang="zh-CN" dirty="0" smtClean="0"/>
+          </a:p>
+          <a:p>
+            <a:pPr lvl="1"/>
+            <a:r>
+              <a:rPr lang="zh-CN" altLang="en-US" dirty="0" smtClean="0"/>
+              <a:t>每个小版本之间会有差异 </a:t>
+            </a:r>
+            <a:r>
+              <a:rPr lang="en-US" altLang="zh-CN" dirty="0" smtClean="0"/>
+              <a:t>jdk6u0 vs jdk6u23</a:t>
+            </a:r>
+          </a:p>
+          <a:p>
+            <a:r>
+              <a:rPr lang="zh-CN" altLang="en-US" dirty="0" smtClean="0"/>
+              <a:t>参考优秀产产品</a:t>
+            </a:r>
+            <a:endParaRPr lang="en-US" altLang="zh-CN" dirty="0" smtClean="0"/>
+          </a:p>
+          <a:p>
+            <a:pPr lvl="1"/>
+            <a:r>
+              <a:rPr lang="en-US" altLang="zh-CN" dirty="0" smtClean="0">
+                <a:hlinkClick r:id="rId3"/>
+              </a:rPr>
+              <a:t>Elastic search </a:t>
+            </a:r>
+            <a:r>
+              <a:rPr lang="en-US" altLang="zh-CN" dirty="0" err="1" smtClean="0">
+                <a:hlinkClick r:id="rId3"/>
+              </a:rPr>
+              <a:t>jvm.options</a:t>
+            </a:r>
+            <a:endParaRPr lang="en-US" altLang="zh-CN" dirty="0" smtClean="0"/>
+          </a:p>
+          <a:p>
+            <a:pPr marL="342900" lvl="1" indent="-342900">
+              <a:buFont typeface="Arial" pitchFamily="34" charset="0"/>
+              <a:buChar char="•"/>
+            </a:pPr>
+            <a:r>
+              <a:rPr lang="zh-CN" altLang="en-US" sz="3200" dirty="0"/>
+              <a:t>监控 </a:t>
+            </a:r>
+            <a:r>
+              <a:rPr lang="en-US" altLang="zh-CN" sz="3200" dirty="0"/>
+              <a:t>&amp; </a:t>
+            </a:r>
+            <a:r>
+              <a:rPr lang="zh-CN" altLang="en-US" sz="3200" dirty="0"/>
+              <a:t>性能 </a:t>
+            </a:r>
+            <a:r>
+              <a:rPr lang="en-US" altLang="zh-CN" sz="3200" dirty="0"/>
+              <a:t>&amp; </a:t>
+            </a:r>
+            <a:r>
+              <a:rPr lang="zh-CN" altLang="en-US" sz="3200" dirty="0" smtClean="0"/>
+              <a:t>稳定性 </a:t>
+            </a:r>
+            <a:r>
+              <a:rPr lang="en-US" altLang="zh-CN" sz="3200" dirty="0" smtClean="0"/>
+              <a:t>&amp; </a:t>
+            </a:r>
+            <a:r>
+              <a:rPr lang="zh-CN" altLang="en-US" sz="3200" dirty="0" smtClean="0"/>
+              <a:t>问题排查</a:t>
+            </a:r>
+            <a:endParaRPr lang="en-US" altLang="zh-CN" sz="3200" dirty="0" smtClean="0"/>
+          </a:p>
+          <a:p>
+            <a:pPr marL="742950" lvl="2" indent="-342900"/>
+            <a:r>
+              <a:rPr lang="en-US" altLang="zh-CN" dirty="0" err="1" smtClean="0"/>
+              <a:t>Loggc</a:t>
+            </a:r>
+            <a:endParaRPr lang="en-US" altLang="zh-CN" dirty="0" smtClean="0"/>
+          </a:p>
+          <a:p>
+            <a:pPr marL="742950" lvl="2" indent="-342900"/>
+            <a:r>
+              <a:rPr lang="en-US" altLang="zh-CN" dirty="0" err="1" smtClean="0"/>
+              <a:t>Alijvm</a:t>
+            </a:r>
+            <a:r>
+              <a:rPr lang="en-US" altLang="zh-CN" dirty="0" smtClean="0"/>
+              <a:t> patch</a:t>
+            </a:r>
+            <a:endParaRPr lang="en-US" altLang="zh-CN" dirty="0"/>
+          </a:p>
           <a:p>
             <a:endParaRPr lang="zh-CN" altLang="en-US" dirty="0"/>
           </a:p>
@@ -3667,110 +3853,66 @@
         </p:nvSpPr>
         <p:spPr/>
         <p:txBody>
-          <a:bodyPr>
-            <a:normAutofit/>
-          </a:bodyPr>
+          <a:bodyPr/>
+          <a:lstStyle/>
+          <a:p>
+            <a:r>
+              <a:rPr lang="zh-CN" altLang="en-US" dirty="0" smtClean="0"/>
+              <a:t>问题排查</a:t>
+            </a:r>
+            <a:endParaRPr lang="zh-CN" altLang="en-US" dirty="0"/>
+          </a:p>
+        </p:txBody>
+      </p:sp>
+      <p:sp>
+        <p:nvSpPr>
+          <p:cNvPr id="3" name="内容占位符 2"/>
+          <p:cNvSpPr>
+            <a:spLocks noGrp="1"/>
+          </p:cNvSpPr>
+          <p:nvPr>
+            <p:ph idx="1"/>
+          </p:nvPr>
+        </p:nvSpPr>
+        <p:spPr/>
+        <p:txBody>
+          <a:bodyPr/>
           <a:lstStyle/>
           <a:p>
             <a:r>
               <a:rPr lang="en-US" altLang="zh-CN" dirty="0" err="1" smtClean="0"/>
-              <a:t>Gc</a:t>
-            </a:r>
-            <a:r>
-              <a:rPr lang="en-US" altLang="zh-CN" dirty="0" smtClean="0"/>
+              <a:t>Sy</a:t>
+            </a:r>
+            <a:r>
+              <a:rPr lang="en-US" altLang="zh-CN" dirty="0"/>
               <a:t> </a:t>
             </a:r>
             <a:r>
               <a:rPr lang="zh-CN" altLang="en-US" dirty="0" smtClean="0"/>
-              <a:t>算法基础</a:t>
+              <a:t>过高，一般是线程太多，上下文竞争激烈</a:t>
+            </a:r>
+            <a:endParaRPr lang="en-US" altLang="zh-CN" dirty="0" smtClean="0"/>
+          </a:p>
+          <a:p>
+            <a:pPr lvl="1"/>
+            <a:r>
+              <a:rPr lang="zh-CN" altLang="en-US" dirty="0" smtClean="0"/>
+              <a:t>小心</a:t>
+            </a:r>
+            <a:r>
+              <a:rPr lang="en-US" altLang="zh-CN" dirty="0" err="1" smtClean="0"/>
+              <a:t>newCachedExecutor</a:t>
             </a:r>
             <a:endParaRPr lang="zh-CN" altLang="en-US" dirty="0"/>
           </a:p>
         </p:txBody>
       </p:sp>
-      <p:sp>
-        <p:nvSpPr>
-          <p:cNvPr id="3" name="内容占位符 2"/>
-          <p:cNvSpPr>
-            <a:spLocks noGrp="1"/>
-          </p:cNvSpPr>
-          <p:nvPr>
-            <p:ph idx="1"/>
-          </p:nvPr>
-        </p:nvSpPr>
-        <p:spPr/>
-        <p:txBody>
-          <a:bodyPr/>
-          <a:lstStyle/>
-          <a:p>
-            <a:r>
-              <a:rPr lang="en-US" altLang="zh-CN" dirty="0" smtClean="0"/>
-              <a:t>Copying</a:t>
-            </a:r>
-            <a:endParaRPr lang="en-US" altLang="zh-CN" dirty="0"/>
-          </a:p>
-          <a:p>
-            <a:r>
-              <a:rPr lang="en-US" altLang="zh-CN" dirty="0" smtClean="0"/>
-              <a:t>Mark-sweep</a:t>
-            </a:r>
-          </a:p>
-          <a:p>
-            <a:r>
-              <a:rPr lang="en-US" altLang="zh-CN" dirty="0" smtClean="0"/>
-              <a:t>Mark-compact</a:t>
-            </a:r>
-          </a:p>
-          <a:p>
-            <a:r>
-              <a:rPr lang="en-US" altLang="zh-CN" dirty="0" smtClean="0"/>
-              <a:t>GC </a:t>
-            </a:r>
-            <a:r>
-              <a:rPr lang="zh-CN" altLang="en-US" dirty="0" smtClean="0"/>
-              <a:t>指标</a:t>
-            </a:r>
-            <a:endParaRPr lang="en-US" altLang="zh-CN" dirty="0" smtClean="0"/>
-          </a:p>
-          <a:p>
-            <a:pPr lvl="1"/>
-            <a:r>
-              <a:rPr lang="zh-CN" altLang="en-US" dirty="0" smtClean="0"/>
-              <a:t>吞吐量</a:t>
-            </a:r>
-            <a:r>
-              <a:rPr lang="en-US" altLang="zh-CN" dirty="0" smtClean="0"/>
-              <a:t>/</a:t>
-            </a:r>
-            <a:r>
-              <a:rPr lang="zh-CN" altLang="en-US" dirty="0" smtClean="0"/>
-              <a:t>吞吐率</a:t>
-            </a:r>
-            <a:endParaRPr lang="en-US" altLang="zh-CN" dirty="0" smtClean="0"/>
-          </a:p>
-          <a:p>
-            <a:pPr lvl="1"/>
-            <a:r>
-              <a:rPr lang="zh-CN" altLang="en-US" dirty="0" smtClean="0"/>
-              <a:t>延迟</a:t>
-            </a:r>
-            <a:endParaRPr lang="en-US" altLang="zh-CN" dirty="0" smtClean="0"/>
-          </a:p>
-          <a:p>
-            <a:pPr lvl="1"/>
-            <a:r>
-              <a:rPr lang="zh-CN" altLang="en-US" dirty="0" smtClean="0"/>
-              <a:t>内存</a:t>
-            </a:r>
-            <a:r>
-              <a:rPr lang="zh-CN" altLang="en-US" dirty="0"/>
-              <a:t>使用</a:t>
-            </a:r>
-            <a:endParaRPr lang="en-US" altLang="zh-CN" dirty="0" smtClean="0"/>
-          </a:p>
-        </p:txBody>
-      </p:sp>
     </p:spTree>
+    <p:extLst>
+      <p:ext uri="{BB962C8B-B14F-4D97-AF65-F5344CB8AC3E}">
+        <p14:creationId xmlns:p14="http://schemas.microsoft.com/office/powerpoint/2010/main" val="408425113"/>
+      </p:ext>
+    </p:extLst>
   </p:cSld>
   <p:clrMapOvr>
     <a:masterClrMapping/>
@@ -3807,12 +3949,14 @@
         </p:nvSpPr>
         <p:spPr/>
         <p:txBody>
-          <a:bodyPr/>
-          <a:lstStyle/>
-          <a:p>
-            <a:r>
-              <a:rPr lang="en-US" altLang="zh-CN" dirty="0" smtClean="0"/>
-              <a:t>GC IN HOTSPOT VM</a:t>
+          <a:bodyPr>
+            <a:normAutofit/>
+          </a:bodyPr>
+          <a:lstStyle/>
+          <a:p>
+            <a:r>
+              <a:rPr lang="en-US" altLang="zh-CN" dirty="0" smtClean="0"/>
+              <a:t>GC </a:t>
             </a:r>
             <a:endParaRPr lang="zh-CN" altLang="en-US" dirty="0"/>
           </a:p>
@@ -3835,79 +3979,101 @@
           <a:p>
             <a:r>
               <a:rPr lang="en-US" altLang="zh-CN" dirty="0" smtClean="0"/>
-              <a:t>CMS</a:t>
-            </a:r>
+              <a:t>Copying</a:t>
+            </a:r>
+            <a:endParaRPr lang="en-US" altLang="zh-CN" dirty="0"/>
+          </a:p>
+          <a:p>
+            <a:r>
+              <a:rPr lang="en-US" altLang="zh-CN" dirty="0" smtClean="0"/>
+              <a:t>Mark-sweep</a:t>
+            </a:r>
+          </a:p>
+          <a:p>
+            <a:r>
+              <a:rPr lang="en-US" altLang="zh-CN" dirty="0" smtClean="0"/>
+              <a:t>Mark-compact</a:t>
+            </a:r>
+          </a:p>
+          <a:p>
+            <a:r>
+              <a:rPr lang="en-US" altLang="zh-CN" dirty="0" smtClean="0"/>
+              <a:t>GC </a:t>
+            </a:r>
+            <a:r>
+              <a:rPr lang="zh-CN" altLang="en-US" dirty="0" smtClean="0"/>
+              <a:t>指标</a:t>
+            </a:r>
+            <a:endParaRPr lang="en-US" altLang="zh-CN" dirty="0" smtClean="0"/>
           </a:p>
           <a:p>
             <a:pPr lvl="1"/>
             <a:r>
+              <a:rPr lang="zh-CN" altLang="en-US" dirty="0" smtClean="0"/>
+              <a:t>吞吐量</a:t>
+            </a:r>
+            <a:r>
+              <a:rPr lang="en-US" altLang="zh-CN" dirty="0" smtClean="0"/>
+              <a:t>/</a:t>
+            </a:r>
+            <a:r>
+              <a:rPr lang="zh-CN" altLang="en-US" dirty="0" smtClean="0"/>
+              <a:t>吞吐率</a:t>
+            </a:r>
+            <a:endParaRPr lang="en-US" altLang="zh-CN" dirty="0" smtClean="0"/>
+          </a:p>
+          <a:p>
+            <a:pPr lvl="1"/>
+            <a:r>
+              <a:rPr lang="zh-CN" altLang="en-US" dirty="0" smtClean="0"/>
+              <a:t>延迟</a:t>
+            </a:r>
+            <a:endParaRPr lang="en-US" altLang="zh-CN" dirty="0" smtClean="0"/>
+          </a:p>
+          <a:p>
+            <a:pPr lvl="1"/>
+            <a:r>
+              <a:rPr lang="zh-CN" altLang="en-US" dirty="0" smtClean="0"/>
+              <a:t>内存</a:t>
+            </a:r>
+            <a:r>
               <a:rPr lang="zh-CN" altLang="en-US" dirty="0"/>
-              <a:t>避免</a:t>
-            </a:r>
-            <a:r>
-              <a:rPr lang="en-US" altLang="zh-CN" dirty="0" smtClean="0"/>
-              <a:t>Full GC</a:t>
-            </a:r>
-            <a:r>
-              <a:rPr lang="zh-CN" altLang="en-US" dirty="0" smtClean="0"/>
-              <a:t>，</a:t>
-            </a:r>
-            <a:r>
-              <a:rPr lang="en-US" altLang="zh-CN" dirty="0" smtClean="0"/>
-              <a:t>CMS</a:t>
-            </a:r>
-            <a:r>
-              <a:rPr lang="zh-CN" altLang="en-US" dirty="0" smtClean="0"/>
-              <a:t>本身就是为了低暂停而生，如果经常发生</a:t>
-            </a:r>
-            <a:r>
-              <a:rPr lang="en-US" altLang="zh-CN" dirty="0" smtClean="0"/>
-              <a:t>Full GC</a:t>
-            </a:r>
-            <a:r>
-              <a:rPr lang="zh-CN" altLang="en-US" dirty="0" smtClean="0"/>
-              <a:t>，那么使用</a:t>
-            </a:r>
-            <a:r>
-              <a:rPr lang="en-US" altLang="zh-CN" dirty="0" smtClean="0"/>
-              <a:t>CMS</a:t>
-            </a:r>
-            <a:r>
-              <a:rPr lang="zh-CN" altLang="en-US" dirty="0" smtClean="0"/>
-              <a:t>带来的暂停优势就不复存在。</a:t>
-            </a:r>
-            <a:endParaRPr lang="en-US" altLang="zh-CN" dirty="0" smtClean="0"/>
-          </a:p>
-          <a:p>
-            <a:pPr lvl="1"/>
-            <a:r>
-              <a:rPr lang="zh-CN" altLang="en-US" dirty="0" smtClean="0"/>
               <a:t>使用</a:t>
             </a:r>
-            <a:r>
-              <a:rPr lang="en-US" altLang="zh-CN" dirty="0" err="1" smtClean="0"/>
-              <a:t>Jstat</a:t>
-            </a:r>
-            <a:r>
-              <a:rPr lang="en-US" altLang="zh-CN" dirty="0" smtClean="0"/>
-              <a:t> –</a:t>
-            </a:r>
-            <a:r>
-              <a:rPr lang="en-US" altLang="zh-CN" dirty="0" err="1" smtClean="0"/>
-              <a:t>gcutil</a:t>
-            </a:r>
-            <a:r>
-              <a:rPr lang="en-US" altLang="zh-CN" dirty="0" smtClean="0"/>
-              <a:t> &lt;PID&gt; </a:t>
-            </a:r>
-            <a:r>
-              <a:rPr lang="zh-CN" altLang="en-US" dirty="0" smtClean="0"/>
-              <a:t>方便地观察</a:t>
-            </a:r>
-            <a:endParaRPr lang="zh-CN" altLang="en-US" dirty="0"/>
-          </a:p>
-        </p:txBody>
-      </p:sp>
+            <a:endParaRPr lang="en-US" altLang="zh-CN" dirty="0" smtClean="0"/>
+          </a:p>
+        </p:txBody>
+      </p:sp>
+      <p:pic>
+        <p:nvPicPr>
+          <p:cNvPr id="4" name="图片 3"/>
+          <p:cNvPicPr>
+            <a:picLocks noChangeAspect="1"/>
+          </p:cNvPicPr>
+          <p:nvPr/>
+        </p:nvPicPr>
+        <p:blipFill>
+          <a:blip r:embed="rId2">
+            <a:extLst>
+              <a:ext uri="{28A0092B-C50C-407E-A947-70E740481C1C}">
+                <a14:useLocalDpi xmlns:a14="http://schemas.microsoft.com/office/drawing/2010/main" val="0"/>
+              </a:ext>
+            </a:extLst>
+          </a:blip>
+          <a:stretch>
+            <a:fillRect/>
+          </a:stretch>
+        </p:blipFill>
+        <p:spPr>
+          <a:xfrm>
+            <a:off x="5148064" y="2112386"/>
+            <a:ext cx="2895600" cy="2674620"/>
+          </a:xfrm>
+          <a:prstGeom prst="rect">
+            <a:avLst/>
+          </a:prstGeom>
+        </p:spPr>
+      </p:pic>
     </p:spTree>
   </p:cSld>
   <p:clrMapOvr>
@@ -3950,7 +4116,7 @@
           <a:p>
             <a:r>
               <a:rPr lang="en-US" altLang="zh-CN" dirty="0" smtClean="0"/>
-              <a:t>GC IN 58</a:t>
+              <a:t>GC IN HOTSPOT VM</a:t>
             </a:r>
             <a:endParaRPr lang="zh-CN" altLang="en-US" dirty="0"/>
           </a:p>
@@ -3968,35 +4134,26 @@
         </p:nvSpPr>
         <p:spPr/>
         <p:txBody>
-          <a:bodyPr/>
-          <a:lstStyle/>
-          <a:p>
+          <a:bodyPr>
+            <a:normAutofit lnSpcReduction="10000"/>
+          </a:bodyPr>
+          <a:lstStyle/>
+          <a:p>
+            <a:r>
+              <a:rPr lang="en-US" altLang="zh-CN" dirty="0" smtClean="0"/>
+              <a:t>CMS GC – A mostly concurrent </a:t>
+            </a:r>
             <a:r>
               <a:rPr lang="en-US" altLang="zh-CN" dirty="0" err="1" smtClean="0"/>
-              <a:t>Gc</a:t>
-            </a:r>
-            <a:r>
-              <a:rPr lang="en-US" altLang="zh-CN" dirty="0" smtClean="0"/>
-              <a:t> in 58</a:t>
-            </a:r>
-          </a:p>
-          <a:p>
-            <a:pPr lvl="1"/>
-            <a:r>
-              <a:rPr lang="en-US" altLang="zh-CN" dirty="0" smtClean="0"/>
-              <a:t>All </a:t>
+              <a:t>genertional</a:t>
+            </a:r>
+            <a:r>
+              <a:rPr lang="en-US" altLang="zh-CN" dirty="0" smtClean="0"/>
+              <a:t> </a:t>
             </a:r>
             <a:r>
               <a:rPr lang="en-US" altLang="zh-CN" dirty="0" err="1" smtClean="0"/>
-              <a:t>scf</a:t>
-            </a:r>
-            <a:r>
-              <a:rPr lang="en-US" altLang="zh-CN" dirty="0" smtClean="0"/>
-              <a:t> run in </a:t>
-            </a:r>
-            <a:r>
-              <a:rPr lang="en-US" altLang="zh-CN" dirty="0" err="1" smtClean="0"/>
-              <a:t>cms</a:t>
+              <a:t>marksweep</a:t>
             </a:r>
             <a:r>
               <a:rPr lang="en-US" altLang="zh-CN" dirty="0" smtClean="0"/>
@@ -4009,93 +4166,157 @@
             <a:endParaRPr lang="en-US" altLang="zh-CN" dirty="0" smtClean="0"/>
           </a:p>
           <a:p>
-            <a:pPr lvl="2"/>
-            <a:r>
-              <a:rPr lang="zh-CN" altLang="en-US" dirty="0" smtClean="0"/>
-              <a:t>参数固定在 </a:t>
+            <a:pPr lvl="1"/>
+            <a:r>
+              <a:rPr lang="zh-CN" altLang="en-US" dirty="0"/>
+              <a:t>避免</a:t>
+            </a:r>
+            <a:r>
+              <a:rPr lang="en-US" altLang="zh-CN" dirty="0" smtClean="0"/>
+              <a:t>Full GC</a:t>
+            </a:r>
+            <a:r>
+              <a:rPr lang="zh-CN" altLang="en-US" dirty="0" smtClean="0"/>
+              <a:t>，</a:t>
+            </a:r>
+            <a:r>
+              <a:rPr lang="en-US" altLang="zh-CN" dirty="0" smtClean="0"/>
+              <a:t>CMS</a:t>
+            </a:r>
+            <a:r>
+              <a:rPr lang="zh-CN" altLang="en-US" dirty="0" smtClean="0"/>
+              <a:t>本身就是为了低暂停而生，如果经常发生</a:t>
+            </a:r>
+            <a:r>
+              <a:rPr lang="en-US" altLang="zh-CN" dirty="0" smtClean="0"/>
+              <a:t>Full GC</a:t>
+            </a:r>
+            <a:r>
+              <a:rPr lang="zh-CN" altLang="en-US" dirty="0" smtClean="0"/>
+              <a:t>，那么使用</a:t>
+            </a:r>
+            <a:r>
+              <a:rPr lang="en-US" altLang="zh-CN" dirty="0" smtClean="0"/>
+              <a:t>CMS</a:t>
+            </a:r>
+            <a:r>
+              <a:rPr lang="zh-CN" altLang="en-US" dirty="0" smtClean="0"/>
+              <a:t>带来的暂停优势就不复存在。</a:t>
+            </a:r>
+            <a:endParaRPr lang="en-US" altLang="zh-CN" dirty="0" smtClean="0"/>
+          </a:p>
+          <a:p>
+            <a:pPr lvl="1"/>
+            <a:r>
+              <a:rPr lang="zh-CN" altLang="en-US" dirty="0" smtClean="0"/>
+              <a:t>使用</a:t>
             </a:r>
             <a:r>
               <a:rPr lang="en-US" altLang="zh-CN" dirty="0" err="1" smtClean="0"/>
-              <a:t>scf</a:t>
-            </a:r>
-            <a:r>
-              <a:rPr lang="en-US" altLang="zh-CN" dirty="0" smtClean="0"/>
-              <a:t> </a:t>
-            </a:r>
-            <a:r>
-              <a:rPr lang="zh-CN" altLang="en-US" dirty="0" smtClean="0"/>
-              <a:t>启动脚本中</a:t>
-            </a:r>
-            <a:endParaRPr lang="en-US" altLang="zh-CN" dirty="0" smtClean="0"/>
-          </a:p>
-          <a:p>
-            <a:pPr lvl="2"/>
-            <a:r>
-              <a:rPr lang="zh-CN" altLang="en-US" dirty="0" smtClean="0"/>
-              <a:t>改进点</a:t>
-            </a:r>
-            <a:endParaRPr lang="en-US" altLang="zh-CN" dirty="0" smtClean="0"/>
-          </a:p>
-          <a:p>
-            <a:pPr lvl="3"/>
-            <a:r>
-              <a:rPr lang="zh-CN" altLang="en-US" dirty="0" smtClean="0"/>
-              <a:t>根据服务来选择</a:t>
+              <a:t>Jstat</a:t>
+            </a:r>
+            <a:r>
+              <a:rPr lang="en-US" altLang="zh-CN" dirty="0" smtClean="0"/>
+              <a:t> –</a:t>
             </a:r>
             <a:r>
               <a:rPr lang="en-US" altLang="zh-CN" dirty="0" err="1" smtClean="0"/>
-              <a:t>jvm</a:t>
-            </a:r>
-            <a:r>
-              <a:rPr lang="zh-CN" altLang="en-US" dirty="0" smtClean="0"/>
-              <a:t>参数</a:t>
-            </a:r>
-            <a:endParaRPr lang="en-US" altLang="zh-CN" dirty="0" smtClean="0"/>
-          </a:p>
-          <a:p>
-            <a:pPr lvl="3"/>
-            <a:r>
-              <a:rPr lang="zh-CN" altLang="en-US" dirty="0" smtClean="0"/>
-              <a:t>去掉无用选项和默认开启的选项，以免造成困惑</a:t>
+              <a:t>gcutil</a:t>
+            </a:r>
+            <a:r>
+              <a:rPr lang="en-US" altLang="zh-CN" dirty="0" smtClean="0"/>
+              <a:t> &lt;PID&gt; </a:t>
+            </a:r>
+            <a:r>
+              <a:rPr lang="zh-CN" altLang="en-US" dirty="0" smtClean="0"/>
+              <a:t>方便地</a:t>
+            </a:r>
+            <a:r>
+              <a:rPr lang="zh-CN" altLang="en-US" dirty="0" smtClean="0"/>
+              <a:t>观察</a:t>
             </a:r>
             <a:endParaRPr lang="en-US" altLang="zh-CN" dirty="0" smtClean="0"/>
           </a:p>
           <a:p>
             <a:pPr lvl="1"/>
             <a:r>
-              <a:rPr lang="en-US" altLang="zh-CN" dirty="0" smtClean="0"/>
-              <a:t>All </a:t>
+              <a:rPr lang="zh-CN" altLang="en-US" dirty="0"/>
+              <a:t>一</a:t>
+            </a:r>
+            <a:r>
+              <a:rPr lang="zh-CN" altLang="en-US" dirty="0" smtClean="0"/>
+              <a:t>次</a:t>
+            </a:r>
+            <a:r>
+              <a:rPr lang="en-US" altLang="zh-CN" dirty="0" smtClean="0"/>
+              <a:t>CMS GC </a:t>
+            </a:r>
+            <a:r>
+              <a:rPr lang="zh-CN" altLang="en-US" dirty="0" smtClean="0"/>
+              <a:t>会导致</a:t>
             </a:r>
             <a:r>
               <a:rPr lang="en-US" altLang="zh-CN" dirty="0" err="1" smtClean="0"/>
-              <a:t>wf</a:t>
-            </a:r>
-            <a:r>
-              <a:rPr lang="en-US" altLang="zh-CN" dirty="0" smtClean="0"/>
-              <a:t> run in </a:t>
-            </a:r>
-            <a:r>
-              <a:rPr lang="en-US" altLang="zh-CN" dirty="0" err="1" smtClean="0"/>
-              <a:t>cms</a:t>
-            </a:r>
-            <a:r>
-              <a:rPr lang="en-US" altLang="zh-CN" dirty="0" smtClean="0"/>
-              <a:t> </a:t>
+              <a:t>jstat</a:t>
+            </a:r>
+            <a:r>
+              <a:rPr lang="zh-CN" altLang="en-US" dirty="0"/>
+              <a:t>中</a:t>
+            </a:r>
+            <a:r>
+              <a:rPr lang="en-US" altLang="zh-CN" dirty="0" smtClean="0"/>
+              <a:t>FULL GC  + 2(why?)</a:t>
+            </a:r>
+          </a:p>
+          <a:p>
+            <a:pPr lvl="1"/>
+            <a:r>
+              <a:rPr lang="zh-CN" altLang="en-US" dirty="0" smtClean="0"/>
+              <a:t>避免</a:t>
+            </a:r>
+            <a:r>
+              <a:rPr lang="en-US" altLang="zh-CN" dirty="0" smtClean="0"/>
+              <a:t>FULL GC</a:t>
+            </a:r>
+            <a:r>
+              <a:rPr lang="zh-CN" altLang="en-US" dirty="0" smtClean="0"/>
+              <a:t>，调整</a:t>
+            </a:r>
+            <a:r>
+              <a:rPr lang="en-US" altLang="zh-CN" dirty="0" smtClean="0"/>
+              <a:t>CMS GC</a:t>
+            </a:r>
+            <a:r>
+              <a:rPr lang="zh-CN" altLang="en-US" dirty="0" smtClean="0"/>
+              <a:t>进行的时机，设置</a:t>
+            </a:r>
+            <a:r>
+              <a:rPr lang="en-US" altLang="zh-CN" dirty="0" smtClean="0"/>
+              <a:t>old gen</a:t>
+            </a:r>
+            <a:r>
+              <a:rPr lang="zh-CN" altLang="en-US" dirty="0" smtClean="0"/>
+              <a:t>大小满足剩余空间大于</a:t>
+            </a:r>
+            <a:r>
+              <a:rPr lang="en-US" altLang="zh-CN" dirty="0" smtClean="0"/>
+              <a:t>new gen</a:t>
+            </a:r>
+          </a:p>
+          <a:p>
+            <a:pPr lvl="1"/>
+            <a:r>
+              <a:rPr lang="zh-CN" altLang="en-US" dirty="0" smtClean="0"/>
+              <a:t>选择</a:t>
+            </a:r>
+            <a:r>
+              <a:rPr lang="en-US" altLang="zh-CN" dirty="0" smtClean="0"/>
+              <a:t>parallel </a:t>
             </a:r>
             <a:r>
               <a:rPr lang="en-US" altLang="zh-CN" dirty="0" err="1" smtClean="0"/>
               <a:t>gc</a:t>
             </a:r>
-            <a:endParaRPr lang="en-US" altLang="zh-CN" dirty="0" smtClean="0"/>
-          </a:p>
-          <a:p>
-            <a:pPr lvl="2"/>
-            <a:r>
-              <a:rPr lang="zh-CN" altLang="en-US" dirty="0" smtClean="0"/>
-              <a:t>启动文件在各个目录独立</a:t>
-            </a:r>
-          </a:p>
-          <a:p>
             <a:endParaRPr lang="zh-CN" altLang="en-US" dirty="0"/>
           </a:p>
         </p:txBody>
@@ -4141,77 +4362,67 @@
           <a:lstStyle/>
           <a:p>
             <a:r>
+              <a:rPr lang="en-US" altLang="zh-CN" dirty="0" err="1"/>
+              <a:t>ParallelOldGC</a:t>
+            </a:r>
+            <a:endParaRPr lang="zh-CN" altLang="en-US" dirty="0"/>
+          </a:p>
+        </p:txBody>
+      </p:sp>
+      <p:sp>
+        <p:nvSpPr>
+          <p:cNvPr id="3" name="内容占位符 2"/>
+          <p:cNvSpPr>
+            <a:spLocks noGrp="1"/>
+          </p:cNvSpPr>
+          <p:nvPr>
+            <p:ph idx="1"/>
+          </p:nvPr>
+        </p:nvSpPr>
+        <p:spPr/>
+        <p:txBody>
+          <a:bodyPr/>
+          <a:lstStyle/>
+          <a:p>
+            <a:r>
+              <a:rPr lang="en-US" altLang="zh-CN" dirty="0" smtClean="0"/>
+              <a:t>3G</a:t>
+            </a:r>
+            <a:r>
+              <a:rPr lang="zh-CN" altLang="en-US" dirty="0" smtClean="0"/>
+              <a:t>以下的</a:t>
+            </a:r>
+            <a:r>
+              <a:rPr lang="en-US" altLang="zh-CN" dirty="0" smtClean="0"/>
+              <a:t>heap</a:t>
+            </a:r>
+            <a:r>
+              <a:rPr lang="zh-CN" altLang="en-US" dirty="0" smtClean="0"/>
+              <a:t>应该选择</a:t>
+            </a:r>
+            <a:r>
               <a:rPr lang="en-US" altLang="zh-CN" dirty="0" err="1" smtClean="0"/>
-              <a:t>Gc</a:t>
-            </a:r>
-            <a:r>
-              <a:rPr lang="en-US" altLang="zh-CN" dirty="0" smtClean="0"/>
-              <a:t> </a:t>
-            </a:r>
-            <a:r>
-              <a:rPr lang="zh-CN" altLang="en-US" dirty="0" smtClean="0"/>
-              <a:t>日志分析</a:t>
-            </a:r>
-            <a:endParaRPr lang="zh-CN" altLang="en-US" dirty="0"/>
-          </a:p>
-        </p:txBody>
-      </p:sp>
-      <p:sp>
-        <p:nvSpPr>
-          <p:cNvPr id="3" name="内容占位符 2"/>
-          <p:cNvSpPr>
-            <a:spLocks noGrp="1"/>
-          </p:cNvSpPr>
-          <p:nvPr>
-            <p:ph idx="1"/>
-          </p:nvPr>
-        </p:nvSpPr>
-        <p:spPr/>
-        <p:txBody>
-          <a:bodyPr>
-            <a:normAutofit/>
-          </a:bodyPr>
-          <a:lstStyle/>
-          <a:p>
-            <a:r>
-              <a:rPr lang="zh-CN" altLang="en-US" dirty="0" smtClean="0"/>
-              <a:t>制造有用的</a:t>
-            </a:r>
-            <a:r>
-              <a:rPr lang="en-US" altLang="zh-CN" dirty="0" err="1" smtClean="0"/>
-              <a:t>gc</a:t>
-            </a:r>
-            <a:r>
-              <a:rPr lang="zh-CN" altLang="en-US" dirty="0" smtClean="0"/>
-              <a:t>日志</a:t>
+              <a:t>ParallelOldGC</a:t>
             </a:r>
             <a:endParaRPr lang="en-US" altLang="zh-CN" dirty="0" smtClean="0"/>
           </a:p>
           <a:p>
             <a:pPr lvl="1"/>
             <a:r>
-              <a:rPr lang="en-US" altLang="zh-CN" dirty="0" smtClean="0"/>
-              <a:t>-XX:+</a:t>
-            </a:r>
-            <a:r>
-              <a:rPr lang="en-US" altLang="zh-CN" dirty="0" err="1" smtClean="0"/>
-              <a:t>PrintGCDetails</a:t>
+              <a:rPr lang="zh-CN" altLang="en-US" dirty="0" smtClean="0"/>
+              <a:t>此时的暂停时间，完全可以处理得过来</a:t>
             </a:r>
             <a:endParaRPr lang="en-US" altLang="zh-CN" dirty="0" smtClean="0"/>
           </a:p>
           <a:p>
             <a:pPr lvl="1"/>
             <a:r>
-              <a:rPr lang="en-US" altLang="zh-CN" dirty="0"/>
-              <a:t>-</a:t>
-            </a:r>
-            <a:r>
-              <a:rPr lang="en-US" altLang="zh-CN" dirty="0" smtClean="0"/>
-              <a:t>XX:+</a:t>
-            </a:r>
-            <a:r>
-              <a:rPr lang="en-US" altLang="zh-CN" dirty="0" err="1" smtClean="0"/>
-              <a:t>PrintTenuringDistribution</a:t>
+              <a:rPr lang="en-US" altLang="zh-CN" dirty="0" smtClean="0"/>
+              <a:t>CMS</a:t>
+            </a:r>
+            <a:r>
+              <a:rPr lang="zh-CN" altLang="en-US" dirty="0" smtClean="0"/>
+              <a:t>的触发比例不好设置</a:t>
             </a:r>
             <a:endParaRPr lang="en-US" altLang="zh-CN" dirty="0" smtClean="0"/>
           </a:p>
@@ -4219,66 +4430,68 @@
             <a:pPr lvl="1"/>
             <a:r>
               <a:rPr lang="en-US" altLang="zh-CN" dirty="0" smtClean="0"/>
-              <a:t>-</a:t>
-            </a:r>
-            <a:r>
-              <a:rPr lang="en-US" altLang="zh-CN" dirty="0" err="1" smtClean="0"/>
-              <a:t>Xloggc</a:t>
-            </a:r>
-            <a:r>
-              <a:rPr lang="en-US" altLang="zh-CN" dirty="0" smtClean="0"/>
-              <a:t>:&lt;log file location&gt;</a:t>
+              <a:t>CMS</a:t>
+            </a:r>
+            <a:r>
+              <a:rPr lang="zh-CN" altLang="en-US" dirty="0" smtClean="0"/>
+              <a:t>的</a:t>
+            </a:r>
+            <a:r>
+              <a:rPr lang="en-US" altLang="zh-CN" dirty="0" smtClean="0"/>
+              <a:t>YGC</a:t>
+            </a:r>
+            <a:r>
+              <a:rPr lang="zh-CN" altLang="en-US" dirty="0" smtClean="0"/>
+              <a:t>慢 ： </a:t>
+            </a:r>
+            <a:r>
+              <a:rPr lang="en-US" altLang="zh-CN" dirty="0" smtClean="0"/>
+              <a:t>CMS</a:t>
+            </a:r>
+            <a:r>
+              <a:rPr lang="zh-CN" altLang="en-US" dirty="0" smtClean="0"/>
+              <a:t>实现复杂，</a:t>
+            </a:r>
+            <a:r>
+              <a:rPr lang="en-US" altLang="zh-CN" dirty="0" smtClean="0"/>
+              <a:t>PLAB &gt;&gt; TLAB</a:t>
             </a:r>
           </a:p>
           <a:p>
             <a:pPr lvl="1"/>
             <a:r>
-              <a:rPr lang="en-US" dirty="0"/>
-              <a:t>-XX:+</a:t>
-            </a:r>
-            <a:r>
-              <a:rPr lang="en-US" dirty="0" err="1" smtClean="0"/>
-              <a:t>PrintGCDateStamps</a:t>
-            </a:r>
-            <a:endParaRPr lang="en-US" altLang="zh-CN" dirty="0" smtClean="0"/>
-          </a:p>
-          <a:p>
-            <a:r>
-              <a:rPr lang="zh-CN" altLang="en-US" dirty="0" smtClean="0"/>
-              <a:t>工具</a:t>
-            </a:r>
-            <a:endParaRPr lang="en-US" altLang="zh-CN" dirty="0"/>
+              <a:rPr lang="en-US" altLang="zh-CN" dirty="0" smtClean="0"/>
+              <a:t>CMS GC</a:t>
+            </a:r>
+            <a:r>
+              <a:rPr lang="zh-CN" altLang="en-US" dirty="0" smtClean="0"/>
+              <a:t>（大部分时间并发）抢占</a:t>
+            </a:r>
+            <a:r>
+              <a:rPr lang="en-US" altLang="zh-CN" dirty="0" smtClean="0"/>
+              <a:t>CPU</a:t>
+            </a:r>
           </a:p>
           <a:p>
             <a:pPr lvl="1"/>
             <a:r>
-              <a:rPr lang="en-US" altLang="zh-CN" dirty="0" smtClean="0">
-                <a:hlinkClick r:id="rId2"/>
-              </a:rPr>
-              <a:t>http://gceasy.io</a:t>
-            </a:r>
-            <a:endParaRPr lang="en-US" altLang="zh-CN" dirty="0" smtClean="0"/>
-          </a:p>
-          <a:p>
-            <a:pPr lvl="1"/>
-            <a:r>
-              <a:rPr lang="en-US" altLang="zh-CN" dirty="0" err="1" smtClean="0"/>
-              <a:t>Gclogviewer</a:t>
-            </a:r>
-            <a:endParaRPr lang="en-US" altLang="zh-CN" dirty="0" smtClean="0"/>
-          </a:p>
-          <a:p>
-            <a:pPr lvl="1">
-              <a:buNone/>
-            </a:pPr>
-            <a:endParaRPr lang="en-US" altLang="zh-CN" dirty="0" smtClean="0"/>
-          </a:p>
-          <a:p>
-            <a:endParaRPr lang="zh-CN" altLang="en-US" dirty="0"/>
+              <a:rPr lang="en-US" altLang="zh-CN" dirty="0" smtClean="0"/>
+              <a:t>CMS GC </a:t>
+            </a:r>
+            <a:r>
+              <a:rPr lang="zh-CN" altLang="en-US" dirty="0" smtClean="0"/>
+              <a:t>低吞吐量</a:t>
+            </a:r>
+            <a:endParaRPr lang="en-US" altLang="zh-CN" dirty="0" smtClean="0"/>
           </a:p>
         </p:txBody>
       </p:sp>
     </p:spTree>
+    <p:extLst>
+      <p:ext uri="{BB962C8B-B14F-4D97-AF65-F5344CB8AC3E}">
+        <p14:creationId xmlns:p14="http://schemas.microsoft.com/office/powerpoint/2010/main" val="1661879559"/>
+      </p:ext>
+    </p:extLst>
   </p:cSld>
   <p:clrMapOvr>
     <a:masterClrMapping/>
@@ -4319,8 +4532,8 @@
           <a:lstStyle/>
           <a:p>
             <a:r>
-              <a:rPr lang="zh-CN" altLang="en-US" dirty="0" smtClean="0"/>
-              <a:t>代码调优</a:t>
+              <a:rPr lang="en-US" altLang="zh-CN" dirty="0" smtClean="0"/>
+              <a:t>GC IN 58</a:t>
             </a:r>
             <a:endParaRPr lang="zh-CN" altLang="en-US" dirty="0"/>
           </a:p>
@@ -4338,10 +4551,204 @@
         </p:nvSpPr>
         <p:spPr/>
         <p:txBody>
-          <a:bodyPr/>
-          <a:lstStyle/>
-          <a:p>
-            <a:endParaRPr lang="zh-CN" altLang="en-US"/>
+          <a:bodyPr>
+            <a:normAutofit fontScale="92500" lnSpcReduction="20000"/>
+          </a:bodyPr>
+          <a:lstStyle/>
+          <a:p>
+            <a:r>
+              <a:rPr lang="en-US" altLang="zh-CN" dirty="0" err="1" smtClean="0"/>
+              <a:t>Gc</a:t>
+            </a:r>
+            <a:r>
+              <a:rPr lang="en-US" altLang="zh-CN" dirty="0" smtClean="0"/>
+              <a:t> in 58</a:t>
+            </a:r>
+          </a:p>
+          <a:p>
+            <a:pPr lvl="1"/>
+            <a:r>
+              <a:rPr lang="en-US" altLang="zh-CN" dirty="0" smtClean="0"/>
+              <a:t>All </a:t>
+            </a:r>
+            <a:r>
+              <a:rPr lang="en-US" altLang="zh-CN" dirty="0" err="1" smtClean="0"/>
+              <a:t>scf</a:t>
+            </a:r>
+            <a:r>
+              <a:rPr lang="en-US" altLang="zh-CN" dirty="0" smtClean="0"/>
+              <a:t> run in </a:t>
+            </a:r>
+            <a:r>
+              <a:rPr lang="en-US" altLang="zh-CN" dirty="0" err="1" smtClean="0"/>
+              <a:t>cms</a:t>
+            </a:r>
+            <a:r>
+              <a:rPr lang="en-US" altLang="zh-CN" dirty="0" smtClean="0"/>
+              <a:t> </a:t>
+            </a:r>
+            <a:r>
+              <a:rPr lang="en-US" altLang="zh-CN" dirty="0" err="1" smtClean="0"/>
+              <a:t>gc</a:t>
+            </a:r>
+            <a:endParaRPr lang="en-US" altLang="zh-CN" dirty="0" smtClean="0"/>
+          </a:p>
+          <a:p>
+            <a:pPr lvl="2"/>
+            <a:r>
+              <a:rPr lang="zh-CN" altLang="en-US" dirty="0" smtClean="0"/>
+              <a:t>参数固定在 </a:t>
+            </a:r>
+            <a:r>
+              <a:rPr lang="en-US" altLang="zh-CN" dirty="0" err="1" smtClean="0"/>
+              <a:t>scf</a:t>
+            </a:r>
+            <a:r>
+              <a:rPr lang="en-US" altLang="zh-CN" dirty="0" smtClean="0"/>
+              <a:t> </a:t>
+            </a:r>
+            <a:r>
+              <a:rPr lang="zh-CN" altLang="en-US" dirty="0" smtClean="0"/>
+              <a:t>启动脚本</a:t>
+            </a:r>
+            <a:r>
+              <a:rPr lang="zh-CN" altLang="en-US" dirty="0" smtClean="0"/>
+              <a:t>中</a:t>
+            </a:r>
+            <a:endParaRPr lang="en-US" altLang="zh-CN" dirty="0" smtClean="0"/>
+          </a:p>
+          <a:p>
+            <a:pPr lvl="2"/>
+            <a:r>
+              <a:rPr lang="en-US" altLang="zh-CN" dirty="0"/>
+              <a:t> </a:t>
+            </a:r>
+            <a:r>
+              <a:rPr lang="zh-CN" altLang="en-US" dirty="0" smtClean="0"/>
+              <a:t>现状</a:t>
+            </a:r>
+            <a:endParaRPr lang="en-US" altLang="zh-CN" dirty="0"/>
+          </a:p>
+          <a:p>
+            <a:pPr lvl="3"/>
+            <a:r>
+              <a:rPr lang="zh-CN" altLang="en-US" dirty="0" smtClean="0"/>
+              <a:t>禁用</a:t>
+            </a:r>
+            <a:r>
+              <a:rPr lang="en-US" altLang="zh-CN" dirty="0" smtClean="0"/>
+              <a:t>S</a:t>
+            </a:r>
+            <a:r>
+              <a:rPr lang="zh-CN" altLang="en-US" dirty="0" smtClean="0"/>
+              <a:t>区</a:t>
+            </a:r>
+            <a:endParaRPr lang="en-US" altLang="zh-CN" dirty="0" smtClean="0"/>
+          </a:p>
+          <a:p>
+            <a:pPr lvl="3"/>
+            <a:r>
+              <a:rPr lang="zh-CN" altLang="en-US" dirty="0" smtClean="0"/>
+              <a:t>晋升阈值：</a:t>
+            </a:r>
+            <a:r>
+              <a:rPr lang="en-US" altLang="zh-CN" dirty="0" smtClean="0"/>
+              <a:t>0</a:t>
+            </a:r>
+          </a:p>
+          <a:p>
+            <a:pPr lvl="3"/>
+            <a:r>
+              <a:rPr lang="zh-CN" altLang="en-US" dirty="0" smtClean="0"/>
+              <a:t>统一触发比率：</a:t>
+            </a:r>
+            <a:r>
+              <a:rPr lang="en-US" altLang="zh-CN" dirty="0" smtClean="0"/>
+              <a:t>80%</a:t>
+            </a:r>
+            <a:endParaRPr lang="en-US" altLang="zh-CN" dirty="0" smtClean="0"/>
+          </a:p>
+          <a:p>
+            <a:pPr lvl="2"/>
+            <a:r>
+              <a:rPr lang="zh-CN" altLang="en-US" dirty="0" smtClean="0"/>
+              <a:t>改进</a:t>
+            </a:r>
+            <a:r>
+              <a:rPr lang="zh-CN" altLang="en-US" dirty="0" smtClean="0"/>
+              <a:t>点</a:t>
+            </a:r>
+            <a:endParaRPr lang="en-US" altLang="zh-CN" dirty="0" smtClean="0"/>
+          </a:p>
+          <a:p>
+            <a:pPr lvl="3"/>
+            <a:r>
+              <a:rPr lang="zh-CN" altLang="en-US" smtClean="0"/>
+              <a:t>修复回正常的参数</a:t>
+            </a:r>
+            <a:endParaRPr lang="en-US" altLang="zh-CN" dirty="0" smtClean="0"/>
+          </a:p>
+          <a:p>
+            <a:pPr lvl="3"/>
+            <a:r>
+              <a:rPr lang="zh-CN" altLang="en-US" dirty="0" smtClean="0"/>
+              <a:t>根据服务来选择</a:t>
+            </a:r>
+            <a:r>
+              <a:rPr lang="en-US" altLang="zh-CN" dirty="0" err="1" smtClean="0"/>
+              <a:t>jvm</a:t>
+            </a:r>
+            <a:r>
+              <a:rPr lang="zh-CN" altLang="en-US" dirty="0" smtClean="0"/>
+              <a:t>参数</a:t>
+            </a:r>
+            <a:endParaRPr lang="en-US" altLang="zh-CN" dirty="0" smtClean="0"/>
+          </a:p>
+          <a:p>
+            <a:pPr lvl="3"/>
+            <a:r>
+              <a:rPr lang="zh-CN" altLang="en-US" dirty="0" smtClean="0"/>
+              <a:t>去掉无用选项和默认开启的选项，以免造成困惑</a:t>
+            </a:r>
+            <a:endParaRPr lang="en-US" altLang="zh-CN" dirty="0" smtClean="0"/>
+          </a:p>
+          <a:p>
+            <a:pPr lvl="1"/>
+            <a:r>
+              <a:rPr lang="en-US" altLang="zh-CN" dirty="0" smtClean="0"/>
+              <a:t>All </a:t>
+            </a:r>
+            <a:r>
+              <a:rPr lang="en-US" altLang="zh-CN" dirty="0" err="1" smtClean="0"/>
+              <a:t>wf</a:t>
+            </a:r>
+            <a:r>
+              <a:rPr lang="en-US" altLang="zh-CN" dirty="0" smtClean="0"/>
+              <a:t> run in </a:t>
+            </a:r>
+            <a:r>
+              <a:rPr lang="en-US" altLang="zh-CN" dirty="0" err="1" smtClean="0"/>
+              <a:t>cms</a:t>
+            </a:r>
+            <a:r>
+              <a:rPr lang="en-US" altLang="zh-CN" dirty="0" smtClean="0"/>
+              <a:t> </a:t>
+            </a:r>
+            <a:r>
+              <a:rPr lang="en-US" altLang="zh-CN" dirty="0" err="1" smtClean="0"/>
+              <a:t>gc</a:t>
+            </a:r>
+            <a:endParaRPr lang="en-US" altLang="zh-CN" dirty="0" smtClean="0"/>
+          </a:p>
+          <a:p>
+            <a:pPr lvl="2"/>
+            <a:r>
+              <a:rPr lang="zh-CN" altLang="en-US" dirty="0" smtClean="0"/>
+              <a:t>启动文件在各个目录独立</a:t>
+            </a:r>
+          </a:p>
+          <a:p>
+            <a:endParaRPr lang="zh-CN" altLang="en-US" dirty="0"/>
           </a:p>
         </p:txBody>
       </p:sp>
@@ -4386,8 +4793,16 @@
           <a:lstStyle/>
           <a:p>
             <a:r>
-              <a:rPr lang="en-US" altLang="zh-CN" dirty="0" smtClean="0"/>
-              <a:t>Less is more</a:t>
+              <a:rPr lang="en-US" altLang="zh-CN" dirty="0" err="1" smtClean="0"/>
+              <a:t>Gc</a:t>
+            </a:r>
+            <a:r>
+              <a:rPr lang="en-US" altLang="zh-CN" dirty="0" smtClean="0"/>
+              <a:t> </a:t>
+            </a:r>
+            <a:r>
+              <a:rPr lang="zh-CN" altLang="en-US" dirty="0" smtClean="0"/>
+              <a:t>日志分析</a:t>
             </a:r>
             <a:endParaRPr lang="zh-CN" altLang="en-US" dirty="0"/>
           </a:p>
@@ -4406,51 +4821,111 @@
         <p:spPr/>
         <p:txBody>
           <a:bodyPr>
-            <a:normAutofit fontScale="92500"/>
+            <a:normAutofit/>
           </a:bodyPr>
           <a:lstStyle/>
           <a:p>
             <a:r>
               <a:rPr lang="zh-CN" altLang="en-US" dirty="0" smtClean="0"/>
-              <a:t>避免过早优化</a:t>
-            </a:r>
-            <a:endParaRPr lang="en-US" altLang="zh-CN" dirty="0" smtClean="0"/>
-          </a:p>
-          <a:p>
-            <a:r>
-              <a:rPr lang="zh-CN" altLang="en-US" dirty="0" smtClean="0"/>
-              <a:t>“过早优化”</a:t>
+              <a:t>制造有用的</a:t>
+            </a:r>
+            <a:r>
+              <a:rPr lang="en-US" altLang="zh-CN" dirty="0" err="1" smtClean="0"/>
+              <a:t>gc</a:t>
+            </a:r>
+            <a:r>
+              <a:rPr lang="zh-CN" altLang="en-US" dirty="0" smtClean="0"/>
+              <a:t>日志</a:t>
             </a:r>
             <a:endParaRPr lang="en-US" altLang="zh-CN" dirty="0" smtClean="0"/>
           </a:p>
           <a:p>
             <a:pPr lvl="1"/>
             <a:r>
-              <a:rPr lang="zh-CN" altLang="en-US" dirty="0" smtClean="0"/>
-              <a:t>按照正确的方式写代码不算过早优化，反而是最佳实践</a:t>
-            </a:r>
-            <a:endParaRPr lang="en-US" altLang="zh-CN" dirty="0" smtClean="0"/>
-          </a:p>
-          <a:p>
-            <a:r>
-              <a:rPr lang="zh-CN" altLang="en-US" dirty="0" smtClean="0"/>
-              <a:t>始终编写清晰、代码少的程序</a:t>
+              <a:rPr lang="en-US" altLang="zh-CN" dirty="0" smtClean="0"/>
+              <a:t>-XX:+</a:t>
+            </a:r>
+            <a:r>
+              <a:rPr lang="en-US" altLang="zh-CN" dirty="0" err="1" smtClean="0"/>
+              <a:t>PrintGCDetails</a:t>
             </a:r>
             <a:endParaRPr lang="en-US" altLang="zh-CN" dirty="0" smtClean="0"/>
           </a:p>
           <a:p>
             <a:pPr lvl="1"/>
             <a:r>
-              <a:rPr lang="zh-CN" altLang="en-US" dirty="0" smtClean="0"/>
-              <a:t>代码越长，程序编译越慢，启动时间越长，要创建和销毁的东西越多，垃圾回收的工作量越大。</a:t>
-            </a:r>
-            <a:endParaRPr lang="en-US" altLang="zh-CN" dirty="0" smtClean="0"/>
-          </a:p>
-          <a:p>
-            <a:r>
-              <a:rPr lang="zh-CN" altLang="en-US" dirty="0" smtClean="0"/>
-              <a:t>积少成多：最终的优化效果由大量细微的优化累积而成</a:t>
-            </a:r>
+              <a:rPr lang="en-US" altLang="zh-CN" dirty="0"/>
+              <a:t>-</a:t>
+            </a:r>
+            <a:r>
+              <a:rPr lang="en-US" altLang="zh-CN" dirty="0" smtClean="0"/>
+              <a:t>XX:+</a:t>
+            </a:r>
+            <a:r>
+              <a:rPr lang="en-US" altLang="zh-CN" dirty="0" err="1" smtClean="0"/>
+              <a:t>PrintTenuringDistribution</a:t>
+            </a:r>
+            <a:endParaRPr lang="en-US" altLang="zh-CN" dirty="0" smtClean="0"/>
+          </a:p>
+          <a:p>
+            <a:pPr lvl="1"/>
+            <a:r>
+              <a:rPr lang="en-US" altLang="zh-CN" dirty="0" smtClean="0"/>
+              <a:t>-</a:t>
+            </a:r>
+            <a:r>
+              <a:rPr lang="en-US" altLang="zh-CN" dirty="0" err="1" smtClean="0"/>
+              <a:t>Xloggc</a:t>
+            </a:r>
+            <a:r>
+              <a:rPr lang="en-US" altLang="zh-CN" dirty="0" smtClean="0"/>
+              <a:t>:&lt;log file location&gt;</a:t>
+            </a:r>
+          </a:p>
+          <a:p>
+            <a:pPr lvl="1"/>
+            <a:r>
+              <a:rPr lang="en-US" dirty="0"/>
+              <a:t>-XX:+</a:t>
+            </a:r>
+            <a:r>
+              <a:rPr lang="en-US" dirty="0" err="1" smtClean="0"/>
+              <a:t>PrintGCDateStamps</a:t>
+            </a:r>
+            <a:endParaRPr lang="en-US" altLang="zh-CN" dirty="0" smtClean="0"/>
+          </a:p>
+          <a:p>
+            <a:r>
+              <a:rPr lang="zh-CN" altLang="en-US" dirty="0" smtClean="0"/>
+              <a:t>工具</a:t>
+            </a:r>
+            <a:endParaRPr lang="en-US" altLang="zh-CN" dirty="0"/>
+          </a:p>
+          <a:p>
+            <a:pPr lvl="1"/>
+            <a:r>
+              <a:rPr lang="en-US" altLang="zh-CN" dirty="0" smtClean="0">
+                <a:hlinkClick r:id="rId2"/>
+              </a:rPr>
+              <a:t>http://gceasy.io</a:t>
+            </a:r>
+            <a:endParaRPr lang="en-US" altLang="zh-CN" dirty="0" smtClean="0"/>
+          </a:p>
+          <a:p>
+            <a:pPr lvl="1"/>
+            <a:r>
+              <a:rPr lang="en-US" altLang="zh-CN" dirty="0" err="1" smtClean="0"/>
+              <a:t>Gclogviewer</a:t>
+            </a:r>
+            <a:endParaRPr lang="en-US" altLang="zh-CN" dirty="0" smtClean="0"/>
+          </a:p>
+          <a:p>
+            <a:pPr lvl="1">
+              <a:buNone/>
+            </a:pPr>
+            <a:endParaRPr lang="en-US" altLang="zh-CN" dirty="0" smtClean="0"/>
+          </a:p>
+          <a:p>
             <a:endParaRPr lang="zh-CN" altLang="en-US" dirty="0"/>
           </a:p>
         </p:txBody>
@@ -4577,151 +5052,41 @@
           <a:p>
             <a:r>
               <a:rPr lang="zh-CN" altLang="en-US" dirty="0" smtClean="0"/>
-              <a:t>集合类的使用</a:t>
+              <a:t>代码调优</a:t>
             </a:r>
             <a:endParaRPr lang="zh-CN" altLang="en-US" dirty="0"/>
           </a:p>
         </p:txBody>
       </p:sp>
-      <p:sp>
-        <p:nvSpPr>
-          <p:cNvPr id="3" name="内容占位符 2"/>
-          <p:cNvSpPr>
-            <a:spLocks noGrp="1"/>
-          </p:cNvSpPr>
+      <p:pic>
+        <p:nvPicPr>
+          <p:cNvPr id="4" name="内容占位符 3"/>
+          <p:cNvPicPr>
+            <a:picLocks noGrp="1" noChangeAspect="1"/>
+          </p:cNvPicPr>
           <p:nvPr>
             <p:ph idx="1"/>
           </p:nvPr>
-        </p:nvSpPr>
-        <p:spPr/>
-        <p:txBody>
-          <a:bodyPr>
-            <a:normAutofit fontScale="92500" lnSpcReduction="10000"/>
-          </a:bodyPr>
-          <a:lstStyle/>
-          <a:p>
-            <a:r>
-              <a:rPr lang="zh-CN" altLang="en-US" dirty="0" smtClean="0"/>
-              <a:t>预先分配空间</a:t>
-            </a:r>
-            <a:endParaRPr lang="en-US" altLang="zh-CN" dirty="0" smtClean="0"/>
-          </a:p>
-          <a:p>
-            <a:pPr lvl="1"/>
-            <a:r>
-              <a:rPr lang="zh-CN" altLang="en-US" dirty="0" smtClean="0"/>
-              <a:t>避免底层数组的扩容</a:t>
-            </a:r>
-            <a:endParaRPr lang="en-US" altLang="zh-CN" dirty="0" smtClean="0"/>
-          </a:p>
-          <a:p>
-            <a:pPr lvl="1"/>
-            <a:r>
-              <a:rPr lang="zh-CN" altLang="en-US" dirty="0" smtClean="0"/>
-              <a:t>避免</a:t>
-            </a:r>
-            <a:r>
-              <a:rPr lang="en-US" altLang="zh-CN" dirty="0" smtClean="0"/>
-              <a:t>map</a:t>
-            </a:r>
-            <a:r>
-              <a:rPr lang="zh-CN" altLang="en-US" dirty="0" smtClean="0"/>
-              <a:t>的</a:t>
-            </a:r>
-            <a:r>
-              <a:rPr lang="en-US" altLang="zh-CN" dirty="0" smtClean="0"/>
-              <a:t>resize</a:t>
-            </a:r>
-            <a:r>
-              <a:rPr lang="zh-CN" altLang="en-US" dirty="0" smtClean="0"/>
-              <a:t>和</a:t>
-            </a:r>
-            <a:r>
-              <a:rPr lang="en-US" altLang="zh-CN" dirty="0" smtClean="0"/>
-              <a:t>remap</a:t>
-            </a:r>
-          </a:p>
-          <a:p>
-            <a:r>
-              <a:rPr lang="en-US" altLang="zh-CN" dirty="0" smtClean="0"/>
-              <a:t>Contains</a:t>
-            </a:r>
-          </a:p>
-          <a:p>
-            <a:pPr lvl="1"/>
-            <a:r>
-              <a:rPr lang="zh-CN" altLang="en-US" dirty="0" smtClean="0"/>
-              <a:t>避免在</a:t>
-            </a:r>
-            <a:r>
-              <a:rPr lang="en-US" altLang="zh-CN" dirty="0" smtClean="0"/>
-              <a:t>list</a:t>
-            </a:r>
-            <a:r>
-              <a:rPr lang="zh-CN" altLang="en-US" dirty="0" smtClean="0"/>
-              <a:t>上使用， 尽量用</a:t>
-            </a:r>
-            <a:r>
-              <a:rPr lang="en-US" altLang="zh-CN" dirty="0" smtClean="0"/>
-              <a:t>Map</a:t>
-            </a:r>
-          </a:p>
-          <a:p>
-            <a:pPr marL="342900" lvl="1" indent="-342900">
-              <a:buFont typeface="Arial" pitchFamily="34" charset="0"/>
-              <a:buChar char="•"/>
-            </a:pPr>
-            <a:r>
-              <a:rPr lang="zh-CN" altLang="en-US" sz="3200" dirty="0"/>
-              <a:t>使用</a:t>
-            </a:r>
-            <a:r>
-              <a:rPr lang="en-US" altLang="zh-CN" sz="3200" dirty="0"/>
-              <a:t>guava </a:t>
-            </a:r>
-            <a:r>
-              <a:rPr lang="en-US" altLang="zh-CN" sz="3200" dirty="0" smtClean="0"/>
-              <a:t>collections</a:t>
-            </a:r>
-          </a:p>
-          <a:p>
-            <a:pPr marL="742950" lvl="2" indent="-342900"/>
-            <a:r>
-              <a:rPr lang="en-US" altLang="zh-CN" dirty="0" err="1" smtClean="0"/>
-              <a:t>Multimap</a:t>
-            </a:r>
-            <a:endParaRPr lang="en-US" altLang="zh-CN" dirty="0" smtClean="0"/>
-          </a:p>
-          <a:p>
-            <a:pPr marL="742950" lvl="2" indent="-342900"/>
-            <a:r>
-              <a:rPr lang="en-US" altLang="zh-CN" dirty="0" err="1" smtClean="0"/>
-              <a:t>Multiset</a:t>
-            </a:r>
-            <a:endParaRPr lang="en-US" altLang="zh-CN" dirty="0" smtClean="0"/>
-          </a:p>
-          <a:p>
-            <a:pPr marL="742950" lvl="2" indent="-342900"/>
-            <a:r>
-              <a:rPr lang="en-US" altLang="zh-CN" dirty="0" err="1" smtClean="0"/>
-              <a:t>Tablemap</a:t>
-            </a:r>
-            <a:endParaRPr lang="en-US" altLang="zh-CN" dirty="0" smtClean="0"/>
-          </a:p>
-          <a:p>
-            <a:pPr marL="342900" lvl="2" indent="-342900"/>
-            <a:r>
-              <a:rPr lang="en-US" altLang="zh-CN" sz="3200" dirty="0" smtClean="0"/>
-              <a:t>Case</a:t>
-            </a:r>
-            <a:r>
-              <a:rPr lang="zh-CN" altLang="en-US" sz="3200" dirty="0" smtClean="0"/>
-              <a:t>！</a:t>
-            </a:r>
-            <a:endParaRPr lang="zh-CN" altLang="en-US" sz="3200" dirty="0"/>
-          </a:p>
-        </p:txBody>
-      </p:sp>
+        </p:nvPicPr>
+        <p:blipFill>
+          <a:blip r:embed="rId2">
+            <a:extLst>
+              <a:ext uri="{28A0092B-C50C-407E-A947-70E740481C1C}">
+                <a14:useLocalDpi xmlns:a14="http://schemas.microsoft.com/office/drawing/2010/main" val="0"/>
+              </a:ext>
+            </a:extLst>
+          </a:blip>
+          <a:stretch>
+            <a:fillRect/>
+          </a:stretch>
+        </p:blipFill>
+        <p:spPr>
+          <a:xfrm>
+            <a:off x="539552" y="1916832"/>
+            <a:ext cx="3368040" cy="3238500"/>
+          </a:xfrm>
+        </p:spPr>
+      </p:pic>
     </p:spTree>
   </p:cSld>
   <p:clrMapOvr>
@@ -4763,16 +5128,8 @@
           <a:lstStyle/>
           <a:p>
             <a:r>
-              <a:rPr lang="zh-CN" altLang="en-US" dirty="0" smtClean="0"/>
-              <a:t>面向</a:t>
-            </a:r>
-            <a:r>
-              <a:rPr lang="en-US" altLang="zh-CN" dirty="0" err="1" smtClean="0"/>
-              <a:t>gc</a:t>
-            </a:r>
-            <a:r>
-              <a:rPr lang="zh-CN" altLang="en-US" dirty="0" smtClean="0"/>
-              <a:t>的编程</a:t>
+              <a:rPr lang="en-US" altLang="zh-CN" dirty="0" smtClean="0"/>
+              <a:t>Less is more</a:t>
             </a:r>
             <a:endParaRPr lang="zh-CN" altLang="en-US" dirty="0"/>
           </a:p>
@@ -4790,20 +5147,21 @@
         </p:nvSpPr>
         <p:spPr/>
         <p:txBody>
-          <a:bodyPr/>
-          <a:lstStyle/>
-          <a:p>
-            <a:r>
-              <a:rPr lang="zh-CN" altLang="en-US" dirty="0" smtClean="0"/>
-              <a:t>降低</a:t>
-            </a:r>
-            <a:r>
-              <a:rPr lang="en-US" altLang="zh-CN" dirty="0" err="1" smtClean="0"/>
-              <a:t>gc</a:t>
-            </a:r>
-            <a:r>
-              <a:rPr lang="zh-CN" altLang="en-US" dirty="0" smtClean="0"/>
-              <a:t>频率</a:t>
+          <a:bodyPr>
+            <a:normAutofit fontScale="92500"/>
+          </a:bodyPr>
+          <a:lstStyle/>
+          <a:p>
+            <a:r>
+              <a:rPr lang="zh-CN" altLang="en-US" dirty="0" smtClean="0"/>
+              <a:t>避免过早优化</a:t>
+            </a:r>
+            <a:endParaRPr lang="en-US" altLang="zh-CN" dirty="0" smtClean="0"/>
+          </a:p>
+          <a:p>
+            <a:r>
+              <a:rPr lang="zh-CN" altLang="en-US" dirty="0" smtClean="0"/>
+              <a:t>“过早优化”</a:t>
             </a:r>
             <a:endParaRPr lang="en-US" altLang="zh-CN" dirty="0" smtClean="0"/>
           </a:p>
@@ -4811,32 +5169,31 @@
             <a:pPr lvl="1"/>
             <a:r>
               <a:rPr lang="zh-CN" altLang="en-US" dirty="0" smtClean="0"/>
-              <a:t>没有买卖就没有杀害，没有垃圾就没有垃圾回收，没有垃圾回收旧没有万物静止。</a:t>
-            </a:r>
-            <a:endParaRPr lang="en-US" altLang="zh-CN" dirty="0" smtClean="0"/>
-          </a:p>
-          <a:p>
-            <a:pPr marL="342900" lvl="1" indent="-342900">
-              <a:buFont typeface="Arial" pitchFamily="34" charset="0"/>
-              <a:buChar char="•"/>
-            </a:pPr>
-            <a:r>
-              <a:rPr lang="zh-CN" altLang="en-US" sz="3200" dirty="0" smtClean="0"/>
-              <a:t>降低内存分配</a:t>
-            </a:r>
-            <a:endParaRPr lang="en-US" altLang="zh-CN" sz="3200" dirty="0" smtClean="0"/>
-          </a:p>
-          <a:p>
-            <a:pPr marL="742950" lvl="2" indent="-342900"/>
-            <a:r>
-              <a:rPr lang="zh-CN" altLang="en-US" dirty="0" smtClean="0"/>
-              <a:t>数据类型的选择</a:t>
-            </a:r>
-            <a:endParaRPr lang="en-US" altLang="zh-CN" dirty="0" smtClean="0"/>
-          </a:p>
-          <a:p>
-            <a:pPr marL="742950" lvl="2" indent="-342900"/>
-            <a:endParaRPr lang="en-US" altLang="zh-CN" dirty="0" smtClean="0"/>
+              <a:t>按照正确的方式写代码不算过早优化，反而是最佳实践</a:t>
+            </a:r>
+            <a:endParaRPr lang="en-US" altLang="zh-CN" dirty="0" smtClean="0"/>
+          </a:p>
+          <a:p>
+            <a:r>
+              <a:rPr lang="zh-CN" altLang="en-US" dirty="0" smtClean="0"/>
+              <a:t>始终编写清晰、代码少的程序</a:t>
+            </a:r>
+            <a:endParaRPr lang="en-US" altLang="zh-CN" dirty="0" smtClean="0"/>
+          </a:p>
+          <a:p>
+            <a:pPr lvl="1"/>
+            <a:r>
+              <a:rPr lang="zh-CN" altLang="en-US" dirty="0" smtClean="0"/>
+              <a:t>代码越长，程序编译越慢，启动时间越长，要创建和销毁的东西越多，垃圾回收的工作量越大。</a:t>
+            </a:r>
+            <a:endParaRPr lang="en-US" altLang="zh-CN" dirty="0" smtClean="0"/>
+          </a:p>
+          <a:p>
+            <a:r>
+              <a:rPr lang="zh-CN" altLang="en-US" dirty="0" smtClean="0"/>
+              <a:t>积少成多：最终的优化效果由大量细微的优化累积而成</a:t>
+            </a:r>
+            <a:endParaRPr lang="zh-CN" altLang="en-US" dirty="0"/>
           </a:p>
         </p:txBody>
       </p:sp>
@@ -4882,15 +5239,7 @@
           <a:p>
             <a:r>
               <a:rPr lang="zh-CN" altLang="en-US" dirty="0" smtClean="0"/>
-              <a:t>面向</a:t>
-            </a:r>
-            <a:r>
-              <a:rPr lang="en-US" altLang="zh-CN" dirty="0" smtClean="0"/>
-              <a:t>GC</a:t>
-            </a:r>
-            <a:r>
-              <a:rPr lang="zh-CN" altLang="en-US" dirty="0" smtClean="0"/>
-              <a:t>的编程</a:t>
+              <a:t>集合类的使用</a:t>
             </a:r>
             <a:endParaRPr lang="zh-CN" altLang="en-US" dirty="0"/>
           </a:p>
@@ -4909,13 +5258,13 @@
         <p:spPr/>
         <p:txBody>
           <a:bodyPr>
-            <a:normAutofit lnSpcReduction="10000"/>
+            <a:normAutofit fontScale="92500" lnSpcReduction="10000"/>
           </a:bodyPr>
           <a:lstStyle/>
           <a:p>
             <a:r>
               <a:rPr lang="zh-CN" altLang="en-US" dirty="0" smtClean="0"/>
-              <a:t>降低内存分配</a:t>
+              <a:t>预先分配空间</a:t>
             </a:r>
             <a:endParaRPr lang="en-US" altLang="zh-CN" dirty="0" smtClean="0"/>
           </a:p>
@@ -4923,146 +5272,115 @@
             <a:pPr lvl="1"/>
             <a:r>
               <a:rPr lang="zh-CN" altLang="en-US" dirty="0" smtClean="0"/>
-              <a:t>使用占用更小的数据类型</a:t>
-            </a:r>
-            <a:endParaRPr lang="en-US" altLang="zh-CN" dirty="0" smtClean="0"/>
-          </a:p>
-          <a:p>
-            <a:pPr lvl="2"/>
-            <a:r>
-              <a:rPr lang="en-US" altLang="zh-CN" dirty="0" err="1"/>
-              <a:t>i</a:t>
-            </a:r>
+              <a:t>避免底层数组的扩容</a:t>
+            </a:r>
+            <a:endParaRPr lang="en-US" altLang="zh-CN" dirty="0" smtClean="0"/>
+          </a:p>
+          <a:p>
+            <a:pPr lvl="1"/>
+            <a:r>
+              <a:rPr lang="zh-CN" altLang="en-US" dirty="0" smtClean="0"/>
+              <a:t>避免</a:t>
+            </a:r>
+            <a:r>
+              <a:rPr lang="en-US" altLang="zh-CN" dirty="0" smtClean="0"/>
+              <a:t>map</a:t>
+            </a:r>
+            <a:r>
+              <a:rPr lang="zh-CN" altLang="en-US" dirty="0" smtClean="0"/>
+              <a:t>的</a:t>
+            </a:r>
+            <a:r>
+              <a:rPr lang="en-US" altLang="zh-CN" dirty="0" smtClean="0"/>
+              <a:t>resize</a:t>
+            </a:r>
+            <a:r>
+              <a:rPr lang="zh-CN" altLang="en-US" dirty="0" smtClean="0"/>
+              <a:t>和</a:t>
+            </a:r>
+            <a:r>
+              <a:rPr lang="en-US" altLang="zh-CN" dirty="0" smtClean="0"/>
+              <a:t>remap</a:t>
+            </a:r>
+          </a:p>
+          <a:p>
+            <a:r>
+              <a:rPr lang="en-US" altLang="zh-CN" dirty="0" smtClean="0"/>
+              <a:t>Contains</a:t>
+            </a:r>
+          </a:p>
+          <a:p>
+            <a:pPr lvl="1"/>
+            <a:r>
+              <a:rPr lang="zh-CN" altLang="en-US" dirty="0" smtClean="0"/>
+              <a:t>避免在</a:t>
+            </a:r>
+            <a:r>
+              <a:rPr lang="en-US" altLang="zh-CN" dirty="0" smtClean="0"/>
+              <a:t>list</a:t>
+            </a:r>
+            <a:r>
+              <a:rPr lang="zh-CN" altLang="en-US" dirty="0" smtClean="0"/>
+              <a:t>上使用， 尽量用</a:t>
+            </a:r>
+            <a:r>
+              <a:rPr lang="en-US" altLang="zh-CN" dirty="0" smtClean="0"/>
+              <a:t>Map</a:t>
+            </a:r>
+          </a:p>
+          <a:p>
+            <a:pPr marL="342900" lvl="1" indent="-342900">
+              <a:buFont typeface="Arial" pitchFamily="34" charset="0"/>
+              <a:buChar char="•"/>
+            </a:pPr>
+            <a:r>
+              <a:rPr lang="zh-CN" altLang="en-US" sz="3200" dirty="0"/>
+              <a:t>使用</a:t>
+            </a:r>
+            <a:r>
+              <a:rPr lang="en-US" altLang="zh-CN" sz="3200" dirty="0"/>
+              <a:t>guava </a:t>
+            </a:r>
+            <a:r>
+              <a:rPr lang="en-US" altLang="zh-CN" sz="3200" dirty="0" smtClean="0"/>
+              <a:t>collections</a:t>
+            </a:r>
+          </a:p>
+          <a:p>
+            <a:pPr marL="742950" lvl="2" indent="-342900"/>
             <a:r>
               <a:rPr lang="en-US" altLang="zh-CN" dirty="0" err="1" smtClean="0"/>
-              <a:t>nt</a:t>
-            </a:r>
-            <a:r>
-              <a:rPr lang="en-US" altLang="zh-CN" dirty="0" smtClean="0"/>
-              <a:t> Vs Integer: 4 bytes </a:t>
-            </a:r>
+              <a:t>Multimap</a:t>
+            </a:r>
+            <a:endParaRPr lang="en-US" altLang="zh-CN" dirty="0" smtClean="0"/>
+          </a:p>
+          <a:p>
+            <a:pPr marL="742950" lvl="2" indent="-342900"/>
             <a:r>
               <a:rPr lang="en-US" altLang="zh-CN" dirty="0" err="1" smtClean="0"/>
-              <a:t>vs</a:t>
-            </a:r>
-            <a:r>
-              <a:rPr lang="en-US" altLang="zh-CN" dirty="0" smtClean="0"/>
-              <a:t> 16 bytes</a:t>
-            </a:r>
-          </a:p>
-          <a:p>
-            <a:pPr lvl="2"/>
+              <a:t>Multiset</a:t>
+            </a:r>
+            <a:endParaRPr lang="en-US" altLang="zh-CN" dirty="0" smtClean="0"/>
+          </a:p>
+          <a:p>
+            <a:pPr marL="742950" lvl="2" indent="-342900"/>
             <a:r>
               <a:rPr lang="en-US" altLang="zh-CN" dirty="0" err="1" smtClean="0"/>
-              <a:t>HashMap</a:t>
-            </a:r>
-            <a:r>
-              <a:rPr lang="en-US" altLang="zh-CN" dirty="0" smtClean="0"/>
-              <a:t> </a:t>
-            </a:r>
-            <a:r>
-              <a:rPr lang="en-US" altLang="zh-CN" dirty="0" err="1" smtClean="0"/>
-              <a:t>vs</a:t>
-            </a:r>
-            <a:r>
-              <a:rPr lang="en-US" altLang="zh-CN" dirty="0" smtClean="0"/>
-              <a:t> </a:t>
-            </a:r>
-            <a:r>
-              <a:rPr lang="en-US" dirty="0"/>
-              <a:t>Trove </a:t>
-            </a:r>
-            <a:r>
-              <a:rPr lang="en-US" dirty="0" err="1" smtClean="0"/>
-              <a:t>HashMap</a:t>
-            </a:r>
-            <a:endParaRPr lang="en-US" altLang="zh-CN" dirty="0" smtClean="0"/>
-          </a:p>
-          <a:p>
-            <a:pPr lvl="3"/>
-            <a:r>
-              <a:rPr lang="en-US" altLang="zh-CN" dirty="0" smtClean="0"/>
-              <a:t>32*size + 4 * CAPACITY bytes </a:t>
-            </a:r>
-            <a:r>
-              <a:rPr lang="en-US" altLang="zh-CN" dirty="0" err="1" smtClean="0"/>
-              <a:t>vs</a:t>
-            </a:r>
-            <a:r>
-              <a:rPr lang="en-US" altLang="zh-CN" dirty="0" smtClean="0"/>
-              <a:t> 8*CAPACITY bytes</a:t>
-            </a:r>
-          </a:p>
-          <a:p>
-            <a:pPr lvl="1"/>
-            <a:r>
-              <a:rPr lang="zh-CN" altLang="en-US" dirty="0"/>
-              <a:t>对象</a:t>
-            </a:r>
-            <a:r>
-              <a:rPr lang="zh-CN" altLang="en-US" dirty="0" smtClean="0"/>
-              <a:t>重用</a:t>
-            </a:r>
-            <a:endParaRPr lang="en-US" altLang="zh-CN" dirty="0" smtClean="0"/>
-          </a:p>
-          <a:p>
-            <a:pPr lvl="2"/>
-            <a:r>
-              <a:rPr lang="zh-CN" altLang="en-US" dirty="0" smtClean="0"/>
-              <a:t>线程安全，全局重用</a:t>
-            </a:r>
-            <a:endParaRPr lang="en-US" altLang="zh-CN" dirty="0" smtClean="0"/>
-          </a:p>
-          <a:p>
-            <a:pPr lvl="2"/>
-            <a:r>
-              <a:rPr lang="zh-CN" altLang="en-US" dirty="0"/>
-              <a:t>线程不</a:t>
-            </a:r>
-            <a:r>
-              <a:rPr lang="zh-CN" altLang="en-US" dirty="0" smtClean="0"/>
-              <a:t>安全，替换成线程安全或者</a:t>
-            </a:r>
-            <a:r>
-              <a:rPr lang="en-US" altLang="zh-CN" dirty="0" err="1" smtClean="0"/>
-              <a:t>ThreadLocal</a:t>
-            </a:r>
-            <a:r>
-              <a:rPr lang="zh-CN" altLang="en-US" dirty="0" smtClean="0"/>
-              <a:t>重用</a:t>
-            </a:r>
-            <a:endParaRPr lang="en-US" altLang="zh-CN" dirty="0" smtClean="0"/>
-          </a:p>
-          <a:p>
-            <a:pPr lvl="3"/>
-            <a:r>
-              <a:rPr lang="en-US" altLang="zh-CN" dirty="0" err="1" smtClean="0"/>
-              <a:t>SimpleDateFormatter</a:t>
-            </a:r>
-            <a:endParaRPr lang="en-US" altLang="zh-CN" dirty="0" smtClean="0"/>
-          </a:p>
-          <a:p>
-            <a:pPr lvl="2"/>
-            <a:r>
-              <a:rPr lang="en-US" altLang="zh-CN" dirty="0" smtClean="0"/>
+              <a:t>Tablemap</a:t>
+            </a:r>
+            <a:endParaRPr lang="en-US" altLang="zh-CN" dirty="0" smtClean="0"/>
+          </a:p>
+          <a:p>
+            <a:pPr marL="342900" lvl="2" indent="-342900"/>
+            <a:r>
+              <a:rPr lang="en-US" altLang="zh-CN" sz="3200" dirty="0" smtClean="0"/>
               <a:t>Case</a:t>
             </a:r>
-          </a:p>
-          <a:p>
-            <a:pPr lvl="3"/>
-            <a:r>
-              <a:rPr lang="en-US" altLang="zh-CN" dirty="0" smtClean="0"/>
-              <a:t>Guava </a:t>
-            </a:r>
-            <a:r>
-              <a:rPr lang="en-US" altLang="zh-CN" dirty="0" err="1" smtClean="0"/>
-              <a:t>Spliter</a:t>
-            </a:r>
-            <a:endParaRPr lang="en-US" altLang="zh-CN" dirty="0"/>
-          </a:p>
-          <a:p>
-            <a:pPr lvl="2"/>
-            <a:endParaRPr lang="en-US" altLang="zh-CN" dirty="0" smtClean="0"/>
+            <a:r>
+              <a:rPr lang="zh-CN" altLang="en-US" sz="3200" dirty="0" smtClean="0"/>
+              <a:t>！</a:t>
+            </a:r>
+            <a:endParaRPr lang="zh-CN" altLang="en-US" sz="3200" dirty="0"/>
           </a:p>
         </p:txBody>
       </p:sp>
@@ -5138,36 +5456,24 @@
           <a:lstStyle/>
           <a:p>
             <a:r>
-              <a:rPr lang="en-US" altLang="zh-CN" dirty="0" smtClean="0"/>
-              <a:t>Array base </a:t>
-            </a:r>
-            <a:r>
-              <a:rPr lang="zh-CN" altLang="en-US" dirty="0" smtClean="0"/>
-              <a:t>的数据结构指定初始化大小</a:t>
+              <a:rPr lang="zh-CN" altLang="en-US" dirty="0" smtClean="0"/>
+              <a:t>降低</a:t>
+            </a:r>
+            <a:r>
+              <a:rPr lang="en-US" altLang="zh-CN" dirty="0" err="1" smtClean="0"/>
+              <a:t>gc</a:t>
+            </a:r>
+            <a:r>
+              <a:rPr lang="zh-CN" altLang="en-US" dirty="0" smtClean="0"/>
+              <a:t>频率</a:t>
             </a:r>
             <a:endParaRPr lang="en-US" altLang="zh-CN" dirty="0" smtClean="0"/>
           </a:p>
           <a:p>
             <a:pPr lvl="1"/>
             <a:r>
-              <a:rPr lang="en-US" altLang="zh-CN" dirty="0" err="1" smtClean="0"/>
-              <a:t>ArrayList</a:t>
-            </a:r>
-            <a:r>
-              <a:rPr lang="en-US" altLang="zh-CN" dirty="0" smtClean="0"/>
-              <a:t> , </a:t>
-            </a:r>
-            <a:r>
-              <a:rPr lang="en-US" altLang="zh-CN" dirty="0" err="1" smtClean="0"/>
-              <a:t>hashmap</a:t>
-            </a:r>
-            <a:r>
-              <a:rPr lang="en-US" altLang="zh-CN" dirty="0" smtClean="0"/>
-              <a:t> </a:t>
-            </a:r>
-            <a:r>
-              <a:rPr lang="zh-CN" altLang="en-US" dirty="0" smtClean="0"/>
-              <a:t>容量不足时复制时扩容</a:t>
+              <a:rPr lang="zh-CN" altLang="en-US" dirty="0" smtClean="0"/>
+              <a:t>没有买卖就没有杀害，没有垃圾就没有垃圾回收，没有垃圾回收旧没有万物静止。</a:t>
             </a:r>
             <a:endParaRPr lang="en-US" altLang="zh-CN" dirty="0" smtClean="0"/>
           </a:p>
@@ -5177,12 +5483,8 @@
               <a:buChar char="•"/>
             </a:pPr>
             <a:r>
-              <a:rPr lang="zh-CN" altLang="en-US" sz="3200" dirty="0"/>
-              <a:t>对象</a:t>
-            </a:r>
-            <a:r>
               <a:rPr lang="zh-CN" altLang="en-US" sz="3200" dirty="0" smtClean="0"/>
-              <a:t>重用</a:t>
+              <a:t>降低内存分配</a:t>
             </a:r>
             <a:endParaRPr lang="en-US" altLang="zh-CN" sz="3200" dirty="0" smtClean="0"/>
           </a:p>
@@ -5190,75 +5492,13 @@
             <a:pPr marL="742950" lvl="2" indent="-342900"/>
             <a:r>
               <a:rPr lang="zh-CN" altLang="en-US" dirty="0" smtClean="0"/>
-              <a:t>创建成本大的池化，否则还是使用</a:t>
-            </a:r>
-            <a:r>
-              <a:rPr lang="en-US" altLang="zh-CN" dirty="0" smtClean="0"/>
-              <a:t>new</a:t>
-            </a:r>
+              <a:t>数据类型的选择</a:t>
+            </a:r>
+            <a:endParaRPr lang="en-US" altLang="zh-CN" dirty="0" smtClean="0"/>
           </a:p>
           <a:p>
             <a:pPr marL="742950" lvl="2" indent="-342900"/>
-            <a:r>
-              <a:rPr lang="zh-CN" altLang="en-US" dirty="0" smtClean="0"/>
-              <a:t>局部对象的创建成本很低</a:t>
-            </a:r>
-            <a:endParaRPr lang="en-US" altLang="zh-CN" dirty="0" smtClean="0"/>
-          </a:p>
-          <a:p>
-            <a:pPr marL="742950" lvl="2" indent="-342900"/>
-            <a:r>
-              <a:rPr lang="zh-CN" altLang="en-US" dirty="0" smtClean="0"/>
-              <a:t>对象池反而会影响</a:t>
-            </a:r>
-            <a:r>
-              <a:rPr lang="en-US" altLang="zh-CN" dirty="0" err="1" smtClean="0"/>
-              <a:t>gc</a:t>
-            </a:r>
-            <a:endParaRPr lang="en-US" altLang="zh-CN" dirty="0" smtClean="0"/>
-          </a:p>
-          <a:p>
-            <a:pPr marL="342900" lvl="1" indent="-342900">
-              <a:buFont typeface="Arial" pitchFamily="34" charset="0"/>
-              <a:buChar char="•"/>
-            </a:pPr>
-            <a:r>
-              <a:rPr lang="zh-CN" altLang="en-US" sz="3200" dirty="0"/>
-              <a:t>对象设置为</a:t>
-            </a:r>
-            <a:r>
-              <a:rPr lang="en-US" altLang="zh-CN" sz="3200" dirty="0"/>
-              <a:t>NULL</a:t>
-            </a:r>
-            <a:r>
-              <a:rPr lang="zh-CN" altLang="en-US" sz="3200" dirty="0" smtClean="0"/>
-              <a:t>？</a:t>
-            </a:r>
-            <a:endParaRPr lang="en-US" altLang="zh-CN" sz="3200" dirty="0" smtClean="0"/>
-          </a:p>
-          <a:p>
-            <a:pPr marL="742950" lvl="2" indent="-342900"/>
-            <a:r>
-              <a:rPr lang="zh-CN" altLang="en-US" dirty="0" smtClean="0"/>
-              <a:t>无用，反而会影响程序的可读性</a:t>
-            </a:r>
-            <a:endParaRPr lang="en-US" altLang="zh-CN" dirty="0" smtClean="0"/>
-          </a:p>
-          <a:p>
-            <a:pPr marL="742950" lvl="2" indent="-342900"/>
-            <a:r>
-              <a:rPr lang="zh-CN" altLang="en-US" dirty="0" smtClean="0"/>
-              <a:t>缩小</a:t>
-            </a:r>
-            <a:r>
-              <a:rPr lang="zh-CN" altLang="en-US" dirty="0"/>
-              <a:t>对象</a:t>
-            </a:r>
-            <a:r>
-              <a:rPr lang="zh-CN" altLang="en-US" dirty="0" smtClean="0"/>
-              <a:t>范围</a:t>
-            </a:r>
-            <a:endParaRPr lang="zh-CN" altLang="en-US" dirty="0"/>
+            <a:endParaRPr lang="en-US" altLang="zh-CN" dirty="0" smtClean="0"/>
           </a:p>
         </p:txBody>
       </p:sp>
@@ -5303,20 +5543,16 @@
           <a:lstStyle/>
           <a:p>
             <a:r>
-              <a:rPr lang="en-US" altLang="zh-CN" dirty="0" smtClean="0"/>
-              <a:t>String </a:t>
-            </a:r>
-            <a:r>
-              <a:rPr lang="en-US" altLang="zh-CN" dirty="0" err="1" smtClean="0"/>
-              <a:t>StringBuffer</a:t>
-            </a:r>
-            <a:r>
-              <a:rPr lang="en-US" altLang="zh-CN" dirty="0" smtClean="0"/>
-              <a:t> </a:t>
-            </a:r>
-            <a:r>
-              <a:rPr lang="en-US" altLang="zh-CN" dirty="0" err="1" smtClean="0"/>
-              <a:t>StringBuilder</a:t>
+              <a:rPr lang="zh-CN" altLang="en-US" dirty="0" smtClean="0"/>
+              <a:t>面向</a:t>
+            </a:r>
+            <a:r>
+              <a:rPr lang="en-US" altLang="zh-CN" dirty="0" smtClean="0"/>
+              <a:t>GC</a:t>
+            </a:r>
+            <a:r>
+              <a:rPr lang="zh-CN" altLang="en-US" dirty="0" smtClean="0"/>
+              <a:t>的编程</a:t>
             </a:r>
             <a:endParaRPr lang="zh-CN" altLang="en-US" dirty="0"/>
           </a:p>
@@ -5341,117 +5577,154 @@
           <a:p>
             <a:r>
               <a:rPr lang="zh-CN" altLang="en-US" dirty="0" smtClean="0"/>
-              <a:t>根据</a:t>
-            </a:r>
-            <a:r>
-              <a:rPr lang="en-US" altLang="zh-CN" dirty="0" smtClean="0"/>
-              <a:t>JLS</a:t>
-            </a:r>
-            <a:r>
-              <a:rPr lang="zh-CN" altLang="en-US" dirty="0" smtClean="0"/>
-              <a:t>规定，</a:t>
-            </a:r>
-            <a:r>
-              <a:rPr lang="en-US" altLang="zh-CN" dirty="0" smtClean="0"/>
-              <a:t>String</a:t>
-            </a:r>
-            <a:r>
-              <a:rPr lang="zh-CN" altLang="en-US" dirty="0" smtClean="0"/>
-              <a:t>的拼接操作总会被</a:t>
+              <a:t>降低内存分配</a:t>
+            </a:r>
+            <a:endParaRPr lang="en-US" altLang="zh-CN" dirty="0" smtClean="0"/>
+          </a:p>
+          <a:p>
+            <a:pPr lvl="1"/>
+            <a:r>
+              <a:rPr lang="zh-CN" altLang="en-US" dirty="0" smtClean="0"/>
+              <a:t>使用占用更小的数据类型</a:t>
+            </a:r>
+            <a:endParaRPr lang="en-US" altLang="zh-CN" dirty="0" smtClean="0"/>
+          </a:p>
+          <a:p>
+            <a:pPr lvl="2"/>
+            <a:r>
+              <a:rPr lang="en-US" altLang="zh-CN" dirty="0" err="1"/>
+              <a:t>i</a:t>
             </a:r>
             <a:r>
               <a:rPr lang="en-US" altLang="zh-CN" dirty="0" err="1" smtClean="0"/>
-              <a:t>sb</a:t>
-            </a:r>
-            <a:r>
-              <a:rPr lang="zh-CN" altLang="en-US" dirty="0" smtClean="0"/>
-              <a:t>替换</a:t>
-            </a:r>
-            <a:endParaRPr lang="en-US" altLang="zh-CN" dirty="0" smtClean="0"/>
-          </a:p>
-          <a:p>
-            <a:r>
-              <a:rPr lang="zh-CN" altLang="en-US" dirty="0" smtClean="0"/>
-              <a:t>使用</a:t>
+              <a:t>nt</a:t>
+            </a:r>
+            <a:r>
+              <a:rPr lang="en-US" altLang="zh-CN" dirty="0" smtClean="0"/>
+              <a:t> Vs Integer: 4 bytes </a:t>
             </a:r>
             <a:r>
               <a:rPr lang="en-US" altLang="zh-CN" dirty="0" err="1" smtClean="0"/>
-              <a:t>StringBuilder</a:t>
-            </a:r>
-            <a:r>
-              <a:rPr lang="zh-CN" altLang="en-US" dirty="0" smtClean="0"/>
-              <a:t>替换</a:t>
-            </a:r>
+              <a:t>vs</a:t>
+            </a:r>
+            <a:r>
+              <a:rPr lang="en-US" altLang="zh-CN" dirty="0" smtClean="0"/>
+              <a:t> 16 bytes</a:t>
+            </a:r>
+          </a:p>
+          <a:p>
+            <a:pPr lvl="2"/>
             <a:r>
               <a:rPr lang="en-US" altLang="zh-CN" dirty="0" err="1" smtClean="0"/>
-              <a:t>StringBuffer</a:t>
-            </a:r>
-            <a:endParaRPr lang="en-US" altLang="zh-CN" dirty="0" smtClean="0"/>
+              <a:t>HashMap</a:t>
+            </a:r>
+            <a:r>
+              <a:rPr lang="en-US" altLang="zh-CN" dirty="0" smtClean="0"/>
+              <a:t> </a:t>
+            </a:r>
+            <a:r>
+              <a:rPr lang="en-US" altLang="zh-CN" dirty="0" err="1" smtClean="0"/>
+              <a:t>vs</a:t>
+            </a:r>
+            <a:r>
+              <a:rPr lang="en-US" altLang="zh-CN" dirty="0" smtClean="0"/>
+              <a:t> </a:t>
+            </a:r>
+            <a:r>
+              <a:rPr lang="en-US" dirty="0"/>
+              <a:t>Trove </a:t>
+            </a:r>
+            <a:r>
+              <a:rPr lang="en-US" dirty="0" err="1" smtClean="0"/>
+              <a:t>HashMap</a:t>
+            </a:r>
+            <a:endParaRPr lang="en-US" altLang="zh-CN" dirty="0" smtClean="0"/>
+          </a:p>
+          <a:p>
+            <a:pPr lvl="3"/>
+            <a:r>
+              <a:rPr lang="en-US" altLang="zh-CN" dirty="0" smtClean="0"/>
+              <a:t>32*size + 4 * CAPACITY bytes </a:t>
+            </a:r>
+            <a:r>
+              <a:rPr lang="en-US" altLang="zh-CN" dirty="0" err="1" smtClean="0"/>
+              <a:t>vs</a:t>
+            </a:r>
+            <a:r>
+              <a:rPr lang="en-US" altLang="zh-CN" dirty="0" smtClean="0"/>
+              <a:t> 8*CAPACITY bytes</a:t>
+            </a:r>
           </a:p>
           <a:p>
             <a:pPr lvl="1"/>
             <a:r>
-              <a:rPr lang="zh-CN" altLang="en-US" dirty="0" smtClean="0"/>
-              <a:t>回忆一下，真的有很多多个线程使用一个</a:t>
+              <a:rPr lang="zh-CN" altLang="en-US" dirty="0"/>
+              <a:t>对象</a:t>
+            </a:r>
+            <a:r>
+              <a:rPr lang="zh-CN" altLang="en-US" dirty="0" smtClean="0"/>
+              <a:t>重用</a:t>
+            </a:r>
+            <a:endParaRPr lang="en-US" altLang="zh-CN" dirty="0" smtClean="0"/>
+          </a:p>
+          <a:p>
+            <a:pPr lvl="2"/>
+            <a:r>
+              <a:rPr lang="zh-CN" altLang="en-US" dirty="0" smtClean="0"/>
+              <a:t>线程安全，全局重用</a:t>
+            </a:r>
+            <a:endParaRPr lang="en-US" altLang="zh-CN" dirty="0" smtClean="0"/>
+          </a:p>
+          <a:p>
+            <a:pPr lvl="2"/>
+            <a:r>
+              <a:rPr lang="zh-CN" altLang="en-US" dirty="0"/>
+              <a:t>线程不</a:t>
+            </a:r>
+            <a:r>
+              <a:rPr lang="zh-CN" altLang="en-US" dirty="0" smtClean="0"/>
+              <a:t>安全，替换成线程安全或者</a:t>
             </a:r>
             <a:r>
               <a:rPr lang="en-US" altLang="zh-CN" dirty="0" err="1" smtClean="0"/>
-              <a:t>StringBuffer</a:t>
-            </a:r>
-            <a:r>
-              <a:rPr lang="zh-CN" altLang="en-US" dirty="0" smtClean="0"/>
-              <a:t>的场景？</a:t>
-            </a:r>
-            <a:endParaRPr lang="en-US" altLang="zh-CN" dirty="0" smtClean="0"/>
-          </a:p>
-          <a:p>
-            <a:pPr marL="342900" lvl="1" indent="-342900">
-              <a:buFont typeface="Arial" pitchFamily="34" charset="0"/>
-              <a:buChar char="•"/>
-            </a:pPr>
-            <a:r>
-              <a:rPr lang="zh-CN" altLang="en-US" sz="3200" dirty="0"/>
-              <a:t>循环中总是使用</a:t>
-            </a:r>
-            <a:r>
-              <a:rPr lang="en-US" altLang="zh-CN" sz="3200" dirty="0" err="1"/>
-              <a:t>StirngBuilder</a:t>
-            </a:r>
-            <a:r>
-              <a:rPr lang="zh-CN" altLang="en-US" sz="3200" dirty="0"/>
-              <a:t>，而且预分配</a:t>
-            </a:r>
-            <a:r>
-              <a:rPr lang="zh-CN" altLang="en-US" sz="3200" dirty="0" smtClean="0"/>
-              <a:t>空间</a:t>
-            </a:r>
-            <a:endParaRPr lang="en-US" altLang="zh-CN" sz="3200" dirty="0" smtClean="0"/>
-          </a:p>
-          <a:p>
-            <a:pPr marL="342900" lvl="1" indent="-342900">
-              <a:buFont typeface="Arial" pitchFamily="34" charset="0"/>
-              <a:buChar char="•"/>
-            </a:pPr>
-            <a:r>
-              <a:rPr lang="en-US" altLang="zh-CN" sz="3200" dirty="0" smtClean="0"/>
-              <a:t>Log </a:t>
-            </a:r>
-            <a:r>
-              <a:rPr lang="zh-CN" altLang="en-US" sz="3200" dirty="0" smtClean="0"/>
-              <a:t>怎么打？</a:t>
-            </a:r>
-            <a:endParaRPr lang="en-US" altLang="zh-CN" sz="3200" dirty="0" smtClean="0"/>
-          </a:p>
-          <a:p>
-            <a:pPr marL="342900" lvl="1" indent="-342900">
-              <a:buFont typeface="Arial" pitchFamily="34" charset="0"/>
-              <a:buChar char="•"/>
-            </a:pPr>
-            <a:r>
-              <a:rPr lang="en-US" altLang="zh-CN" sz="3200" dirty="0" smtClean="0"/>
+              <a:t>ThreadLocal</a:t>
+            </a:r>
+            <a:r>
+              <a:rPr lang="zh-CN" altLang="en-US" dirty="0" smtClean="0"/>
+              <a:t>重用</a:t>
+            </a:r>
+            <a:endParaRPr lang="en-US" altLang="zh-CN" dirty="0" smtClean="0"/>
+          </a:p>
+          <a:p>
+            <a:pPr lvl="3"/>
+            <a:r>
+              <a:rPr lang="en-US" altLang="zh-CN" dirty="0" err="1" smtClean="0"/>
+              <a:t>SimpleDateFormatter</a:t>
+            </a:r>
+            <a:endParaRPr lang="en-US" altLang="zh-CN" dirty="0" smtClean="0"/>
+          </a:p>
+          <a:p>
+            <a:pPr lvl="2"/>
+            <a:r>
+              <a:rPr lang="en-US" altLang="zh-CN" dirty="0" smtClean="0"/>
               <a:t>Case</a:t>
             </a:r>
-            <a:endParaRPr lang="en-US" altLang="zh-CN" sz="3200" dirty="0"/>
+          </a:p>
+          <a:p>
+            <a:pPr lvl="3"/>
+            <a:r>
+              <a:rPr lang="en-US" altLang="zh-CN" dirty="0" smtClean="0"/>
+              <a:t>Guava </a:t>
+            </a:r>
+            <a:r>
+              <a:rPr lang="en-US" altLang="zh-CN" dirty="0" err="1" smtClean="0"/>
+              <a:t>Spliter</a:t>
+            </a:r>
+            <a:endParaRPr lang="en-US" altLang="zh-CN" dirty="0"/>
+          </a:p>
+          <a:p>
+            <a:pPr lvl="2"/>
+            <a:endParaRPr lang="en-US" altLang="zh-CN" dirty="0" smtClean="0"/>
           </a:p>
         </p:txBody>
       </p:sp>
@@ -5496,8 +5769,16 @@
           <a:lstStyle/>
           <a:p>
             <a:r>
+              <a:rPr lang="zh-CN" altLang="en-US" dirty="0" smtClean="0"/>
+              <a:t>面向</a:t>
+            </a:r>
+            <a:r>
               <a:rPr lang="en-US" altLang="zh-CN" dirty="0" err="1" smtClean="0"/>
-              <a:t>StringBuilder</a:t>
+              <a:t>gc</a:t>
+            </a:r>
+            <a:r>
+              <a:rPr lang="zh-CN" altLang="en-US" dirty="0" smtClean="0"/>
+              <a:t>的编程</a:t>
             </a:r>
             <a:endParaRPr lang="zh-CN" altLang="en-US" dirty="0"/>
           </a:p>
@@ -5515,145 +5796,129 @@
         </p:nvSpPr>
         <p:spPr/>
         <p:txBody>
-          <a:bodyPr>
-            <a:normAutofit lnSpcReduction="10000"/>
-          </a:bodyPr>
-          <a:lstStyle/>
-          <a:p>
-            <a:pPr>
-              <a:buNone/>
+          <a:bodyPr/>
+          <a:lstStyle/>
+          <a:p>
+            <a:r>
+              <a:rPr lang="en-US" altLang="zh-CN" dirty="0" smtClean="0"/>
+              <a:t>Array base </a:t>
+            </a:r>
+            <a:r>
+              <a:rPr lang="zh-CN" altLang="en-US" dirty="0" smtClean="0"/>
+              <a:t>的数据结构指定初始化大小</a:t>
+            </a:r>
+            <a:endParaRPr lang="en-US" altLang="zh-CN" dirty="0" smtClean="0"/>
+          </a:p>
+          <a:p>
+            <a:pPr lvl="1"/>
+            <a:r>
+              <a:rPr lang="en-US" altLang="zh-CN" dirty="0" err="1" smtClean="0"/>
+              <a:t>ArrayList</a:t>
+            </a:r>
+            <a:r>
+              <a:rPr lang="en-US" altLang="zh-CN" dirty="0" smtClean="0"/>
+              <a:t> , </a:t>
+            </a:r>
+            <a:r>
+              <a:rPr lang="en-US" altLang="zh-CN" dirty="0" err="1" smtClean="0"/>
+              <a:t>hashmap</a:t>
+            </a:r>
+            <a:r>
+              <a:rPr lang="en-US" altLang="zh-CN" dirty="0" smtClean="0"/>
+              <a:t> </a:t>
+            </a:r>
+            <a:r>
+              <a:rPr lang="zh-CN" altLang="en-US" dirty="0" smtClean="0"/>
+              <a:t>容量不足时复制时扩容</a:t>
+            </a:r>
+            <a:endParaRPr lang="en-US" altLang="zh-CN" dirty="0" smtClean="0"/>
+          </a:p>
+          <a:p>
+            <a:pPr marL="342900" lvl="1" indent="-342900">
+              <a:buFont typeface="Arial" pitchFamily="34" charset="0"/>
+              <a:buChar char="•"/>
             </a:pPr>
             <a:r>
-              <a:rPr lang="zh-CN" altLang="en-US" dirty="0" smtClean="0"/>
-              <a:t>生成</a:t>
-            </a:r>
-            <a:r>
-              <a:rPr lang="en-US" altLang="zh-CN" dirty="0" smtClean="0"/>
-              <a:t>129</a:t>
-            </a:r>
-            <a:r>
-              <a:rPr lang="zh-CN" altLang="en-US" dirty="0" smtClean="0"/>
-              <a:t>个字符的字符串需要多少内存？</a:t>
-            </a:r>
-            <a:endParaRPr lang="en-US" altLang="zh-CN" dirty="0" smtClean="0"/>
-          </a:p>
-          <a:p>
-            <a:pPr>
-              <a:buNone/>
+              <a:rPr lang="zh-CN" altLang="en-US" sz="3200" dirty="0"/>
+              <a:t>对象</a:t>
+            </a:r>
+            <a:r>
+              <a:rPr lang="zh-CN" altLang="en-US" sz="3200" dirty="0" smtClean="0"/>
+              <a:t>重用</a:t>
+            </a:r>
+            <a:endParaRPr lang="en-US" altLang="zh-CN" sz="3200" dirty="0" smtClean="0"/>
+          </a:p>
+          <a:p>
+            <a:pPr marL="742950" lvl="2" indent="-342900"/>
+            <a:r>
+              <a:rPr lang="zh-CN" altLang="en-US" dirty="0" smtClean="0"/>
+              <a:t>创建成本大的池化，否则还是使用</a:t>
+            </a:r>
+            <a:r>
+              <a:rPr lang="en-US" altLang="zh-CN" dirty="0" smtClean="0"/>
+              <a:t>new</a:t>
+            </a:r>
+          </a:p>
+          <a:p>
+            <a:pPr marL="742950" lvl="2" indent="-342900"/>
+            <a:r>
+              <a:rPr lang="zh-CN" altLang="en-US" dirty="0" smtClean="0"/>
+              <a:t>局部对象的创建成本很低</a:t>
+            </a:r>
+            <a:endParaRPr lang="en-US" altLang="zh-CN" dirty="0" smtClean="0"/>
+          </a:p>
+          <a:p>
+            <a:pPr marL="742950" lvl="2" indent="-342900"/>
+            <a:r>
+              <a:rPr lang="zh-CN" altLang="en-US" dirty="0" smtClean="0"/>
+              <a:t>对象池反而会影响</a:t>
+            </a:r>
+            <a:r>
+              <a:rPr lang="en-US" altLang="zh-CN" dirty="0" err="1" smtClean="0"/>
+              <a:t>gc</a:t>
+            </a:r>
+            <a:endParaRPr lang="en-US" altLang="zh-CN" dirty="0" smtClean="0"/>
+          </a:p>
+          <a:p>
+            <a:pPr marL="342900" lvl="1" indent="-342900">
+              <a:buFont typeface="Arial" pitchFamily="34" charset="0"/>
+              <a:buChar char="•"/>
             </a:pPr>
             <a:r>
-              <a:rPr lang="en-US" altLang="zh-CN" dirty="0" err="1" smtClean="0"/>
-              <a:t>StringBuilder</a:t>
-            </a:r>
-            <a:r>
-              <a:rPr lang="en-US" altLang="zh-CN" dirty="0" smtClean="0"/>
-              <a:t> </a:t>
-            </a:r>
-            <a:r>
-              <a:rPr lang="en-US" altLang="zh-CN" dirty="0" err="1" smtClean="0"/>
-              <a:t>sb</a:t>
-            </a:r>
-            <a:r>
-              <a:rPr lang="en-US" altLang="zh-CN" dirty="0" smtClean="0"/>
-              <a:t> = new </a:t>
-            </a:r>
-            <a:r>
-              <a:rPr lang="en-US" altLang="zh-CN" dirty="0" err="1" smtClean="0"/>
-              <a:t>StringBuilder</a:t>
-            </a:r>
-            <a:r>
-              <a:rPr lang="en-US" altLang="zh-CN" dirty="0" smtClean="0"/>
-              <a:t>();</a:t>
-            </a:r>
-          </a:p>
-          <a:p>
-            <a:pPr>
-              <a:buNone/>
-            </a:pPr>
-            <a:r>
-              <a:rPr lang="en-US" altLang="zh-CN" dirty="0" smtClean="0"/>
-              <a:t>For(</a:t>
-            </a:r>
-            <a:r>
-              <a:rPr lang="en-US" altLang="zh-CN" dirty="0" err="1" smtClean="0"/>
-              <a:t>int</a:t>
-            </a:r>
-            <a:r>
-              <a:rPr lang="en-US" altLang="zh-CN" dirty="0" smtClean="0"/>
-              <a:t> </a:t>
-            </a:r>
-            <a:r>
-              <a:rPr lang="en-US" altLang="zh-CN" dirty="0" err="1" smtClean="0"/>
-              <a:t>i</a:t>
-            </a:r>
-            <a:r>
-              <a:rPr lang="en-US" altLang="zh-CN" dirty="0" smtClean="0"/>
-              <a:t> = 0 ; </a:t>
-            </a:r>
-            <a:r>
-              <a:rPr lang="en-US" altLang="zh-CN" dirty="0" err="1" smtClean="0"/>
-              <a:t>i</a:t>
-            </a:r>
-            <a:r>
-              <a:rPr lang="en-US" altLang="zh-CN" dirty="0" smtClean="0"/>
-              <a:t>&lt; 128;i++){</a:t>
-            </a:r>
-          </a:p>
-          <a:p>
-            <a:pPr>
-              <a:buNone/>
-            </a:pPr>
-            <a:r>
-              <a:rPr lang="en-US" altLang="zh-CN" dirty="0" smtClean="0"/>
-              <a:t>	</a:t>
-            </a:r>
-            <a:r>
-              <a:rPr lang="en-US" altLang="zh-CN" dirty="0" err="1" smtClean="0"/>
-              <a:t>sb.append</a:t>
-            </a:r>
-            <a:r>
-              <a:rPr lang="en-US" altLang="zh-CN" dirty="0" smtClean="0"/>
-              <a:t>(“a”);</a:t>
-            </a:r>
-          </a:p>
-          <a:p>
-            <a:pPr>
-              <a:buNone/>
-            </a:pPr>
-            <a:r>
-              <a:rPr lang="en-US" altLang="zh-CN" dirty="0" smtClean="0"/>
-              <a:t>}</a:t>
-            </a:r>
-          </a:p>
-          <a:p>
-            <a:pPr>
-              <a:buNone/>
-            </a:pPr>
-            <a:r>
-              <a:rPr lang="en-US" altLang="zh-CN" dirty="0" smtClean="0"/>
-              <a:t>16+32+64+128+256=496</a:t>
-            </a:r>
-          </a:p>
-          <a:p>
-            <a:pPr>
-              <a:buNone/>
-            </a:pPr>
-            <a:r>
-              <a:rPr lang="en-US" altLang="zh-CN" dirty="0" err="1" smtClean="0"/>
-              <a:t>Sb.toString</a:t>
-            </a:r>
-            <a:r>
-              <a:rPr lang="en-US" altLang="zh-CN" dirty="0" smtClean="0"/>
-              <a:t>() -&gt; 129</a:t>
-            </a:r>
-          </a:p>
-          <a:p>
-            <a:pPr>
-              <a:buNone/>
-            </a:pPr>
-            <a:r>
-              <a:rPr lang="en-US" altLang="zh-CN" dirty="0" smtClean="0"/>
-              <a:t>496+129=525 bytes</a:t>
+              <a:rPr lang="zh-CN" altLang="en-US" sz="3200" dirty="0"/>
+              <a:t>对象设置为</a:t>
+            </a:r>
+            <a:r>
+              <a:rPr lang="en-US" altLang="zh-CN" sz="3200" dirty="0"/>
+              <a:t>NULL</a:t>
+            </a:r>
+            <a:r>
+              <a:rPr lang="zh-CN" altLang="en-US" sz="3200" dirty="0" smtClean="0"/>
+              <a:t>？</a:t>
+            </a:r>
+            <a:endParaRPr lang="en-US" altLang="zh-CN" sz="3200" dirty="0" smtClean="0"/>
+          </a:p>
+          <a:p>
+            <a:pPr marL="742950" lvl="2" indent="-342900"/>
+            <a:r>
+              <a:rPr lang="zh-CN" altLang="en-US" dirty="0" smtClean="0"/>
+              <a:t>无用，反而会影响程序的可读性</a:t>
+            </a:r>
+            <a:endParaRPr lang="en-US" altLang="zh-CN" dirty="0" smtClean="0"/>
+          </a:p>
+          <a:p>
+            <a:pPr marL="742950" lvl="2" indent="-342900"/>
+            <a:r>
+              <a:rPr lang="zh-CN" altLang="en-US" dirty="0" smtClean="0"/>
+              <a:t>缩小</a:t>
+            </a:r>
+            <a:r>
+              <a:rPr lang="zh-CN" altLang="en-US" dirty="0"/>
+              <a:t>对象</a:t>
+            </a:r>
+            <a:r>
+              <a:rPr lang="zh-CN" altLang="en-US" dirty="0" smtClean="0"/>
+              <a:t>范围</a:t>
             </a:r>
             <a:endParaRPr lang="zh-CN" altLang="en-US" dirty="0"/>
           </a:p>
@@ -5701,15 +5966,19 @@
           <a:p>
             <a:r>
               <a:rPr lang="en-US" altLang="zh-CN" dirty="0" smtClean="0"/>
-              <a:t>String Performance </a:t>
-            </a:r>
-            <a:r>
-              <a:rPr lang="en-US" altLang="zh-CN" dirty="0"/>
-              <a:t>T</a:t>
-            </a:r>
-            <a:r>
-              <a:rPr lang="en-US" altLang="zh-CN" dirty="0" smtClean="0"/>
-              <a:t>ips</a:t>
+              <a:t>String </a:t>
+            </a:r>
+            <a:r>
+              <a:rPr lang="en-US" altLang="zh-CN" dirty="0" err="1" smtClean="0"/>
+              <a:t>StringBuffer</a:t>
+            </a:r>
+            <a:r>
+              <a:rPr lang="en-US" altLang="zh-CN" dirty="0" smtClean="0"/>
+              <a:t> </a:t>
+            </a:r>
+            <a:r>
+              <a:rPr lang="en-US" altLang="zh-CN" dirty="0" err="1" smtClean="0"/>
+              <a:t>StringBuilder</a:t>
             </a:r>
             <a:endParaRPr lang="zh-CN" altLang="en-US" dirty="0"/>
           </a:p>
@@ -5727,115 +5996,124 @@
         </p:nvSpPr>
         <p:spPr/>
         <p:txBody>
-          <a:bodyPr/>
-          <a:lstStyle/>
-          <a:p>
-            <a:r>
-              <a:rPr lang="en-US" altLang="zh-CN" dirty="0" smtClean="0"/>
-              <a:t>split</a:t>
-            </a:r>
+          <a:bodyPr>
+            <a:normAutofit lnSpcReduction="10000"/>
+          </a:bodyPr>
+          <a:lstStyle/>
+          <a:p>
+            <a:r>
+              <a:rPr lang="zh-CN" altLang="en-US" dirty="0" smtClean="0"/>
+              <a:t>根据</a:t>
+            </a:r>
+            <a:r>
+              <a:rPr lang="en-US" altLang="zh-CN" dirty="0" smtClean="0"/>
+              <a:t>JLS</a:t>
+            </a:r>
+            <a:r>
+              <a:rPr lang="zh-CN" altLang="en-US" dirty="0" smtClean="0"/>
+              <a:t>规定，</a:t>
+            </a:r>
+            <a:r>
+              <a:rPr lang="en-US" altLang="zh-CN" dirty="0" smtClean="0"/>
+              <a:t>String</a:t>
+            </a:r>
+            <a:r>
+              <a:rPr lang="zh-CN" altLang="en-US" dirty="0" smtClean="0"/>
+              <a:t>的拼接操作总会被</a:t>
+            </a:r>
+            <a:r>
+              <a:rPr lang="en-US" altLang="zh-CN" dirty="0" err="1" smtClean="0"/>
+              <a:t>sb</a:t>
+            </a:r>
+            <a:r>
+              <a:rPr lang="zh-CN" altLang="en-US" dirty="0" smtClean="0"/>
+              <a:t>替换</a:t>
+            </a:r>
+            <a:endParaRPr lang="en-US" altLang="zh-CN" dirty="0" smtClean="0"/>
+          </a:p>
+          <a:p>
+            <a:r>
+              <a:rPr lang="zh-CN" altLang="en-US" dirty="0" smtClean="0"/>
+              <a:t>使用</a:t>
+            </a:r>
+            <a:r>
+              <a:rPr lang="en-US" altLang="zh-CN" dirty="0" err="1" smtClean="0"/>
+              <a:t>StringBuilder</a:t>
+            </a:r>
+            <a:r>
+              <a:rPr lang="zh-CN" altLang="en-US" dirty="0" smtClean="0"/>
+              <a:t>替换</a:t>
+            </a:r>
+            <a:r>
+              <a:rPr lang="en-US" altLang="zh-CN" dirty="0" err="1" smtClean="0"/>
+              <a:t>StringBuffer</a:t>
+            </a:r>
+            <a:endParaRPr lang="en-US" altLang="zh-CN" dirty="0" smtClean="0"/>
           </a:p>
           <a:p>
             <a:pPr lvl="1"/>
             <a:r>
               <a:rPr lang="zh-CN" altLang="en-US" dirty="0" smtClean="0"/>
-              <a:t>大量使用，各种使用</a:t>
-            </a:r>
-            <a:r>
-              <a:rPr lang="en-US" altLang="zh-CN" dirty="0" smtClean="0"/>
-              <a:t>”,”</a:t>
-            </a:r>
-            <a:r>
-              <a:rPr lang="zh-CN" altLang="en-US" dirty="0" smtClean="0"/>
-              <a:t>和</a:t>
-            </a:r>
-            <a:r>
-              <a:rPr lang="en-US" altLang="zh-CN" dirty="0" smtClean="0"/>
-              <a:t>”|” </a:t>
-            </a:r>
-            <a:r>
-              <a:rPr lang="zh-CN" altLang="en-US" dirty="0" smtClean="0"/>
-              <a:t>分隔的场景</a:t>
-            </a:r>
-            <a:endParaRPr lang="en-US" altLang="zh-CN" dirty="0" smtClean="0"/>
-          </a:p>
-          <a:p>
-            <a:pPr lvl="1"/>
-            <a:r>
-              <a:rPr lang="zh-CN" altLang="en-US" dirty="0" smtClean="0"/>
-              <a:t>慢的原因，每次创建一个新的正则表达式</a:t>
-            </a:r>
-            <a:endParaRPr lang="en-US" altLang="zh-CN" dirty="0" smtClean="0"/>
-          </a:p>
-          <a:p>
-            <a:pPr lvl="1"/>
-            <a:r>
-              <a:rPr lang="zh-CN" altLang="en-US" dirty="0" smtClean="0"/>
-              <a:t>高性能替代品</a:t>
-            </a:r>
-            <a:endParaRPr lang="en-US" altLang="zh-CN" dirty="0" smtClean="0"/>
-          </a:p>
-          <a:p>
-            <a:pPr lvl="2"/>
+              <a:t>回忆一下，真的有很多多个线程使用一个</a:t>
+            </a:r>
             <a:r>
               <a:rPr lang="en-US" altLang="zh-CN" dirty="0" err="1" smtClean="0"/>
-              <a:t>StringUtils</a:t>
-            </a:r>
-            <a:r>
-              <a:rPr lang="en-US" altLang="zh-CN" dirty="0" smtClean="0"/>
-              <a:t> – </a:t>
-            </a:r>
-            <a:r>
-              <a:rPr lang="zh-CN" altLang="en-US" dirty="0" smtClean="0"/>
-              <a:t>返回数组，速度优于 </a:t>
-            </a:r>
-            <a:r>
-              <a:rPr lang="en-US" altLang="zh-CN" dirty="0" err="1" smtClean="0"/>
-              <a:t>String.split</a:t>
-            </a:r>
-            <a:r>
-              <a:rPr lang="en-US" altLang="zh-CN" dirty="0" smtClean="0"/>
-              <a:t>();</a:t>
-            </a:r>
-          </a:p>
-          <a:p>
-            <a:pPr lvl="2"/>
-            <a:r>
-              <a:rPr lang="en-US" altLang="zh-CN" dirty="0" smtClean="0"/>
-              <a:t>Guava </a:t>
-            </a:r>
-            <a:r>
-              <a:rPr lang="en-US" altLang="zh-CN" dirty="0" err="1" smtClean="0"/>
-              <a:t>Spliter</a:t>
-            </a:r>
-            <a:r>
-              <a:rPr lang="en-US" altLang="zh-CN" dirty="0" smtClean="0"/>
-              <a:t> – </a:t>
-            </a:r>
-            <a:r>
-              <a:rPr lang="zh-CN" altLang="en-US" dirty="0" smtClean="0"/>
-              <a:t>返回 </a:t>
-            </a:r>
-            <a:r>
-              <a:rPr lang="en-US" dirty="0" err="1" smtClean="0"/>
-              <a:t>Iterable</a:t>
-            </a:r>
-            <a:r>
-              <a:rPr lang="en-US" dirty="0" smtClean="0"/>
-              <a:t>,</a:t>
-            </a:r>
-            <a:r>
-              <a:rPr lang="zh-CN" altLang="en-US" dirty="0" smtClean="0"/>
-              <a:t>速度最快，可复用</a:t>
-            </a:r>
-            <a:endParaRPr lang="en-US" altLang="zh-CN" dirty="0" smtClean="0"/>
-          </a:p>
-          <a:p>
-            <a:pPr lvl="1"/>
-            <a:r>
-              <a:rPr lang="en-US" altLang="zh-CN" dirty="0"/>
-              <a:t>Case!</a:t>
-            </a:r>
+              <a:t>StringBuffer</a:t>
+            </a:r>
+            <a:r>
+              <a:rPr lang="zh-CN" altLang="en-US" dirty="0" smtClean="0"/>
+              <a:t>的场景？</a:t>
+            </a:r>
+            <a:endParaRPr lang="en-US" altLang="zh-CN" dirty="0" smtClean="0"/>
+          </a:p>
+          <a:p>
+            <a:pPr marL="342900" lvl="1" indent="-342900">
+              <a:buFont typeface="Arial" pitchFamily="34" charset="0"/>
+              <a:buChar char="•"/>
+            </a:pPr>
+            <a:r>
+              <a:rPr lang="zh-CN" altLang="en-US" sz="3200" dirty="0"/>
+              <a:t>循环中总是使用</a:t>
+            </a:r>
+            <a:r>
+              <a:rPr lang="en-US" altLang="zh-CN" sz="3200" dirty="0" err="1"/>
+              <a:t>StirngBuilder</a:t>
+            </a:r>
+            <a:r>
+              <a:rPr lang="zh-CN" altLang="en-US" sz="3200" dirty="0"/>
+              <a:t>，而且预分配</a:t>
+            </a:r>
+            <a:r>
+              <a:rPr lang="zh-CN" altLang="en-US" sz="3200" dirty="0" smtClean="0"/>
+              <a:t>空间</a:t>
+            </a:r>
+            <a:endParaRPr lang="en-US" altLang="zh-CN" sz="3200" dirty="0" smtClean="0"/>
+          </a:p>
+          <a:p>
+            <a:pPr marL="342900" lvl="1" indent="-342900">
+              <a:buFont typeface="Arial" pitchFamily="34" charset="0"/>
+              <a:buChar char="•"/>
+            </a:pPr>
+            <a:r>
+              <a:rPr lang="en-US" altLang="zh-CN" sz="3200" dirty="0" smtClean="0"/>
+              <a:t>Log </a:t>
+            </a:r>
+            <a:r>
+              <a:rPr lang="zh-CN" altLang="en-US" sz="3200" dirty="0" smtClean="0"/>
+              <a:t>怎么打？</a:t>
+            </a:r>
+            <a:endParaRPr lang="en-US" altLang="zh-CN" sz="3200" dirty="0" smtClean="0"/>
+          </a:p>
+          <a:p>
+            <a:pPr marL="342900" lvl="1" indent="-342900">
+              <a:buFont typeface="Arial" pitchFamily="34" charset="0"/>
+              <a:buChar char="•"/>
+            </a:pPr>
+            <a:r>
+              <a:rPr lang="en-US" altLang="zh-CN" sz="3200" dirty="0" smtClean="0"/>
+              <a:t>Case</a:t>
+            </a:r>
+            <a:endParaRPr lang="en-US" altLang="zh-CN" sz="3200" dirty="0"/>
           </a:p>
         </p:txBody>
       </p:sp>
@@ -5876,72 +6154,170 @@
         </p:nvSpPr>
         <p:spPr/>
         <p:txBody>
+          <a:bodyPr/>
+          <a:lstStyle/>
+          <a:p>
+            <a:r>
+              <a:rPr lang="en-US" altLang="zh-CN" dirty="0" err="1" smtClean="0"/>
+              <a:t>StringBuilder</a:t>
+            </a:r>
+            <a:endParaRPr lang="zh-CN" altLang="en-US" dirty="0"/>
+          </a:p>
+        </p:txBody>
+      </p:sp>
+      <p:sp>
+        <p:nvSpPr>
+          <p:cNvPr id="3" name="内容占位符 2"/>
+          <p:cNvSpPr>
+            <a:spLocks noGrp="1"/>
+          </p:cNvSpPr>
+          <p:nvPr>
+            <p:ph idx="1"/>
+          </p:nvPr>
+        </p:nvSpPr>
+        <p:spPr/>
+        <p:txBody>
           <a:bodyPr>
-            <a:normAutofit/>
+            <a:normAutofit lnSpcReduction="10000"/>
           </a:bodyPr>
           <a:lstStyle/>
           <a:p>
-            <a:r>
-              <a:rPr lang="zh-CN" altLang="en-US" sz="3200" dirty="0" smtClean="0"/>
-              <a:t>编写工程质量高的代码</a:t>
-            </a:r>
-            <a:r>
-              <a:rPr lang="en-US" altLang="zh-CN" sz="3200" dirty="0"/>
+            <a:pPr>
+              <a:buNone/>
+            </a:pPr>
+            <a:r>
+              <a:rPr lang="zh-CN" altLang="en-US" dirty="0" smtClean="0"/>
+              <a:t>生成</a:t>
+            </a:r>
+            <a:r>
+              <a:rPr lang="en-US" altLang="zh-CN" dirty="0" smtClean="0"/>
+              <a:t>129</a:t>
+            </a:r>
+            <a:r>
+              <a:rPr lang="zh-CN" altLang="en-US" dirty="0" smtClean="0"/>
+              <a:t>个字符的字符串需要多少内存？</a:t>
+            </a:r>
+            <a:endParaRPr lang="en-US" altLang="zh-CN" dirty="0" smtClean="0"/>
+          </a:p>
+          <a:p>
+            <a:pPr>
+              <a:buNone/>
+            </a:pPr>
+            <a:r>
+              <a:rPr lang="en-US" altLang="zh-CN" dirty="0" err="1" smtClean="0"/>
+              <a:t>StringBuilder</a:t>
+            </a:r>
+            <a:r>
+              <a:rPr lang="en-US" altLang="zh-CN" dirty="0" smtClean="0"/>
               <a:t> </a:t>
             </a:r>
             <a:r>
-              <a:rPr lang="en-US" altLang="zh-CN" sz="3200" dirty="0" smtClean="0"/>
-              <a:t>– </a:t>
-            </a:r>
-            <a:r>
-              <a:rPr lang="zh-CN" altLang="en-US" sz="3200" dirty="0" smtClean="0"/>
-              <a:t>编写正确的代码</a:t>
-            </a:r>
-            <a:endParaRPr lang="zh-CN" altLang="en-US" sz="3200" dirty="0"/>
-          </a:p>
-        </p:txBody>
-      </p:sp>
-      <p:sp>
-        <p:nvSpPr>
-          <p:cNvPr id="3" name="内容占位符 2"/>
-          <p:cNvSpPr>
-            <a:spLocks noGrp="1"/>
-          </p:cNvSpPr>
-          <p:nvPr>
-            <p:ph idx="1"/>
-          </p:nvPr>
-        </p:nvSpPr>
-        <p:spPr/>
-        <p:txBody>
-          <a:bodyPr/>
-          <a:lstStyle/>
-          <a:p>
-            <a:r>
-              <a:rPr lang="zh-CN" altLang="en-US" dirty="0" smtClean="0"/>
-              <a:t>靠看书</a:t>
-            </a:r>
-            <a:endParaRPr lang="en-US" altLang="zh-CN" dirty="0" smtClean="0"/>
-          </a:p>
-          <a:p>
-            <a:r>
-              <a:rPr lang="zh-CN" altLang="en-US" dirty="0" smtClean="0"/>
-              <a:t>靠经验</a:t>
-            </a:r>
-            <a:endParaRPr lang="en-US" altLang="zh-CN" dirty="0" smtClean="0"/>
-          </a:p>
-          <a:p>
-            <a:r>
-              <a:rPr lang="zh-CN" altLang="en-US" dirty="0" smtClean="0"/>
-              <a:t>靠看优秀的代码</a:t>
-            </a:r>
-            <a:endParaRPr lang="en-US" altLang="zh-CN" dirty="0" smtClean="0"/>
-          </a:p>
-          <a:p>
-            <a:r>
-              <a:rPr lang="zh-CN" altLang="en-US" dirty="0" smtClean="0"/>
-              <a:t>靠自动化</a:t>
-            </a:r>
-            <a:endParaRPr lang="en-US" altLang="zh-CN" dirty="0" smtClean="0"/>
+              <a:rPr lang="en-US" altLang="zh-CN" dirty="0" err="1" smtClean="0"/>
+              <a:t>sb</a:t>
+            </a:r>
+            <a:r>
+              <a:rPr lang="en-US" altLang="zh-CN" dirty="0" smtClean="0"/>
+              <a:t> = new </a:t>
+            </a:r>
+            <a:r>
+              <a:rPr lang="en-US" altLang="zh-CN" dirty="0" err="1" smtClean="0"/>
+              <a:t>StringBuilder</a:t>
+            </a:r>
+            <a:r>
+              <a:rPr lang="en-US" altLang="zh-CN" dirty="0" smtClean="0"/>
+              <a:t>();</a:t>
+            </a:r>
+          </a:p>
+          <a:p>
+            <a:pPr>
+              <a:buNone/>
+            </a:pPr>
+            <a:r>
+              <a:rPr lang="en-US" altLang="zh-CN" dirty="0" smtClean="0"/>
+              <a:t>For(</a:t>
+            </a:r>
+            <a:r>
+              <a:rPr lang="en-US" altLang="zh-CN" dirty="0" err="1" smtClean="0"/>
+              <a:t>int</a:t>
+            </a:r>
+            <a:r>
+              <a:rPr lang="en-US" altLang="zh-CN" dirty="0" smtClean="0"/>
+              <a:t> </a:t>
+            </a:r>
+            <a:r>
+              <a:rPr lang="en-US" altLang="zh-CN" dirty="0" err="1" smtClean="0"/>
+              <a:t>i</a:t>
+            </a:r>
+            <a:r>
+              <a:rPr lang="en-US" altLang="zh-CN" dirty="0" smtClean="0"/>
+              <a:t> = 0 ; </a:t>
+            </a:r>
+            <a:r>
+              <a:rPr lang="en-US" altLang="zh-CN" dirty="0" err="1" smtClean="0"/>
+              <a:t>i</a:t>
+            </a:r>
+            <a:r>
+              <a:rPr lang="en-US" altLang="zh-CN" dirty="0" smtClean="0"/>
+              <a:t>&lt; 128;i++){</a:t>
+            </a:r>
+          </a:p>
+          <a:p>
+            <a:pPr>
+              <a:buNone/>
+            </a:pPr>
+            <a:r>
+              <a:rPr lang="en-US" altLang="zh-CN" dirty="0" smtClean="0"/>
+              <a:t>	</a:t>
+            </a:r>
+            <a:r>
+              <a:rPr lang="en-US" altLang="zh-CN" dirty="0" err="1" smtClean="0"/>
+              <a:t>sb.append</a:t>
+            </a:r>
+            <a:r>
+              <a:rPr lang="en-US" altLang="zh-CN" dirty="0" smtClean="0"/>
+              <a:t>(“a”);</a:t>
+            </a:r>
+          </a:p>
+          <a:p>
+            <a:pPr>
+              <a:buNone/>
+            </a:pPr>
+            <a:r>
+              <a:rPr lang="en-US" altLang="zh-CN" dirty="0" smtClean="0"/>
+              <a:t>}</a:t>
+            </a:r>
+          </a:p>
+          <a:p>
+            <a:pPr>
+              <a:buNone/>
+            </a:pPr>
+            <a:r>
+              <a:rPr lang="en-US" altLang="zh-CN" dirty="0" smtClean="0"/>
+              <a:t>16+32+64+128+256=496</a:t>
+            </a:r>
+          </a:p>
+          <a:p>
+            <a:pPr>
+              <a:buNone/>
+            </a:pPr>
+            <a:r>
+              <a:rPr lang="en-US" altLang="zh-CN" dirty="0" err="1" smtClean="0"/>
+              <a:t>Sb.toString</a:t>
+            </a:r>
+            <a:r>
+              <a:rPr lang="en-US" altLang="zh-CN" dirty="0" smtClean="0"/>
+              <a:t>() -&gt; 129</a:t>
+            </a:r>
+          </a:p>
+          <a:p>
+            <a:pPr>
+              <a:buNone/>
+            </a:pPr>
+            <a:r>
+              <a:rPr lang="en-US" altLang="zh-CN" dirty="0" smtClean="0"/>
+              <a:t>496+129=525 bytes</a:t>
+            </a:r>
+            <a:endParaRPr lang="zh-CN" altLang="en-US" dirty="0"/>
           </a:p>
         </p:txBody>
       </p:sp>
@@ -5972,6 +6348,37 @@
       </p:grpSpPr>
       <p:sp>
         <p:nvSpPr>
+          <p:cNvPr id="2" name="标题 1"/>
+          <p:cNvSpPr>
+            <a:spLocks noGrp="1"/>
+          </p:cNvSpPr>
+          <p:nvPr>
+            <p:ph type="title"/>
+          </p:nvPr>
+        </p:nvSpPr>
+        <p:spPr/>
+        <p:txBody>
+          <a:bodyPr/>
+          <a:lstStyle/>
+          <a:p>
+            <a:r>
+              <a:rPr lang="en-US" altLang="zh-CN" dirty="0" smtClean="0"/>
+              <a:t>String Performance </a:t>
+            </a:r>
+            <a:r>
+              <a:rPr lang="en-US" altLang="zh-CN" dirty="0"/>
+              <a:t>T</a:t>
+            </a:r>
+            <a:r>
+              <a:rPr lang="en-US" altLang="zh-CN" dirty="0" smtClean="0"/>
+              <a:t>ips</a:t>
+            </a:r>
+            <a:endParaRPr lang="zh-CN" altLang="en-US" dirty="0"/>
+          </a:p>
+        </p:txBody>
+      </p:sp>
+      <p:sp>
+        <p:nvSpPr>
           <p:cNvPr id="3" name="内容占位符 2"/>
           <p:cNvSpPr>
             <a:spLocks noGrp="1"/>
@@ -5982,134 +6389,118 @@
         </p:nvSpPr>
         <p:spPr/>
         <p:txBody>
-          <a:bodyPr>
-            <a:normAutofit lnSpcReduction="10000"/>
-          </a:bodyPr>
-          <a:lstStyle/>
-          <a:p>
-            <a:r>
-              <a:rPr lang="zh-CN" altLang="en-US" dirty="0" smtClean="0"/>
-              <a:t>使用 </a:t>
-            </a:r>
+          <a:bodyPr/>
+          <a:lstStyle/>
+          <a:p>
+            <a:r>
+              <a:rPr lang="en-US" altLang="zh-CN" dirty="0" smtClean="0"/>
+              <a:t>split</a:t>
+            </a:r>
+          </a:p>
+          <a:p>
+            <a:pPr lvl="1"/>
+            <a:r>
+              <a:rPr lang="zh-CN" altLang="en-US" dirty="0" smtClean="0"/>
+              <a:t>大量使用，各种使用</a:t>
+            </a:r>
+            <a:r>
+              <a:rPr lang="en-US" altLang="zh-CN" dirty="0" smtClean="0"/>
+              <a:t>”,”</a:t>
+            </a:r>
+            <a:r>
+              <a:rPr lang="zh-CN" altLang="en-US" dirty="0" smtClean="0"/>
+              <a:t>和</a:t>
+            </a:r>
+            <a:r>
+              <a:rPr lang="en-US" altLang="zh-CN" dirty="0" smtClean="0"/>
+              <a:t>”|” </a:t>
+            </a:r>
+            <a:r>
+              <a:rPr lang="zh-CN" altLang="en-US" dirty="0" smtClean="0"/>
+              <a:t>分隔的场景</a:t>
+            </a:r>
+            <a:endParaRPr lang="en-US" altLang="zh-CN" dirty="0" smtClean="0"/>
+          </a:p>
+          <a:p>
+            <a:pPr lvl="1"/>
+            <a:r>
+              <a:rPr lang="zh-CN" altLang="en-US" dirty="0" smtClean="0"/>
+              <a:t>慢的原因，每次创建一个新的正则表达式</a:t>
+            </a:r>
+            <a:endParaRPr lang="en-US" altLang="zh-CN" dirty="0" smtClean="0"/>
+          </a:p>
+          <a:p>
+            <a:pPr lvl="1"/>
+            <a:r>
+              <a:rPr lang="zh-CN" altLang="en-US" dirty="0" smtClean="0"/>
+              <a:t>高性能替代品</a:t>
+            </a:r>
+            <a:endParaRPr lang="en-US" altLang="zh-CN" dirty="0" smtClean="0"/>
+          </a:p>
+          <a:p>
+            <a:pPr lvl="2"/>
             <a:r>
               <a:rPr lang="en-US" altLang="zh-CN" dirty="0" err="1" smtClean="0"/>
-              <a:t>SonarQube</a:t>
-            </a:r>
-            <a:r>
-              <a:rPr lang="en-US" altLang="zh-CN" dirty="0" smtClean="0"/>
-              <a:t> </a:t>
-            </a:r>
-            <a:r>
-              <a:rPr lang="zh-CN" altLang="en-US" dirty="0" smtClean="0"/>
-              <a:t>来自动化分析工程质量</a:t>
-            </a:r>
-            <a:endParaRPr lang="en-US" altLang="zh-CN" dirty="0" smtClean="0"/>
-          </a:p>
-          <a:p>
-            <a:r>
-              <a:rPr lang="zh-CN" altLang="en-US" dirty="0" smtClean="0"/>
-              <a:t>取代</a:t>
+              <a:t>StringUtils</a:t>
+            </a:r>
+            <a:r>
+              <a:rPr lang="en-US" altLang="zh-CN" dirty="0" smtClean="0"/>
+              <a:t> – </a:t>
+            </a:r>
+            <a:r>
+              <a:rPr lang="zh-CN" altLang="en-US" dirty="0" smtClean="0"/>
+              <a:t>返回数组，速度优于 </a:t>
             </a:r>
             <a:r>
               <a:rPr lang="en-US" altLang="zh-CN" dirty="0" err="1" smtClean="0"/>
-              <a:t>Fingbugs+CheckStyle</a:t>
-            </a:r>
-            <a:endParaRPr lang="en-US" altLang="zh-CN" dirty="0" smtClean="0"/>
-          </a:p>
-          <a:p>
-            <a:r>
-              <a:rPr lang="zh-CN" altLang="en-US" dirty="0" smtClean="0"/>
-              <a:t>更丰富的信息和图表</a:t>
-            </a:r>
-            <a:r>
-              <a:rPr lang="en-US" altLang="zh-CN" dirty="0" smtClean="0"/>
-              <a:t>,JIRA Style</a:t>
-            </a:r>
-          </a:p>
-          <a:p>
-            <a:r>
-              <a:rPr lang="en-US" altLang="zh-CN" dirty="0" smtClean="0"/>
-              <a:t>IDE PLUGIN</a:t>
-            </a:r>
-            <a:r>
-              <a:rPr lang="zh-CN" altLang="en-US" dirty="0" smtClean="0"/>
-              <a:t>：</a:t>
-            </a:r>
-            <a:r>
-              <a:rPr lang="en-US" altLang="zh-CN" dirty="0" err="1"/>
-              <a:t>S</a:t>
+              <a:t>String.split</a:t>
+            </a:r>
+            <a:r>
+              <a:rPr lang="en-US" altLang="zh-CN" dirty="0" smtClean="0"/>
+              <a:t>();</a:t>
+            </a:r>
+          </a:p>
+          <a:p>
+            <a:pPr lvl="2"/>
+            <a:r>
+              <a:rPr lang="en-US" altLang="zh-CN" dirty="0" smtClean="0"/>
+              <a:t>Guava </a:t>
             </a:r>
             <a:r>
               <a:rPr lang="en-US" altLang="zh-CN" dirty="0" err="1" smtClean="0"/>
-              <a:t>onarLint</a:t>
-            </a:r>
-            <a:r>
-              <a:rPr lang="en-US" altLang="zh-CN" dirty="0" smtClean="0"/>
-              <a:t> </a:t>
-            </a:r>
-            <a:r>
-              <a:rPr lang="zh-CN" altLang="en-US" dirty="0" smtClean="0"/>
-              <a:t>实时分析代码</a:t>
-            </a:r>
-            <a:endParaRPr lang="en-US" altLang="zh-CN" dirty="0" smtClean="0"/>
-          </a:p>
-          <a:p>
-            <a:endParaRPr lang="en-US" altLang="zh-CN" dirty="0" smtClean="0"/>
-          </a:p>
-          <a:p>
-            <a:r>
-              <a:rPr lang="zh-CN" altLang="en-US" dirty="0" smtClean="0"/>
-              <a:t>目前猎人项目使用 </a:t>
-            </a:r>
-            <a:r>
-              <a:rPr lang="en-US" altLang="zh-CN" dirty="0" err="1" smtClean="0"/>
-              <a:t>SonarQube</a:t>
-            </a:r>
-            <a:r>
-              <a:rPr lang="en-US" altLang="zh-CN" dirty="0" smtClean="0"/>
-              <a:t> </a:t>
-            </a:r>
-            <a:r>
-              <a:rPr lang="zh-CN" altLang="en-US" dirty="0" smtClean="0"/>
-              <a:t>来做代码质量分析</a:t>
-            </a:r>
-            <a:endParaRPr lang="en-US" altLang="zh-CN" dirty="0" smtClean="0"/>
-          </a:p>
-          <a:p>
-            <a:r>
-              <a:rPr lang="en-US" altLang="zh-CN" dirty="0" smtClean="0"/>
-              <a:t>Demo: http://xxzl.sonar.web.58dns.org:9000/</a:t>
-            </a:r>
-          </a:p>
-          <a:p>
-            <a:endParaRPr lang="zh-CN" altLang="en-US" dirty="0"/>
-          </a:p>
-        </p:txBody>
-      </p:sp>
-      <p:pic>
-        <p:nvPicPr>
-          <p:cNvPr id="4" name="图片 3" descr="sonar.png"/>
-          <p:cNvPicPr>
-            <a:picLocks noChangeAspect="1"/>
-          </p:cNvPicPr>
-          <p:nvPr/>
-        </p:nvPicPr>
-        <p:blipFill>
-          <a:blip r:embed="rId2"/>
-          <a:stretch>
-            <a:fillRect/>
-          </a:stretch>
-        </p:blipFill>
-        <p:spPr>
-          <a:xfrm>
-            <a:off x="3500430" y="571480"/>
-            <a:ext cx="2357454" cy="612938"/>
-          </a:xfrm>
-          <a:prstGeom prst="rect">
-            <a:avLst/>
-          </a:prstGeom>
-        </p:spPr>
-      </p:pic>
+              <a:t>Spliter</a:t>
+            </a:r>
+            <a:r>
+              <a:rPr lang="en-US" altLang="zh-CN" dirty="0" smtClean="0"/>
+              <a:t> – </a:t>
+            </a:r>
+            <a:r>
+              <a:rPr lang="zh-CN" altLang="en-US" dirty="0" smtClean="0"/>
+              <a:t>返回 </a:t>
+            </a:r>
+            <a:r>
+              <a:rPr lang="en-US" dirty="0" err="1" smtClean="0"/>
+              <a:t>Iterable</a:t>
+            </a:r>
+            <a:r>
+              <a:rPr lang="en-US" dirty="0" smtClean="0"/>
+              <a:t>,</a:t>
+            </a:r>
+            <a:r>
+              <a:rPr lang="zh-CN" altLang="en-US" dirty="0" smtClean="0"/>
+              <a:t>速度最快，可复用</a:t>
+            </a:r>
+            <a:endParaRPr lang="en-US" altLang="zh-CN" dirty="0" smtClean="0"/>
+          </a:p>
+          <a:p>
+            <a:pPr lvl="1"/>
+            <a:r>
+              <a:rPr lang="en-US" altLang="zh-CN" dirty="0"/>
+              <a:t>Case!</a:t>
+            </a:r>
+          </a:p>
+        </p:txBody>
+      </p:sp>
     </p:spTree>
   </p:cSld>
   <p:clrMapOvr>
@@ -6147,40 +6538,75 @@
         </p:nvSpPr>
         <p:spPr/>
         <p:txBody>
-          <a:bodyPr/>
-          <a:lstStyle/>
-          <a:p>
-            <a:r>
-              <a:rPr lang="zh-CN" altLang="en-US" dirty="0" smtClean="0"/>
-              <a:t>工具集</a:t>
-            </a:r>
-            <a:endParaRPr lang="zh-CN" altLang="en-US" dirty="0"/>
-          </a:p>
-        </p:txBody>
-      </p:sp>
-      <p:pic>
-        <p:nvPicPr>
-          <p:cNvPr id="4" name="内容占位符 3" descr="duke_java__1__large.jpg"/>
-          <p:cNvPicPr>
-            <a:picLocks noGrp="1" noChangeAspect="1"/>
-          </p:cNvPicPr>
+          <a:bodyPr>
+            <a:normAutofit/>
+          </a:bodyPr>
+          <a:lstStyle/>
+          <a:p>
+            <a:r>
+              <a:rPr lang="zh-CN" altLang="en-US" sz="3200" dirty="0" smtClean="0"/>
+              <a:t>编写工程质量高的代码</a:t>
+            </a:r>
+            <a:r>
+              <a:rPr lang="en-US" altLang="zh-CN" sz="3200" dirty="0"/>
+              <a:t> </a:t>
+            </a:r>
+            <a:r>
+              <a:rPr lang="en-US" altLang="zh-CN" sz="3200" dirty="0" smtClean="0"/>
+              <a:t>– </a:t>
+            </a:r>
+            <a:r>
+              <a:rPr lang="zh-CN" altLang="en-US" sz="3200" dirty="0" smtClean="0"/>
+              <a:t>编写正确的代码</a:t>
+            </a:r>
+            <a:endParaRPr lang="zh-CN" altLang="en-US" sz="3200" dirty="0"/>
+          </a:p>
+        </p:txBody>
+      </p:sp>
+      <p:sp>
+        <p:nvSpPr>
+          <p:cNvPr id="3" name="内容占位符 2"/>
+          <p:cNvSpPr>
+            <a:spLocks noGrp="1"/>
+          </p:cNvSpPr>
           <p:nvPr>
             <p:ph idx="1"/>
           </p:nvPr>
-        </p:nvPicPr>
-        <p:blipFill>
-          <a:blip r:embed="rId2"/>
-          <a:stretch>
-            <a:fillRect/>
-          </a:stretch>
-        </p:blipFill>
-        <p:spPr>
-          <a:xfrm>
-            <a:off x="1284375" y="1600200"/>
-            <a:ext cx="6575249" cy="4525963"/>
-          </a:xfrm>
-        </p:spPr>
-      </p:pic>
+        </p:nvSpPr>
+        <p:spPr/>
+        <p:txBody>
+          <a:bodyPr/>
+          <a:lstStyle/>
+          <a:p>
+            <a:r>
+              <a:rPr lang="zh-CN" altLang="en-US" dirty="0" smtClean="0"/>
+              <a:t>靠看书</a:t>
+            </a:r>
+            <a:endParaRPr lang="en-US" altLang="zh-CN" dirty="0" smtClean="0"/>
+          </a:p>
+          <a:p>
+            <a:r>
+              <a:rPr lang="zh-CN" altLang="en-US" dirty="0" smtClean="0"/>
+              <a:t>靠经验</a:t>
+            </a:r>
+            <a:endParaRPr lang="en-US" altLang="zh-CN" dirty="0" smtClean="0"/>
+          </a:p>
+          <a:p>
+            <a:r>
+              <a:rPr lang="zh-CN" altLang="en-US" dirty="0" smtClean="0"/>
+              <a:t>靠看优秀的代码</a:t>
+            </a:r>
+            <a:endParaRPr lang="en-US" altLang="zh-CN" dirty="0" smtClean="0"/>
+          </a:p>
+          <a:p>
+            <a:r>
+              <a:rPr lang="zh-CN" altLang="en-US" dirty="0" smtClean="0"/>
+              <a:t>靠自动化</a:t>
+            </a:r>
+            <a:endParaRPr lang="en-US" altLang="zh-CN" dirty="0" smtClean="0"/>
+          </a:p>
+        </p:txBody>
+      </p:sp>
     </p:spTree>
   </p:cSld>
   <p:clrMapOvr>
@@ -6322,145 +6748,144 @@
       </p:grpSpPr>
       <p:sp>
         <p:nvSpPr>
-          <p:cNvPr id="2" name="标题 1"/>
-          <p:cNvSpPr>
-            <a:spLocks noGrp="1"/>
-          </p:cNvSpPr>
-          <p:nvPr>
-            <p:ph type="title"/>
+          <p:cNvPr id="3" name="内容占位符 2"/>
+          <p:cNvSpPr>
+            <a:spLocks noGrp="1"/>
+          </p:cNvSpPr>
+          <p:nvPr>
+            <p:ph idx="1"/>
           </p:nvPr>
         </p:nvSpPr>
         <p:spPr/>
         <p:txBody>
           <a:bodyPr>
-            <a:normAutofit/>
+            <a:normAutofit lnSpcReduction="10000"/>
           </a:bodyPr>
           <a:lstStyle/>
           <a:p>
             <a:r>
               <a:rPr lang="zh-CN" altLang="en-US" dirty="0" smtClean="0"/>
-              <a:t>线下性能分析</a:t>
-            </a:r>
-            <a:r>
-              <a:rPr lang="en-US" altLang="zh-CN" dirty="0" smtClean="0"/>
-              <a:t>- </a:t>
-            </a:r>
-            <a:r>
-              <a:rPr lang="en-US" altLang="zh-CN" dirty="0" smtClean="0"/>
-              <a:t>JMC</a:t>
-            </a:r>
+              <a:t>使用 </a:t>
+            </a:r>
+            <a:r>
+              <a:rPr lang="en-US" altLang="zh-CN" dirty="0" err="1" smtClean="0"/>
+              <a:t>SonarQube</a:t>
+            </a:r>
+            <a:r>
+              <a:rPr lang="en-US" altLang="zh-CN" dirty="0" smtClean="0"/>
+              <a:t> </a:t>
+            </a:r>
+            <a:r>
+              <a:rPr lang="zh-CN" altLang="en-US" dirty="0" smtClean="0"/>
+              <a:t>来自动化分析工程质量</a:t>
+            </a:r>
+            <a:endParaRPr lang="en-US" altLang="zh-CN" dirty="0" smtClean="0"/>
+          </a:p>
+          <a:p>
+            <a:r>
+              <a:rPr lang="zh-CN" altLang="en-US" dirty="0" smtClean="0"/>
+              <a:t>取代</a:t>
+            </a:r>
+            <a:r>
+              <a:rPr lang="en-US" altLang="zh-CN" dirty="0" err="1" smtClean="0"/>
+              <a:t>Fingbugs+CheckStyle</a:t>
+            </a:r>
+            <a:endParaRPr lang="en-US" altLang="zh-CN" dirty="0" smtClean="0"/>
+          </a:p>
+          <a:p>
+            <a:r>
+              <a:rPr lang="zh-CN" altLang="en-US" dirty="0" smtClean="0"/>
+              <a:t>更丰富的信息和图表</a:t>
+            </a:r>
+            <a:r>
+              <a:rPr lang="en-US" altLang="zh-CN" dirty="0" smtClean="0"/>
+              <a:t>,JIRA Style</a:t>
+            </a:r>
+          </a:p>
+          <a:p>
+            <a:r>
+              <a:rPr lang="en-US" altLang="zh-CN" dirty="0" smtClean="0"/>
+              <a:t>IDE PLUGIN</a:t>
+            </a:r>
+            <a:r>
+              <a:rPr lang="zh-CN" altLang="en-US" dirty="0" smtClean="0"/>
+              <a:t>：</a:t>
+            </a:r>
+            <a:r>
+              <a:rPr lang="en-US" altLang="zh-CN" dirty="0" err="1"/>
+              <a:t>S</a:t>
+            </a:r>
+            <a:r>
+              <a:rPr lang="en-US" altLang="zh-CN" dirty="0" err="1" smtClean="0"/>
+              <a:t>onarLint</a:t>
+            </a:r>
+            <a:r>
+              <a:rPr lang="en-US" altLang="zh-CN" dirty="0" smtClean="0"/>
+              <a:t> </a:t>
+            </a:r>
+            <a:r>
+              <a:rPr lang="zh-CN" altLang="en-US" dirty="0" smtClean="0"/>
+              <a:t>实时分析代码</a:t>
+            </a:r>
+            <a:endParaRPr lang="en-US" altLang="zh-CN" dirty="0" smtClean="0"/>
+          </a:p>
+          <a:p>
+            <a:endParaRPr lang="en-US" altLang="zh-CN" dirty="0" smtClean="0"/>
+          </a:p>
+          <a:p>
+            <a:r>
+              <a:rPr lang="zh-CN" altLang="en-US" dirty="0" smtClean="0"/>
+              <a:t>目前猎人项目使用 </a:t>
+            </a:r>
+            <a:r>
+              <a:rPr lang="en-US" altLang="zh-CN" dirty="0" err="1" smtClean="0"/>
+              <a:t>SonarQube</a:t>
+            </a:r>
+            <a:r>
+              <a:rPr lang="en-US" altLang="zh-CN" dirty="0" smtClean="0"/>
+              <a:t> </a:t>
+            </a:r>
+            <a:r>
+              <a:rPr lang="zh-CN" altLang="en-US" dirty="0" smtClean="0"/>
+              <a:t>来做代码质量分析</a:t>
+            </a:r>
+            <a:endParaRPr lang="en-US" altLang="zh-CN" dirty="0" smtClean="0"/>
+          </a:p>
+          <a:p>
+            <a:r>
+              <a:rPr lang="en-US" altLang="zh-CN" dirty="0" smtClean="0"/>
+              <a:t>Demo: http://xxzl.sonar.web.58dns.org:9000/</a:t>
+            </a:r>
+          </a:p>
+          <a:p>
             <a:endParaRPr lang="zh-CN" altLang="en-US" dirty="0"/>
           </a:p>
         </p:txBody>
       </p:sp>
-      <p:sp>
-        <p:nvSpPr>
-          <p:cNvPr id="3" name="内容占位符 2"/>
-          <p:cNvSpPr>
-            <a:spLocks noGrp="1"/>
-          </p:cNvSpPr>
-          <p:nvPr>
-            <p:ph idx="1"/>
-          </p:nvPr>
-        </p:nvSpPr>
-        <p:spPr/>
-        <p:txBody>
-          <a:bodyPr/>
-          <a:lstStyle/>
-          <a:p>
-            <a:r>
-              <a:rPr lang="en-US" altLang="zh-CN" dirty="0" smtClean="0"/>
-              <a:t>Java Mission Control</a:t>
-            </a:r>
-          </a:p>
-          <a:p>
-            <a:r>
-              <a:rPr lang="zh-CN" altLang="en-US" dirty="0" smtClean="0"/>
-              <a:t>原</a:t>
-            </a:r>
-            <a:r>
-              <a:rPr lang="en-US" altLang="zh-CN" dirty="0" smtClean="0"/>
-              <a:t>BEA </a:t>
-            </a:r>
-            <a:r>
-              <a:rPr lang="en-US" altLang="zh-CN" dirty="0" err="1" smtClean="0"/>
-              <a:t>JRockit</a:t>
-            </a:r>
-            <a:r>
-              <a:rPr lang="en-US" altLang="zh-CN" dirty="0" smtClean="0"/>
-              <a:t> VM</a:t>
-            </a:r>
-            <a:r>
-              <a:rPr lang="zh-CN" altLang="en-US" dirty="0" smtClean="0"/>
-              <a:t>重量级产品</a:t>
-            </a:r>
-            <a:endParaRPr lang="en-US" altLang="zh-CN" dirty="0" smtClean="0"/>
-          </a:p>
-          <a:p>
-            <a:r>
-              <a:rPr lang="en-US" altLang="zh-CN" dirty="0" err="1" smtClean="0"/>
-              <a:t>JRockit</a:t>
-            </a:r>
-            <a:r>
-              <a:rPr lang="en-US" altLang="zh-CN" dirty="0" smtClean="0"/>
-              <a:t> VM</a:t>
-            </a:r>
-            <a:r>
-              <a:rPr lang="zh-CN" altLang="en-US" dirty="0" smtClean="0"/>
-              <a:t>和</a:t>
-            </a:r>
-            <a:r>
-              <a:rPr lang="en-US" altLang="zh-CN" dirty="0" err="1" smtClean="0"/>
-              <a:t>HotSpot</a:t>
-            </a:r>
-            <a:r>
-              <a:rPr lang="en-US" altLang="zh-CN" dirty="0" smtClean="0"/>
-              <a:t> VM</a:t>
-            </a:r>
-            <a:r>
-              <a:rPr lang="zh-CN" altLang="en-US" dirty="0" smtClean="0"/>
-              <a:t>融合以后，</a:t>
-            </a:r>
-            <a:r>
-              <a:rPr lang="en-US" altLang="zh-CN" dirty="0" err="1" smtClean="0"/>
-              <a:t>HotSpot</a:t>
-            </a:r>
-            <a:r>
-              <a:rPr lang="en-US" altLang="zh-CN" dirty="0" smtClean="0"/>
-              <a:t> VM</a:t>
-            </a:r>
-            <a:r>
-              <a:rPr lang="zh-CN" altLang="en-US" dirty="0" smtClean="0"/>
-              <a:t>也可以用了</a:t>
-            </a:r>
-            <a:endParaRPr lang="en-US" altLang="zh-CN" dirty="0" smtClean="0"/>
-          </a:p>
-          <a:p>
-            <a:r>
-              <a:rPr lang="zh-CN" altLang="en-US" dirty="0" smtClean="0"/>
-              <a:t>基于采样分析</a:t>
-            </a:r>
-            <a:r>
-              <a:rPr lang="en-US" altLang="zh-CN" dirty="0" smtClean="0"/>
-              <a:t>,</a:t>
-            </a:r>
-            <a:r>
-              <a:rPr lang="zh-CN" altLang="en-US" dirty="0" smtClean="0"/>
-              <a:t>性能消耗低</a:t>
-            </a:r>
-            <a:endParaRPr lang="en-US" altLang="zh-CN" dirty="0" smtClean="0"/>
-          </a:p>
-          <a:p>
-            <a:r>
-              <a:rPr lang="en-US" altLang="zh-CN" dirty="0" smtClean="0"/>
-              <a:t>Oracle VM only</a:t>
-            </a:r>
-          </a:p>
-          <a:p>
-            <a:endParaRPr lang="en-US" altLang="zh-CN" dirty="0" smtClean="0"/>
-          </a:p>
-        </p:txBody>
-      </p:sp>
+      <p:pic>
+        <p:nvPicPr>
+          <p:cNvPr id="4" name="图片 3" descr="sonar.png"/>
+          <p:cNvPicPr>
+            <a:picLocks noChangeAspect="1"/>
+          </p:cNvPicPr>
+          <p:nvPr/>
+        </p:nvPicPr>
+        <p:blipFill>
+          <a:blip r:embed="rId2"/>
+          <a:stretch>
+            <a:fillRect/>
+          </a:stretch>
+        </p:blipFill>
+        <p:spPr>
+          <a:xfrm>
+            <a:off x="3500430" y="571480"/>
+            <a:ext cx="2357454" cy="612938"/>
+          </a:xfrm>
+          <a:prstGeom prst="rect">
+            <a:avLst/>
+          </a:prstGeom>
+        </p:spPr>
+      </p:pic>
     </p:spTree>
   </p:cSld>
   <p:clrMapOvr>
@@ -6503,58 +6928,35 @@
           <a:p>
             <a:r>
               <a:rPr lang="zh-CN" altLang="en-US" dirty="0" smtClean="0"/>
-              <a:t>线下性能分析</a:t>
-            </a:r>
-            <a:r>
-              <a:rPr lang="en-US" altLang="zh-CN" dirty="0" smtClean="0"/>
-              <a:t>- Visual VM</a:t>
+              <a:t>工具集</a:t>
             </a:r>
             <a:endParaRPr lang="zh-CN" altLang="en-US" dirty="0"/>
           </a:p>
         </p:txBody>
       </p:sp>
-      <p:sp>
-        <p:nvSpPr>
-          <p:cNvPr id="3" name="内容占位符 2"/>
-          <p:cNvSpPr>
-            <a:spLocks noGrp="1"/>
-          </p:cNvSpPr>
+      <p:pic>
+        <p:nvPicPr>
+          <p:cNvPr id="4" name="内容占位符 3" descr="duke_java__1__large.jpg"/>
+          <p:cNvPicPr>
+            <a:picLocks noGrp="1" noChangeAspect="1"/>
+          </p:cNvPicPr>
           <p:nvPr>
             <p:ph idx="1"/>
           </p:nvPr>
-        </p:nvSpPr>
-        <p:spPr/>
-        <p:txBody>
-          <a:bodyPr/>
-          <a:lstStyle/>
-          <a:p>
-            <a:r>
-              <a:rPr lang="zh-CN" altLang="en-US" dirty="0" smtClean="0"/>
-              <a:t>丰富的插件支持</a:t>
-            </a:r>
-            <a:endParaRPr lang="en-US" altLang="zh-CN" dirty="0" smtClean="0"/>
-          </a:p>
-          <a:p>
-            <a:r>
-              <a:rPr lang="en-US" altLang="zh-CN" dirty="0" smtClean="0"/>
-              <a:t>All JVM</a:t>
-            </a:r>
-          </a:p>
-          <a:p>
-            <a:r>
-              <a:rPr lang="zh-CN" altLang="en-US" dirty="0" smtClean="0"/>
-              <a:t>常用的插件</a:t>
-            </a:r>
-            <a:r>
-              <a:rPr lang="en-US" altLang="zh-CN" dirty="0" smtClean="0"/>
-              <a:t>:Visual GC</a:t>
-            </a:r>
-          </a:p>
-          <a:p>
-            <a:endParaRPr lang="zh-CN" altLang="en-US" dirty="0"/>
-          </a:p>
-        </p:txBody>
-      </p:sp>
+        </p:nvPicPr>
+        <p:blipFill>
+          <a:blip r:embed="rId2"/>
+          <a:stretch>
+            <a:fillRect/>
+          </a:stretch>
+        </p:blipFill>
+        <p:spPr>
+          <a:xfrm>
+            <a:off x="1284375" y="1600200"/>
+            <a:ext cx="6575249" cy="4525963"/>
+          </a:xfrm>
+        </p:spPr>
+      </p:pic>
     </p:spTree>
   </p:cSld>
   <p:clrMapOvr>
@@ -6592,16 +6994,18 @@
         </p:nvSpPr>
         <p:spPr/>
         <p:txBody>
-          <a:bodyPr/>
-          <a:lstStyle/>
-          <a:p>
-            <a:r>
-              <a:rPr lang="zh-CN" altLang="en-US" dirty="0"/>
-              <a:t>线</a:t>
-            </a:r>
-            <a:r>
-              <a:rPr lang="zh-CN" altLang="en-US" dirty="0" smtClean="0"/>
-              <a:t>上问题分析</a:t>
+          <a:bodyPr>
+            <a:normAutofit/>
+          </a:bodyPr>
+          <a:lstStyle/>
+          <a:p>
+            <a:r>
+              <a:rPr lang="zh-CN" altLang="en-US" dirty="0" smtClean="0"/>
+              <a:t>线下性能分析</a:t>
+            </a:r>
+            <a:r>
+              <a:rPr lang="en-US" altLang="zh-CN" dirty="0" smtClean="0"/>
+              <a:t>- JMC</a:t>
             </a:r>
             <a:endParaRPr lang="zh-CN" altLang="en-US" dirty="0"/>
           </a:p>
@@ -6623,50 +7027,95 @@
           <a:lstStyle/>
           <a:p>
             <a:r>
-              <a:rPr lang="zh-CN" altLang="en-US" dirty="0" smtClean="0"/>
-              <a:t>谁调用了</a:t>
-            </a:r>
-            <a:r>
-              <a:rPr lang="en-US" altLang="zh-CN" dirty="0" smtClean="0"/>
-              <a:t>XXXX</a:t>
-            </a:r>
-            <a:r>
-              <a:rPr lang="zh-CN" altLang="en-US" dirty="0" smtClean="0"/>
-              <a:t>方法？</a:t>
-            </a:r>
-            <a:endParaRPr lang="en-US" altLang="zh-CN" dirty="0" smtClean="0"/>
-          </a:p>
-          <a:p>
-            <a:r>
-              <a:rPr lang="zh-CN" altLang="en-US" dirty="0" smtClean="0"/>
-              <a:t>这个变量到底是什么值？</a:t>
-            </a:r>
-            <a:endParaRPr lang="en-US" altLang="zh-CN" dirty="0" smtClean="0"/>
-          </a:p>
-          <a:p>
+              <a:rPr lang="en-US" altLang="zh-CN" dirty="0" smtClean="0"/>
+              <a:t>Java Mission Control</a:t>
+            </a:r>
+          </a:p>
+          <a:p>
+            <a:r>
+              <a:rPr lang="zh-CN" altLang="en-US" dirty="0" smtClean="0"/>
+              <a:t>原</a:t>
+            </a:r>
+            <a:r>
+              <a:rPr lang="en-US" altLang="zh-CN" dirty="0" smtClean="0"/>
+              <a:t>BEA </a:t>
+            </a:r>
             <a:r>
               <a:rPr lang="en-US" altLang="zh-CN" dirty="0" err="1" smtClean="0"/>
-              <a:t>Ifelse</a:t>
-            </a:r>
-            <a:r>
-              <a:rPr lang="zh-CN" altLang="en-US" dirty="0" smtClean="0"/>
-              <a:t>进入了哪个分支？</a:t>
-            </a:r>
-            <a:endParaRPr lang="en-US" altLang="zh-CN" dirty="0" smtClean="0"/>
-          </a:p>
-          <a:p>
-            <a:r>
-              <a:rPr lang="zh-CN" altLang="en-US" dirty="0" smtClean="0"/>
-              <a:t>性能慢，到底慢在哪？</a:t>
-            </a:r>
-            <a:endParaRPr lang="en-US" altLang="zh-CN" dirty="0" smtClean="0"/>
-          </a:p>
-          <a:p>
-            <a:r>
-              <a:rPr lang="zh-CN" altLang="en-US" dirty="0" smtClean="0"/>
-              <a:t>谁创建了超级大的数组？</a:t>
-            </a:r>
-            <a:endParaRPr lang="zh-CN" altLang="en-US" dirty="0"/>
+              <a:t>JRockit</a:t>
+            </a:r>
+            <a:r>
+              <a:rPr lang="en-US" altLang="zh-CN" dirty="0" smtClean="0"/>
+              <a:t> VM</a:t>
+            </a:r>
+            <a:r>
+              <a:rPr lang="zh-CN" altLang="en-US" dirty="0" smtClean="0"/>
+              <a:t>重量级产品</a:t>
+            </a:r>
+            <a:endParaRPr lang="en-US" altLang="zh-CN" dirty="0" smtClean="0"/>
+          </a:p>
+          <a:p>
+            <a:r>
+              <a:rPr lang="en-US" altLang="zh-CN" dirty="0" err="1" smtClean="0"/>
+              <a:t>JRockit</a:t>
+            </a:r>
+            <a:r>
+              <a:rPr lang="en-US" altLang="zh-CN" dirty="0" smtClean="0"/>
+              <a:t> VM</a:t>
+            </a:r>
+            <a:r>
+              <a:rPr lang="zh-CN" altLang="en-US" dirty="0" smtClean="0"/>
+              <a:t>和</a:t>
+            </a:r>
+            <a:r>
+              <a:rPr lang="en-US" altLang="zh-CN" dirty="0" err="1" smtClean="0"/>
+              <a:t>HotSpot</a:t>
+            </a:r>
+            <a:r>
+              <a:rPr lang="en-US" altLang="zh-CN" dirty="0" smtClean="0"/>
+              <a:t> VM</a:t>
+            </a:r>
+            <a:r>
+              <a:rPr lang="zh-CN" altLang="en-US" dirty="0" smtClean="0"/>
+              <a:t>融合以后，</a:t>
+            </a:r>
+            <a:r>
+              <a:rPr lang="en-US" altLang="zh-CN" dirty="0" err="1" smtClean="0"/>
+              <a:t>HotSpot</a:t>
+            </a:r>
+            <a:r>
+              <a:rPr lang="en-US" altLang="zh-CN" dirty="0" smtClean="0"/>
+              <a:t> VM</a:t>
+            </a:r>
+            <a:r>
+              <a:rPr lang="zh-CN" altLang="en-US" dirty="0" smtClean="0"/>
+              <a:t>也可以用了</a:t>
+            </a:r>
+            <a:endParaRPr lang="en-US" altLang="zh-CN" dirty="0" smtClean="0"/>
+          </a:p>
+          <a:p>
+            <a:r>
+              <a:rPr lang="zh-CN" altLang="en-US" dirty="0" smtClean="0"/>
+              <a:t>基于采样分析</a:t>
+            </a:r>
+            <a:r>
+              <a:rPr lang="en-US" altLang="zh-CN" dirty="0" smtClean="0"/>
+              <a:t>,</a:t>
+            </a:r>
+            <a:r>
+              <a:rPr lang="zh-CN" altLang="en-US" dirty="0" smtClean="0"/>
+              <a:t>性能消耗低</a:t>
+            </a:r>
+            <a:endParaRPr lang="en-US" altLang="zh-CN" dirty="0" smtClean="0"/>
+          </a:p>
+          <a:p>
+            <a:r>
+              <a:rPr lang="en-US" altLang="zh-CN" dirty="0" smtClean="0"/>
+              <a:t>Oracle VM only</a:t>
+            </a:r>
+          </a:p>
+          <a:p>
+            <a:endParaRPr lang="en-US" altLang="zh-CN" dirty="0" smtClean="0"/>
           </a:p>
         </p:txBody>
       </p:sp>
@@ -6712,7 +7161,11 @@
           <a:p>
             <a:r>
               <a:rPr lang="zh-CN" altLang="en-US" dirty="0" smtClean="0"/>
-              <a:t>线上性能分析</a:t>
+              <a:t>线下性能分析</a:t>
+            </a:r>
+            <a:r>
+              <a:rPr lang="en-US" altLang="zh-CN" dirty="0" smtClean="0"/>
+              <a:t>- Visual VM</a:t>
             </a:r>
             <a:endParaRPr lang="zh-CN" altLang="en-US" dirty="0"/>
           </a:p>
@@ -6730,105 +7183,32 @@
         </p:nvSpPr>
         <p:spPr/>
         <p:txBody>
-          <a:bodyPr>
-            <a:normAutofit fontScale="92500" lnSpcReduction="20000"/>
-          </a:bodyPr>
-          <a:lstStyle/>
-          <a:p>
-            <a:r>
-              <a:rPr lang="en-US" altLang="zh-CN" dirty="0" err="1" smtClean="0"/>
-              <a:t>Btrace</a:t>
-            </a:r>
-            <a:endParaRPr lang="en-US" altLang="zh-CN" dirty="0" smtClean="0"/>
-          </a:p>
-          <a:p>
-            <a:pPr lvl="1"/>
-            <a:r>
-              <a:rPr lang="zh-CN" altLang="en-US" dirty="0" smtClean="0"/>
-              <a:t>直接写</a:t>
-            </a:r>
-            <a:r>
-              <a:rPr lang="en-US" altLang="zh-CN" dirty="0" err="1" smtClean="0"/>
-              <a:t>syso</a:t>
-            </a:r>
-            <a:r>
-              <a:rPr lang="zh-CN" altLang="en-US" dirty="0" smtClean="0"/>
-              <a:t>来输出需要的信息</a:t>
-            </a:r>
-            <a:endParaRPr lang="en-US" altLang="zh-CN" dirty="0" smtClean="0"/>
-          </a:p>
-          <a:p>
-            <a:r>
-              <a:rPr lang="en-US" altLang="zh-CN" dirty="0" err="1" smtClean="0"/>
-              <a:t>HouseMD</a:t>
-            </a:r>
-            <a:endParaRPr lang="en-US" altLang="zh-CN" dirty="0" smtClean="0"/>
-          </a:p>
-          <a:p>
-            <a:pPr lvl="1"/>
-            <a:r>
-              <a:rPr lang="zh-CN" altLang="en-US" dirty="0" smtClean="0"/>
-              <a:t>安装麻烦，需要</a:t>
-            </a:r>
-            <a:r>
-              <a:rPr lang="en-US" altLang="zh-CN" dirty="0" err="1" smtClean="0"/>
-              <a:t>jenv</a:t>
-            </a:r>
-            <a:r>
-              <a:rPr lang="zh-CN" altLang="en-US" dirty="0" smtClean="0"/>
-              <a:t>，要</a:t>
-            </a:r>
-            <a:r>
-              <a:rPr lang="en-US" altLang="zh-CN" dirty="0" smtClean="0"/>
-              <a:t>root</a:t>
-            </a:r>
-            <a:r>
-              <a:rPr lang="zh-CN" altLang="en-US" dirty="0" smtClean="0"/>
-              <a:t>权限</a:t>
-            </a:r>
-            <a:endParaRPr lang="en-US" altLang="zh-CN" dirty="0" smtClean="0"/>
-          </a:p>
-          <a:p>
-            <a:r>
-              <a:rPr lang="en-US" altLang="zh-CN" dirty="0" err="1" smtClean="0"/>
-              <a:t>Greys</a:t>
-            </a:r>
-            <a:r>
-              <a:rPr lang="en-US" altLang="zh-CN" dirty="0" smtClean="0"/>
-              <a:t>-anatomy</a:t>
-            </a:r>
-          </a:p>
-          <a:p>
-            <a:pPr lvl="1"/>
-            <a:r>
-              <a:rPr lang="zh-CN" altLang="en-US" dirty="0"/>
-              <a:t>职能</a:t>
-            </a:r>
-            <a:r>
-              <a:rPr lang="zh-CN" altLang="en-US" dirty="0" smtClean="0"/>
-              <a:t>，开袋即食</a:t>
-            </a:r>
-            <a:endParaRPr lang="en-US" altLang="zh-CN" dirty="0" smtClean="0"/>
-          </a:p>
-          <a:p>
-            <a:r>
-              <a:rPr lang="zh-CN" altLang="en-US" dirty="0" smtClean="0"/>
-              <a:t>原理：字节码增强</a:t>
-            </a:r>
-            <a:endParaRPr lang="en-US" altLang="zh-CN" dirty="0" smtClean="0"/>
-          </a:p>
-          <a:p>
-            <a:r>
-              <a:rPr lang="zh-CN" altLang="en-US" dirty="0" smtClean="0"/>
-              <a:t>在猎人平台化开发中发现几个重要的性能优化点</a:t>
-            </a:r>
-            <a:endParaRPr lang="en-US" altLang="zh-CN" dirty="0" smtClean="0"/>
-          </a:p>
-          <a:p>
-            <a:r>
-              <a:rPr lang="en-US" altLang="zh-CN" dirty="0" smtClean="0"/>
-              <a:t>Demo!</a:t>
-            </a:r>
+          <a:bodyPr/>
+          <a:lstStyle/>
+          <a:p>
+            <a:r>
+              <a:rPr lang="zh-CN" altLang="en-US" dirty="0" smtClean="0"/>
+              <a:t>丰富的插件支持</a:t>
+            </a:r>
+            <a:endParaRPr lang="en-US" altLang="zh-CN" dirty="0" smtClean="0"/>
+          </a:p>
+          <a:p>
+            <a:r>
+              <a:rPr lang="en-US" altLang="zh-CN" dirty="0" smtClean="0"/>
+              <a:t>All JVM</a:t>
+            </a:r>
+          </a:p>
+          <a:p>
+            <a:r>
+              <a:rPr lang="zh-CN" altLang="en-US" dirty="0" smtClean="0"/>
+              <a:t>常用的插件</a:t>
+            </a:r>
+            <a:r>
+              <a:rPr lang="en-US" altLang="zh-CN" dirty="0" smtClean="0"/>
+              <a:t>:Visual GC</a:t>
+            </a:r>
+          </a:p>
+          <a:p>
             <a:endParaRPr lang="zh-CN" altLang="en-US" dirty="0"/>
           </a:p>
         </p:txBody>
@@ -6874,8 +7254,12 @@
           <a:lstStyle/>
           <a:p>
             <a:r>
-              <a:rPr lang="zh-CN" altLang="en-US" dirty="0" smtClean="0"/>
-              <a:t>判断对象大小</a:t>
+              <a:rPr lang="zh-CN" altLang="en-US" dirty="0"/>
+              <a:t>线</a:t>
+            </a:r>
+            <a:r>
+              <a:rPr lang="zh-CN" altLang="en-US" dirty="0" smtClean="0"/>
+              <a:t>上问题分析</a:t>
             </a:r>
             <a:endParaRPr lang="zh-CN" altLang="en-US" dirty="0"/>
           </a:p>
@@ -6897,27 +7281,48 @@
           <a:lstStyle/>
           <a:p>
             <a:r>
-              <a:rPr lang="en-US" altLang="zh-CN" dirty="0" smtClean="0"/>
-              <a:t>Sizeof.jar</a:t>
-            </a:r>
-          </a:p>
-          <a:p>
-            <a:pPr lvl="1"/>
-            <a:r>
-              <a:rPr lang="zh-CN" altLang="en-US" dirty="0" smtClean="0"/>
-              <a:t>使用 </a:t>
-            </a:r>
-            <a:r>
-              <a:rPr lang="en-US" altLang="zh-CN" dirty="0" smtClean="0"/>
-              <a:t>java agent </a:t>
-            </a:r>
-            <a:r>
-              <a:rPr lang="zh-CN" altLang="en-US" dirty="0" smtClean="0"/>
-              <a:t>，通过循环遍历对象印象，得到对象实际的大小</a:t>
-            </a:r>
-            <a:r>
-              <a:rPr lang="en-US" altLang="zh-CN" dirty="0" smtClean="0"/>
-              <a:t>.</a:t>
+              <a:rPr lang="zh-CN" altLang="en-US" dirty="0" smtClean="0"/>
+              <a:t>谁调用了</a:t>
+            </a:r>
+            <a:r>
+              <a:rPr lang="en-US" altLang="zh-CN" dirty="0" smtClean="0"/>
+              <a:t>XXXX</a:t>
+            </a:r>
+            <a:r>
+              <a:rPr lang="zh-CN" altLang="en-US" dirty="0" smtClean="0"/>
+              <a:t>方法？</a:t>
+            </a:r>
+            <a:endParaRPr lang="en-US" altLang="zh-CN" dirty="0" smtClean="0"/>
+          </a:p>
+          <a:p>
+            <a:r>
+              <a:rPr lang="zh-CN" altLang="en-US" dirty="0" smtClean="0"/>
+              <a:t>这个变量到底是什么值？</a:t>
+            </a:r>
+            <a:endParaRPr lang="en-US" altLang="zh-CN" dirty="0" smtClean="0"/>
+          </a:p>
+          <a:p>
+            <a:r>
+              <a:rPr lang="en-US" altLang="zh-CN" dirty="0" err="1" smtClean="0"/>
+              <a:t>Ifelse</a:t>
+            </a:r>
+            <a:r>
+              <a:rPr lang="zh-CN" altLang="en-US" dirty="0" smtClean="0"/>
+              <a:t>进入了哪个分支？</a:t>
+            </a:r>
+            <a:endParaRPr lang="en-US" altLang="zh-CN" dirty="0" smtClean="0"/>
+          </a:p>
+          <a:p>
+            <a:r>
+              <a:rPr lang="zh-CN" altLang="en-US" dirty="0" smtClean="0"/>
+              <a:t>性能慢，到底慢在哪？</a:t>
+            </a:r>
+            <a:endParaRPr lang="en-US" altLang="zh-CN" dirty="0" smtClean="0"/>
+          </a:p>
+          <a:p>
+            <a:r>
+              <a:rPr lang="zh-CN" altLang="en-US" dirty="0" smtClean="0"/>
+              <a:t>谁创建了超级大的数组？</a:t>
             </a:r>
             <a:endParaRPr lang="zh-CN" altLang="en-US" dirty="0"/>
           </a:p>
@@ -6958,21 +7363,129 @@
             <p:ph type="title"/>
           </p:nvPr>
         </p:nvSpPr>
-        <p:spPr>
-          <a:xfrm>
-            <a:off x="428596" y="2643182"/>
-            <a:ext cx="8229600" cy="1143000"/>
-          </a:xfrm>
-        </p:spPr>
+        <p:spPr/>
+        <p:txBody>
+          <a:bodyPr/>
+          <a:lstStyle/>
+          <a:p>
+            <a:r>
+              <a:rPr lang="zh-CN" altLang="en-US" dirty="0" smtClean="0"/>
+              <a:t>线上性能分析</a:t>
+            </a:r>
+            <a:endParaRPr lang="zh-CN" altLang="en-US" dirty="0"/>
+          </a:p>
+        </p:txBody>
+      </p:sp>
+      <p:sp>
+        <p:nvSpPr>
+          <p:cNvPr id="3" name="内容占位符 2"/>
+          <p:cNvSpPr>
+            <a:spLocks noGrp="1"/>
+          </p:cNvSpPr>
+          <p:nvPr>
+            <p:ph idx="1"/>
+          </p:nvPr>
+        </p:nvSpPr>
+        <p:spPr/>
         <p:txBody>
           <a:bodyPr>
-            <a:normAutofit/>
+            <a:normAutofit fontScale="92500" lnSpcReduction="20000"/>
           </a:bodyPr>
           <a:lstStyle/>
           <a:p>
             <a:r>
-              <a:rPr lang="en-US" altLang="zh-CN" dirty="0" smtClean="0"/>
-              <a:t>Q&amp;A</a:t>
+              <a:rPr lang="en-US" altLang="zh-CN" dirty="0" err="1" smtClean="0"/>
+              <a:t>Btrace</a:t>
+            </a:r>
+            <a:endParaRPr lang="en-US" altLang="zh-CN" dirty="0" smtClean="0"/>
+          </a:p>
+          <a:p>
+            <a:pPr lvl="1"/>
+            <a:r>
+              <a:rPr lang="zh-CN" altLang="en-US" dirty="0" smtClean="0"/>
+              <a:t>直接写</a:t>
+            </a:r>
+            <a:r>
+              <a:rPr lang="en-US" altLang="zh-CN" dirty="0" err="1" smtClean="0"/>
+              <a:t>syso</a:t>
+            </a:r>
+            <a:r>
+              <a:rPr lang="zh-CN" altLang="en-US" dirty="0" smtClean="0"/>
+              <a:t>来输出需要的信息</a:t>
+            </a:r>
+            <a:endParaRPr lang="en-US" altLang="zh-CN" dirty="0" smtClean="0"/>
+          </a:p>
+          <a:p>
+            <a:r>
+              <a:rPr lang="en-US" altLang="zh-CN" dirty="0" err="1" smtClean="0"/>
+              <a:t>HouseMD</a:t>
+            </a:r>
+            <a:endParaRPr lang="en-US" altLang="zh-CN" dirty="0" smtClean="0"/>
+          </a:p>
+          <a:p>
+            <a:pPr lvl="1"/>
+            <a:r>
+              <a:rPr lang="zh-CN" altLang="en-US" dirty="0" smtClean="0"/>
+              <a:t>安装麻烦，需要</a:t>
+            </a:r>
+            <a:r>
+              <a:rPr lang="en-US" altLang="zh-CN" dirty="0" err="1" smtClean="0"/>
+              <a:t>jenv</a:t>
+            </a:r>
+            <a:r>
+              <a:rPr lang="zh-CN" altLang="en-US" dirty="0" smtClean="0"/>
+              <a:t>，要</a:t>
+            </a:r>
+            <a:r>
+              <a:rPr lang="en-US" altLang="zh-CN" dirty="0" smtClean="0"/>
+              <a:t>root</a:t>
+            </a:r>
+            <a:r>
+              <a:rPr lang="zh-CN" altLang="en-US" dirty="0" smtClean="0"/>
+              <a:t>权限</a:t>
+            </a:r>
+            <a:endParaRPr lang="en-US" altLang="zh-CN" dirty="0" smtClean="0"/>
+          </a:p>
+          <a:p>
+            <a:r>
+              <a:rPr lang="en-US" altLang="zh-CN" dirty="0" err="1" smtClean="0"/>
+              <a:t>Greys</a:t>
+            </a:r>
+            <a:r>
+              <a:rPr lang="en-US" altLang="zh-CN" dirty="0" smtClean="0"/>
+              <a:t>-anatomy</a:t>
+            </a:r>
+          </a:p>
+          <a:p>
+            <a:pPr lvl="1"/>
+            <a:r>
+              <a:rPr lang="zh-CN" altLang="en-US" dirty="0"/>
+              <a:t>职能</a:t>
+            </a:r>
+            <a:r>
+              <a:rPr lang="zh-CN" altLang="en-US" dirty="0" smtClean="0"/>
+              <a:t>，开袋即食</a:t>
+            </a:r>
+            <a:endParaRPr lang="en-US" altLang="zh-CN" dirty="0" smtClean="0"/>
+          </a:p>
+          <a:p>
+            <a:r>
+              <a:rPr lang="zh-CN" altLang="en-US" dirty="0" smtClean="0"/>
+              <a:t>原理：字节码增强</a:t>
+            </a:r>
+            <a:endParaRPr lang="en-US" altLang="zh-CN" dirty="0" smtClean="0"/>
+          </a:p>
+          <a:p>
+            <a:r>
+              <a:rPr lang="zh-CN" altLang="en-US" dirty="0" smtClean="0"/>
+              <a:t>在猎人平台化开发中发现几个重要的性能优化点</a:t>
+            </a:r>
+            <a:endParaRPr lang="en-US" altLang="zh-CN" dirty="0" smtClean="0"/>
+          </a:p>
+          <a:p>
+            <a:r>
+              <a:rPr lang="en-US" altLang="zh-CN" dirty="0" smtClean="0"/>
+              <a:t>Demo!</a:t>
             </a:r>
             <a:endParaRPr lang="zh-CN" altLang="en-US" dirty="0"/>
           </a:p>
@@ -7005,6 +7518,151 @@
       </p:grpSpPr>
       <p:sp>
         <p:nvSpPr>
+          <p:cNvPr id="2" name="标题 1"/>
+          <p:cNvSpPr>
+            <a:spLocks noGrp="1"/>
+          </p:cNvSpPr>
+          <p:nvPr>
+            <p:ph type="title"/>
+          </p:nvPr>
+        </p:nvSpPr>
+        <p:spPr/>
+        <p:txBody>
+          <a:bodyPr/>
+          <a:lstStyle/>
+          <a:p>
+            <a:r>
+              <a:rPr lang="zh-CN" altLang="en-US" dirty="0" smtClean="0"/>
+              <a:t>判断对象大小</a:t>
+            </a:r>
+            <a:endParaRPr lang="zh-CN" altLang="en-US" dirty="0"/>
+          </a:p>
+        </p:txBody>
+      </p:sp>
+      <p:sp>
+        <p:nvSpPr>
+          <p:cNvPr id="3" name="内容占位符 2"/>
+          <p:cNvSpPr>
+            <a:spLocks noGrp="1"/>
+          </p:cNvSpPr>
+          <p:nvPr>
+            <p:ph idx="1"/>
+          </p:nvPr>
+        </p:nvSpPr>
+        <p:spPr/>
+        <p:txBody>
+          <a:bodyPr/>
+          <a:lstStyle/>
+          <a:p>
+            <a:r>
+              <a:rPr lang="en-US" altLang="zh-CN" dirty="0" smtClean="0"/>
+              <a:t>Sizeof.jar</a:t>
+            </a:r>
+          </a:p>
+          <a:p>
+            <a:pPr lvl="1"/>
+            <a:r>
+              <a:rPr lang="zh-CN" altLang="en-US" dirty="0" smtClean="0"/>
+              <a:t>使用 </a:t>
+            </a:r>
+            <a:r>
+              <a:rPr lang="en-US" altLang="zh-CN" dirty="0" smtClean="0"/>
+              <a:t>java agent </a:t>
+            </a:r>
+            <a:r>
+              <a:rPr lang="zh-CN" altLang="en-US" dirty="0" smtClean="0"/>
+              <a:t>，通过循环遍历对象印象，得到对象实际的大小</a:t>
+            </a:r>
+            <a:r>
+              <a:rPr lang="en-US" altLang="zh-CN" dirty="0" smtClean="0"/>
+              <a:t>.</a:t>
+            </a:r>
+            <a:endParaRPr lang="zh-CN" altLang="en-US" dirty="0"/>
+          </a:p>
+        </p:txBody>
+      </p:sp>
+    </p:spTree>
+  </p:cSld>
+  <p:clrMapOvr>
+    <a:masterClrMapping/>
+  </p:clrMapOvr>
+</p:sld>
+</file>
+
+<file path=ppt/slides/slide37.xml><?xml version="1.0" encoding="utf-8"?>
+<p:sld xmlns:a="http://schemas.openxmlformats.org/drawingml/2006/main" xmlns:r="http://schemas.openxmlformats.org/officeDocument/2006/relationships" xmlns:p="http://schemas.openxmlformats.org/presentationml/2006/main">
+  <p:cSld>
+    <p:spTree>
+      <p:nvGrpSpPr>
+        <p:cNvPr id="1" name=""/>
+        <p:cNvGrpSpPr/>
+        <p:nvPr/>
+      </p:nvGrpSpPr>
+      <p:grpSpPr>
+        <a:xfrm>
+          <a:off x="0" y="0"/>
+          <a:ext cx="0" cy="0"/>
+          <a:chOff x="0" y="0"/>
+          <a:chExt cx="0" cy="0"/>
+        </a:xfrm>
+      </p:grpSpPr>
+      <p:sp>
+        <p:nvSpPr>
+          <p:cNvPr id="2" name="标题 1"/>
+          <p:cNvSpPr>
+            <a:spLocks noGrp="1"/>
+          </p:cNvSpPr>
+          <p:nvPr>
+            <p:ph type="title"/>
+          </p:nvPr>
+        </p:nvSpPr>
+        <p:spPr>
+          <a:xfrm>
+            <a:off x="428596" y="2643182"/>
+            <a:ext cx="8229600" cy="1143000"/>
+          </a:xfrm>
+        </p:spPr>
+        <p:txBody>
+          <a:bodyPr>
+            <a:normAutofit/>
+          </a:bodyPr>
+          <a:lstStyle/>
+          <a:p>
+            <a:r>
+              <a:rPr lang="en-US" altLang="zh-CN" dirty="0" smtClean="0"/>
+              <a:t>Q&amp;A</a:t>
+            </a:r>
+            <a:endParaRPr lang="zh-CN" altLang="en-US" dirty="0"/>
+          </a:p>
+        </p:txBody>
+      </p:sp>
+    </p:spTree>
+  </p:cSld>
+  <p:clrMapOvr>
+    <a:masterClrMapping/>
+  </p:clrMapOvr>
+</p:sld>
+</file>
+
+<file path=ppt/slides/slide38.xml><?xml version="1.0" encoding="utf-8"?>
+<p:sld xmlns:a="http://schemas.openxmlformats.org/drawingml/2006/main" xmlns:r="http://schemas.openxmlformats.org/officeDocument/2006/relationships" xmlns:p="http://schemas.openxmlformats.org/presentationml/2006/main">
+  <p:cSld>
+    <p:spTree>
+      <p:nvGrpSpPr>
+        <p:cNvPr id="1" name=""/>
+        <p:cNvGrpSpPr/>
+        <p:nvPr/>
+      </p:nvGrpSpPr>
+      <p:grpSpPr>
+        <a:xfrm>
+          <a:off x="0" y="0"/>
+          <a:ext cx="0" cy="0"/>
+          <a:chOff x="0" y="0"/>
+          <a:chExt cx="0" cy="0"/>
+        </a:xfrm>
+      </p:grpSpPr>
+      <p:sp>
+        <p:nvSpPr>
           <p:cNvPr id="2" name="TextBox 1"/>
           <p:cNvSpPr txBox="1"/>
           <p:nvPr/>
@@ -8013,13 +8671,11 @@
       </p:sp>
       <p:pic>
         <p:nvPicPr>
-          <p:cNvPr id="4" name="内容占位符 3" descr="duke01-e1369743413155.jpg"/>
+          <p:cNvPr id="5" name="图片 4" descr="0c558ac.jpeg"/>
           <p:cNvPicPr>
-            <a:picLocks noGrp="1" noChangeAspect="1"/>
+            <a:picLocks noChangeAspect="1"/>
           </p:cNvPicPr>
-          <p:nvPr>
-            <p:ph idx="1"/>
-          </p:nvPr>
+          <p:nvPr/>
         </p:nvPicPr>
         <p:blipFill>
           <a:blip r:embed="rId2"/>
@@ -8029,28 +8685,7 @@
         </p:blipFill>
         <p:spPr>
           <a:xfrm>
-            <a:off x="428596" y="1714488"/>
-            <a:ext cx="3857652" cy="2255131"/>
-          </a:xfrm>
-        </p:spPr>
-      </p:pic>
-      <p:pic>
-        <p:nvPicPr>
-          <p:cNvPr id="5" name="图片 4" descr="0c558ac.jpeg"/>
-          <p:cNvPicPr>
-            <a:picLocks noChangeAspect="1"/>
-          </p:cNvPicPr>
-          <p:nvPr/>
-        </p:nvPicPr>
-        <p:blipFill>
-          <a:blip r:embed="rId3"/>
-          <a:stretch>
-            <a:fillRect/>
-          </a:stretch>
-        </p:blipFill>
-        <p:spPr>
-          <a:xfrm>
-            <a:off x="5715008" y="1785926"/>
+            <a:off x="1115616" y="2060848"/>
             <a:ext cx="2666990" cy="2666990"/>
           </a:xfrm>
           <a:prstGeom prst="rect">
@@ -8058,6 +8693,80 @@
           </a:prstGeom>
         </p:spPr>
       </p:pic>
+      <p:sp>
+        <p:nvSpPr>
+          <p:cNvPr id="8" name="TextBox 7"/>
+          <p:cNvSpPr txBox="1"/>
+          <p:nvPr/>
+        </p:nvSpPr>
+        <p:spPr>
+          <a:xfrm>
+            <a:off x="6012160" y="2655679"/>
+            <a:ext cx="2088232" cy="1477328"/>
+          </a:xfrm>
+          <a:prstGeom prst="rect">
+            <a:avLst/>
+          </a:prstGeom>
+          <a:noFill/>
+        </p:spPr>
+        <p:txBody>
+          <a:bodyPr wrap="square" rtlCol="0">
+            <a:spAutoFit/>
+          </a:bodyPr>
+          <a:lstStyle/>
+          <a:p>
+            <a:pPr marL="285750" indent="-285750">
+              <a:buFont typeface="Arial" panose="020B0604020202020204" pitchFamily="34" charset="0"/>
+              <a:buChar char="•"/>
+            </a:pPr>
+            <a:r>
+              <a:rPr lang="en-US" altLang="zh-CN" dirty="0" smtClean="0"/>
+              <a:t>JIT </a:t>
+            </a:r>
+            <a:r>
+              <a:rPr lang="zh-CN" altLang="en-US" dirty="0" smtClean="0"/>
+              <a:t>动态编译器</a:t>
+            </a:r>
+            <a:endParaRPr lang="en-US" altLang="zh-CN" dirty="0" smtClean="0"/>
+          </a:p>
+          <a:p>
+            <a:endParaRPr lang="en-US" altLang="zh-CN" dirty="0" smtClean="0"/>
+          </a:p>
+          <a:p>
+            <a:pPr marL="285750" indent="-285750">
+              <a:buFont typeface="Arial" panose="020B0604020202020204" pitchFamily="34" charset="0"/>
+              <a:buChar char="•"/>
+            </a:pPr>
+            <a:r>
+              <a:rPr lang="en-US" altLang="zh-CN" dirty="0" smtClean="0"/>
+              <a:t>JVM </a:t>
+            </a:r>
+            <a:r>
+              <a:rPr lang="zh-CN" altLang="en-US" dirty="0" smtClean="0"/>
+              <a:t>参数调优</a:t>
+            </a:r>
+            <a:endParaRPr lang="en-US" altLang="zh-CN" dirty="0" smtClean="0"/>
+          </a:p>
+          <a:p>
+            <a:endParaRPr lang="en-US" altLang="zh-CN" dirty="0" smtClean="0"/>
+          </a:p>
+          <a:p>
+            <a:pPr marL="285750" indent="-285750">
+              <a:buFont typeface="Arial" panose="020B0604020202020204" pitchFamily="34" charset="0"/>
+              <a:buChar char="•"/>
+            </a:pPr>
+            <a:r>
+              <a:rPr lang="en-US" altLang="zh-CN" dirty="0" smtClean="0"/>
+              <a:t>GC</a:t>
+            </a:r>
+            <a:r>
+              <a:rPr lang="zh-CN" altLang="en-US" dirty="0" smtClean="0"/>
+              <a:t>调优</a:t>
+            </a:r>
+            <a:endParaRPr lang="en-US" altLang="zh-CN" dirty="0" smtClean="0"/>
+          </a:p>
+        </p:txBody>
+      </p:sp>
     </p:spTree>
   </p:cSld>
   <p:clrMapOvr>

</xml_diff>